<commit_message>
Add acknowledgement feedback capability
</commit_message>
<xml_diff>
--- a/NotifyDemo Description.pptx
+++ b/NotifyDemo Description.pptx
@@ -278,7 +278,7 @@
           <a:p>
             <a:fld id="{79084D12-9971-4D85-90B6-EA2E8E4DAC18}" type="datetimeFigureOut">
               <a:rPr lang="en-GB" smtClean="0"/>
-              <a:t>02/09/2019</a:t>
+              <a:t>06/09/2019</a:t>
             </a:fld>
             <a:endParaRPr lang="en-GB"/>
           </a:p>
@@ -478,7 +478,7 @@
           <a:p>
             <a:fld id="{79084D12-9971-4D85-90B6-EA2E8E4DAC18}" type="datetimeFigureOut">
               <a:rPr lang="en-GB" smtClean="0"/>
-              <a:t>02/09/2019</a:t>
+              <a:t>06/09/2019</a:t>
             </a:fld>
             <a:endParaRPr lang="en-GB"/>
           </a:p>
@@ -688,7 +688,7 @@
           <a:p>
             <a:fld id="{79084D12-9971-4D85-90B6-EA2E8E4DAC18}" type="datetimeFigureOut">
               <a:rPr lang="en-GB" smtClean="0"/>
-              <a:t>02/09/2019</a:t>
+              <a:t>06/09/2019</a:t>
             </a:fld>
             <a:endParaRPr lang="en-GB"/>
           </a:p>
@@ -888,7 +888,7 @@
           <a:p>
             <a:fld id="{79084D12-9971-4D85-90B6-EA2E8E4DAC18}" type="datetimeFigureOut">
               <a:rPr lang="en-GB" smtClean="0"/>
-              <a:t>02/09/2019</a:t>
+              <a:t>06/09/2019</a:t>
             </a:fld>
             <a:endParaRPr lang="en-GB"/>
           </a:p>
@@ -1164,7 +1164,7 @@
           <a:p>
             <a:fld id="{79084D12-9971-4D85-90B6-EA2E8E4DAC18}" type="datetimeFigureOut">
               <a:rPr lang="en-GB" smtClean="0"/>
-              <a:t>02/09/2019</a:t>
+              <a:t>06/09/2019</a:t>
             </a:fld>
             <a:endParaRPr lang="en-GB"/>
           </a:p>
@@ -1432,7 +1432,7 @@
           <a:p>
             <a:fld id="{79084D12-9971-4D85-90B6-EA2E8E4DAC18}" type="datetimeFigureOut">
               <a:rPr lang="en-GB" smtClean="0"/>
-              <a:t>02/09/2019</a:t>
+              <a:t>06/09/2019</a:t>
             </a:fld>
             <a:endParaRPr lang="en-GB"/>
           </a:p>
@@ -1847,7 +1847,7 @@
           <a:p>
             <a:fld id="{79084D12-9971-4D85-90B6-EA2E8E4DAC18}" type="datetimeFigureOut">
               <a:rPr lang="en-GB" smtClean="0"/>
-              <a:t>02/09/2019</a:t>
+              <a:t>06/09/2019</a:t>
             </a:fld>
             <a:endParaRPr lang="en-GB"/>
           </a:p>
@@ -1989,7 +1989,7 @@
           <a:p>
             <a:fld id="{79084D12-9971-4D85-90B6-EA2E8E4DAC18}" type="datetimeFigureOut">
               <a:rPr lang="en-GB" smtClean="0"/>
-              <a:t>02/09/2019</a:t>
+              <a:t>06/09/2019</a:t>
             </a:fld>
             <a:endParaRPr lang="en-GB"/>
           </a:p>
@@ -2102,7 +2102,7 @@
           <a:p>
             <a:fld id="{79084D12-9971-4D85-90B6-EA2E8E4DAC18}" type="datetimeFigureOut">
               <a:rPr lang="en-GB" smtClean="0"/>
-              <a:t>02/09/2019</a:t>
+              <a:t>06/09/2019</a:t>
             </a:fld>
             <a:endParaRPr lang="en-GB"/>
           </a:p>
@@ -2415,7 +2415,7 @@
           <a:p>
             <a:fld id="{79084D12-9971-4D85-90B6-EA2E8E4DAC18}" type="datetimeFigureOut">
               <a:rPr lang="en-GB" smtClean="0"/>
-              <a:t>02/09/2019</a:t>
+              <a:t>06/09/2019</a:t>
             </a:fld>
             <a:endParaRPr lang="en-GB"/>
           </a:p>
@@ -2704,7 +2704,7 @@
           <a:p>
             <a:fld id="{79084D12-9971-4D85-90B6-EA2E8E4DAC18}" type="datetimeFigureOut">
               <a:rPr lang="en-GB" smtClean="0"/>
-              <a:t>02/09/2019</a:t>
+              <a:t>06/09/2019</a:t>
             </a:fld>
             <a:endParaRPr lang="en-GB"/>
           </a:p>
@@ -2947,7 +2947,7 @@
           <a:p>
             <a:fld id="{79084D12-9971-4D85-90B6-EA2E8E4DAC18}" type="datetimeFigureOut">
               <a:rPr lang="en-GB" smtClean="0"/>
-              <a:t>02/09/2019</a:t>
+              <a:t>06/09/2019</a:t>
             </a:fld>
             <a:endParaRPr lang="en-GB"/>
           </a:p>
@@ -5346,7 +5346,21 @@
           <a:p>
             <a:r>
               <a:rPr lang="en-GB" dirty="0"/>
-              <a:t>This contains most possible fields. You may wish to omit many of them.</a:t>
+              <a:t>This contains many possible fields. You may wish to omit many of them.</a:t>
+            </a:r>
+          </a:p>
+          <a:p>
+            <a:r>
+              <a:rPr lang="en-GB" dirty="0"/>
+              <a:t>For </a:t>
+            </a:r>
+            <a:r>
+              <a:rPr lang="en-GB" dirty="0" err="1"/>
+              <a:t>NotifyMessageVoice</a:t>
+            </a:r>
+            <a:r>
+              <a:rPr lang="en-GB" dirty="0"/>
+              <a:t>, omit the last ‘cookie’ parameter.</a:t>
             </a:r>
           </a:p>
           <a:p>
@@ -5360,7 +5374,7 @@
               <a:rPr lang="en-GB" sz="2000" dirty="0" err="1">
                 <a:latin typeface="Arial monospaced for SAP" panose="020B0609020202030204" pitchFamily="49" charset="0"/>
               </a:rPr>
-              <a:t>NotifyMessageVoice</a:t>
+              <a:t>NotifyAlarmVoice</a:t>
             </a:r>
             <a:r>
               <a:rPr lang="en-GB" sz="2000" dirty="0">
@@ -5474,7 +5488,25 @@
               <a:rPr lang="en-GB" sz="2000" dirty="0">
                 <a:latin typeface="Arial monospaced for SAP" panose="020B0609020202030204" pitchFamily="49" charset="0"/>
               </a:rPr>
-              <a:t>%' )</a:t>
+              <a:t>%', 'VOICE', '</a:t>
+            </a:r>
+            <a:r>
+              <a:rPr lang="en-GB" sz="2000" dirty="0"/>
+              <a:t>%</a:t>
+            </a:r>
+            <a:r>
+              <a:rPr lang="en-GB" sz="2000" dirty="0" err="1"/>
+              <a:t>ACookie</a:t>
+            </a:r>
+            <a:r>
+              <a:rPr lang="en-GB" sz="2000" dirty="0"/>
+              <a:t>%</a:t>
+            </a:r>
+            <a:r>
+              <a:rPr lang="en-GB" sz="2000" dirty="0">
+                <a:latin typeface="Arial monospaced for SAP" panose="020B0609020202030204" pitchFamily="49" charset="0"/>
+              </a:rPr>
+              <a:t>' )</a:t>
             </a:r>
           </a:p>
         </p:txBody>

</xml_diff>

<commit_message>
Add further detail to powerpoint
</commit_message>
<xml_diff>
--- a/NotifyDemo Description.pptx
+++ b/NotifyDemo Description.pptx
@@ -10,19 +10,22 @@
     <p:sldId id="258" r:id="rId4"/>
     <p:sldId id="259" r:id="rId5"/>
     <p:sldId id="260" r:id="rId6"/>
-    <p:sldId id="261" r:id="rId7"/>
-    <p:sldId id="265" r:id="rId8"/>
-    <p:sldId id="262" r:id="rId9"/>
-    <p:sldId id="263" r:id="rId10"/>
-    <p:sldId id="264" r:id="rId11"/>
-    <p:sldId id="266" r:id="rId12"/>
-    <p:sldId id="267" r:id="rId13"/>
-    <p:sldId id="268" r:id="rId14"/>
-    <p:sldId id="269" r:id="rId15"/>
-    <p:sldId id="270" r:id="rId16"/>
-    <p:sldId id="271" r:id="rId17"/>
-    <p:sldId id="273" r:id="rId18"/>
-    <p:sldId id="272" r:id="rId19"/>
+    <p:sldId id="274" r:id="rId7"/>
+    <p:sldId id="275" r:id="rId8"/>
+    <p:sldId id="261" r:id="rId9"/>
+    <p:sldId id="265" r:id="rId10"/>
+    <p:sldId id="262" r:id="rId11"/>
+    <p:sldId id="263" r:id="rId12"/>
+    <p:sldId id="264" r:id="rId13"/>
+    <p:sldId id="266" r:id="rId14"/>
+    <p:sldId id="267" r:id="rId15"/>
+    <p:sldId id="268" r:id="rId16"/>
+    <p:sldId id="276" r:id="rId17"/>
+    <p:sldId id="269" r:id="rId18"/>
+    <p:sldId id="270" r:id="rId19"/>
+    <p:sldId id="271" r:id="rId20"/>
+    <p:sldId id="273" r:id="rId21"/>
+    <p:sldId id="272" r:id="rId22"/>
   </p:sldIdLst>
   <p:sldSz cx="12192000" cy="6858000"/>
   <p:notesSz cx="6858000" cy="9144000"/>
@@ -278,7 +281,7 @@
           <a:p>
             <a:fld id="{79084D12-9971-4D85-90B6-EA2E8E4DAC18}" type="datetimeFigureOut">
               <a:rPr lang="en-GB" smtClean="0"/>
-              <a:t>06/09/2019</a:t>
+              <a:t>11/09/2019</a:t>
             </a:fld>
             <a:endParaRPr lang="en-GB"/>
           </a:p>
@@ -478,7 +481,7 @@
           <a:p>
             <a:fld id="{79084D12-9971-4D85-90B6-EA2E8E4DAC18}" type="datetimeFigureOut">
               <a:rPr lang="en-GB" smtClean="0"/>
-              <a:t>06/09/2019</a:t>
+              <a:t>11/09/2019</a:t>
             </a:fld>
             <a:endParaRPr lang="en-GB"/>
           </a:p>
@@ -688,7 +691,7 @@
           <a:p>
             <a:fld id="{79084D12-9971-4D85-90B6-EA2E8E4DAC18}" type="datetimeFigureOut">
               <a:rPr lang="en-GB" smtClean="0"/>
-              <a:t>06/09/2019</a:t>
+              <a:t>11/09/2019</a:t>
             </a:fld>
             <a:endParaRPr lang="en-GB"/>
           </a:p>
@@ -888,7 +891,7 @@
           <a:p>
             <a:fld id="{79084D12-9971-4D85-90B6-EA2E8E4DAC18}" type="datetimeFigureOut">
               <a:rPr lang="en-GB" smtClean="0"/>
-              <a:t>06/09/2019</a:t>
+              <a:t>11/09/2019</a:t>
             </a:fld>
             <a:endParaRPr lang="en-GB"/>
           </a:p>
@@ -1164,7 +1167,7 @@
           <a:p>
             <a:fld id="{79084D12-9971-4D85-90B6-EA2E8E4DAC18}" type="datetimeFigureOut">
               <a:rPr lang="en-GB" smtClean="0"/>
-              <a:t>06/09/2019</a:t>
+              <a:t>11/09/2019</a:t>
             </a:fld>
             <a:endParaRPr lang="en-GB"/>
           </a:p>
@@ -1432,7 +1435,7 @@
           <a:p>
             <a:fld id="{79084D12-9971-4D85-90B6-EA2E8E4DAC18}" type="datetimeFigureOut">
               <a:rPr lang="en-GB" smtClean="0"/>
-              <a:t>06/09/2019</a:t>
+              <a:t>11/09/2019</a:t>
             </a:fld>
             <a:endParaRPr lang="en-GB"/>
           </a:p>
@@ -1847,7 +1850,7 @@
           <a:p>
             <a:fld id="{79084D12-9971-4D85-90B6-EA2E8E4DAC18}" type="datetimeFigureOut">
               <a:rPr lang="en-GB" smtClean="0"/>
-              <a:t>06/09/2019</a:t>
+              <a:t>11/09/2019</a:t>
             </a:fld>
             <a:endParaRPr lang="en-GB"/>
           </a:p>
@@ -1989,7 +1992,7 @@
           <a:p>
             <a:fld id="{79084D12-9971-4D85-90B6-EA2E8E4DAC18}" type="datetimeFigureOut">
               <a:rPr lang="en-GB" smtClean="0"/>
-              <a:t>06/09/2019</a:t>
+              <a:t>11/09/2019</a:t>
             </a:fld>
             <a:endParaRPr lang="en-GB"/>
           </a:p>
@@ -2102,7 +2105,7 @@
           <a:p>
             <a:fld id="{79084D12-9971-4D85-90B6-EA2E8E4DAC18}" type="datetimeFigureOut">
               <a:rPr lang="en-GB" smtClean="0"/>
-              <a:t>06/09/2019</a:t>
+              <a:t>11/09/2019</a:t>
             </a:fld>
             <a:endParaRPr lang="en-GB"/>
           </a:p>
@@ -2415,7 +2418,7 @@
           <a:p>
             <a:fld id="{79084D12-9971-4D85-90B6-EA2E8E4DAC18}" type="datetimeFigureOut">
               <a:rPr lang="en-GB" smtClean="0"/>
-              <a:t>06/09/2019</a:t>
+              <a:t>11/09/2019</a:t>
             </a:fld>
             <a:endParaRPr lang="en-GB"/>
           </a:p>
@@ -2704,7 +2707,7 @@
           <a:p>
             <a:fld id="{79084D12-9971-4D85-90B6-EA2E8E4DAC18}" type="datetimeFigureOut">
               <a:rPr lang="en-GB" smtClean="0"/>
-              <a:t>06/09/2019</a:t>
+              <a:t>11/09/2019</a:t>
             </a:fld>
             <a:endParaRPr lang="en-GB"/>
           </a:p>
@@ -2947,7 +2950,7 @@
           <a:p>
             <a:fld id="{79084D12-9971-4D85-90B6-EA2E8E4DAC18}" type="datetimeFigureOut">
               <a:rPr lang="en-GB" smtClean="0"/>
-              <a:t>06/09/2019</a:t>
+              <a:t>11/09/2019</a:t>
             </a:fld>
             <a:endParaRPr lang="en-GB"/>
           </a:p>
@@ -3485,7 +3488,7 @@
           <p:cNvPr id="2" name="Title 1">
             <a:extLst>
               <a:ext uri="{FF2B5EF4-FFF2-40B4-BE49-F238E27FC236}">
-                <a16:creationId xmlns:a16="http://schemas.microsoft.com/office/drawing/2014/main" id="{A2ED69CF-D55A-47F3-AC1E-B1963DA5F58C}"/>
+                <a16:creationId xmlns:a16="http://schemas.microsoft.com/office/drawing/2014/main" id="{6112DBD7-8FA0-4CD5-AE7C-7555794C5262}"/>
               </a:ext>
             </a:extLst>
           </p:cNvPr>
@@ -3503,7 +3506,7 @@
           <a:p>
             <a:r>
               <a:rPr lang="en-GB" dirty="0"/>
-              <a:t>Twilio – Creating a Flow </a:t>
+              <a:t>Twilio – Buy a Number</a:t>
             </a:r>
           </a:p>
         </p:txBody>
@@ -3513,7 +3516,7 @@
           <p:cNvPr id="4" name="Content Placeholder 3">
             <a:extLst>
               <a:ext uri="{FF2B5EF4-FFF2-40B4-BE49-F238E27FC236}">
-                <a16:creationId xmlns:a16="http://schemas.microsoft.com/office/drawing/2014/main" id="{3DA99BEC-B4F7-4EE8-8961-994978E1B8AC}"/>
+                <a16:creationId xmlns:a16="http://schemas.microsoft.com/office/drawing/2014/main" id="{6B608159-39B4-4E7E-8113-85001679BF79}"/>
               </a:ext>
             </a:extLst>
           </p:cNvPr>
@@ -3532,8 +3535,8 @@
         </p:blipFill>
         <p:spPr>
           <a:xfrm>
-            <a:off x="838200" y="1567560"/>
-            <a:ext cx="4237653" cy="2199698"/>
+            <a:off x="838200" y="2097202"/>
+            <a:ext cx="10515600" cy="3808183"/>
           </a:xfrm>
           <a:prstGeom prst="rect">
             <a:avLst/>
@@ -3542,10 +3545,10 @@
       </p:pic>
       <p:sp>
         <p:nvSpPr>
-          <p:cNvPr id="5" name="TextBox 4">
-            <a:extLst>
-              <a:ext uri="{FF2B5EF4-FFF2-40B4-BE49-F238E27FC236}">
-                <a16:creationId xmlns:a16="http://schemas.microsoft.com/office/drawing/2014/main" id="{9D834F81-4885-45AD-A902-1DE590BD91CA}"/>
+          <p:cNvPr id="3" name="TextBox 2">
+            <a:extLst>
+              <a:ext uri="{FF2B5EF4-FFF2-40B4-BE49-F238E27FC236}">
+                <a16:creationId xmlns:a16="http://schemas.microsoft.com/office/drawing/2014/main" id="{605E0E11-4438-4ADF-8F81-9ACC8BDB626C}"/>
               </a:ext>
             </a:extLst>
           </p:cNvPr>
@@ -3554,8 +3557,8 @@
         </p:nvSpPr>
         <p:spPr>
           <a:xfrm>
-            <a:off x="5262465" y="1567543"/>
-            <a:ext cx="2836506" cy="369332"/>
+            <a:off x="1035698" y="1455576"/>
+            <a:ext cx="10515600" cy="646331"/>
           </a:xfrm>
           <a:prstGeom prst="rect">
             <a:avLst/>
@@ -3570,344 +3573,7 @@
           <a:p>
             <a:r>
               <a:rPr lang="en-GB" dirty="0"/>
-              <a:t>Click to design a flow</a:t>
-            </a:r>
-          </a:p>
-        </p:txBody>
-      </p:sp>
-      <p:cxnSp>
-        <p:nvCxnSpPr>
-          <p:cNvPr id="6" name="Straight Arrow Connector 5">
-            <a:extLst>
-              <a:ext uri="{FF2B5EF4-FFF2-40B4-BE49-F238E27FC236}">
-                <a16:creationId xmlns:a16="http://schemas.microsoft.com/office/drawing/2014/main" id="{B29E8D30-1E08-4349-8189-B601F47C5A1D}"/>
-              </a:ext>
-            </a:extLst>
-          </p:cNvPr>
-          <p:cNvCxnSpPr>
-            <a:cxnSpLocks/>
-            <a:stCxn id="5" idx="1"/>
-          </p:cNvCxnSpPr>
-          <p:nvPr/>
-        </p:nvCxnSpPr>
-        <p:spPr>
-          <a:xfrm flipH="1">
-            <a:off x="3564295" y="1752209"/>
-            <a:ext cx="1698170" cy="552452"/>
-          </a:xfrm>
-          <a:prstGeom prst="straightConnector1">
-            <a:avLst/>
-          </a:prstGeom>
-          <a:ln>
-            <a:solidFill>
-              <a:srgbClr val="FF0000"/>
-            </a:solidFill>
-            <a:tailEnd type="triangle"/>
-          </a:ln>
-        </p:spPr>
-        <p:style>
-          <a:lnRef idx="1">
-            <a:schemeClr val="accent1"/>
-          </a:lnRef>
-          <a:fillRef idx="0">
-            <a:schemeClr val="accent1"/>
-          </a:fillRef>
-          <a:effectRef idx="0">
-            <a:schemeClr val="accent1"/>
-          </a:effectRef>
-          <a:fontRef idx="minor">
-            <a:schemeClr val="tx1"/>
-          </a:fontRef>
-        </p:style>
-      </p:cxnSp>
-      <p:pic>
-        <p:nvPicPr>
-          <p:cNvPr id="9" name="Picture 8">
-            <a:extLst>
-              <a:ext uri="{FF2B5EF4-FFF2-40B4-BE49-F238E27FC236}">
-                <a16:creationId xmlns:a16="http://schemas.microsoft.com/office/drawing/2014/main" id="{D22188D4-F4B5-423F-B194-0014858D01A2}"/>
-              </a:ext>
-            </a:extLst>
-          </p:cNvPr>
-          <p:cNvPicPr>
-            <a:picLocks noChangeAspect="1"/>
-          </p:cNvPicPr>
-          <p:nvPr/>
-        </p:nvPicPr>
-        <p:blipFill>
-          <a:blip r:embed="rId3"/>
-          <a:stretch>
-            <a:fillRect/>
-          </a:stretch>
-        </p:blipFill>
-        <p:spPr>
-          <a:xfrm>
-            <a:off x="2405257" y="4721677"/>
-            <a:ext cx="4458154" cy="1604477"/>
-          </a:xfrm>
-          <a:prstGeom prst="rect">
-            <a:avLst/>
-          </a:prstGeom>
-        </p:spPr>
-      </p:pic>
-      <p:sp>
-        <p:nvSpPr>
-          <p:cNvPr id="10" name="TextBox 9">
-            <a:extLst>
-              <a:ext uri="{FF2B5EF4-FFF2-40B4-BE49-F238E27FC236}">
-                <a16:creationId xmlns:a16="http://schemas.microsoft.com/office/drawing/2014/main" id="{E883C849-E37D-4843-94F9-C83DE737EDBB}"/>
-              </a:ext>
-            </a:extLst>
-          </p:cNvPr>
-          <p:cNvSpPr txBox="1"/>
-          <p:nvPr/>
-        </p:nvSpPr>
-        <p:spPr>
-          <a:xfrm>
-            <a:off x="2371660" y="4075346"/>
-            <a:ext cx="4525347" cy="646331"/>
-          </a:xfrm>
-          <a:prstGeom prst="rect">
-            <a:avLst/>
-          </a:prstGeom>
-          <a:noFill/>
-        </p:spPr>
-        <p:txBody>
-          <a:bodyPr wrap="square" rtlCol="0">
-            <a:spAutoFit/>
-          </a:bodyPr>
-          <a:lstStyle/>
-          <a:p>
-            <a:r>
-              <a:rPr lang="en-GB" dirty="0"/>
-              <a:t>Flows start with a trigger, our trigger is the REST API</a:t>
-            </a:r>
-          </a:p>
-        </p:txBody>
-      </p:sp>
-      <p:sp>
-        <p:nvSpPr>
-          <p:cNvPr id="11" name="TextBox 10">
-            <a:extLst>
-              <a:ext uri="{FF2B5EF4-FFF2-40B4-BE49-F238E27FC236}">
-                <a16:creationId xmlns:a16="http://schemas.microsoft.com/office/drawing/2014/main" id="{9B0D8241-5C30-45EE-B59B-A2182F932DE8}"/>
-              </a:ext>
-            </a:extLst>
-          </p:cNvPr>
-          <p:cNvSpPr txBox="1"/>
-          <p:nvPr/>
-        </p:nvSpPr>
-        <p:spPr>
-          <a:xfrm>
-            <a:off x="8658808" y="1398283"/>
-            <a:ext cx="3368351" cy="369332"/>
-          </a:xfrm>
-          <a:prstGeom prst="rect">
-            <a:avLst/>
-          </a:prstGeom>
-          <a:noFill/>
-        </p:spPr>
-        <p:txBody>
-          <a:bodyPr wrap="square" rtlCol="0">
-            <a:spAutoFit/>
-          </a:bodyPr>
-          <a:lstStyle/>
-          <a:p>
-            <a:r>
-              <a:rPr lang="en-GB" dirty="0"/>
-              <a:t>Trigger properties</a:t>
-            </a:r>
-          </a:p>
-        </p:txBody>
-      </p:sp>
-      <p:pic>
-        <p:nvPicPr>
-          <p:cNvPr id="12" name="Picture 11">
-            <a:extLst>
-              <a:ext uri="{FF2B5EF4-FFF2-40B4-BE49-F238E27FC236}">
-                <a16:creationId xmlns:a16="http://schemas.microsoft.com/office/drawing/2014/main" id="{3D49C5F5-0046-4519-A9AC-F6803EE30C0C}"/>
-              </a:ext>
-            </a:extLst>
-          </p:cNvPr>
-          <p:cNvPicPr>
-            <a:picLocks noChangeAspect="1"/>
-          </p:cNvPicPr>
-          <p:nvPr/>
-        </p:nvPicPr>
-        <p:blipFill>
-          <a:blip r:embed="rId4"/>
-          <a:stretch>
-            <a:fillRect/>
-          </a:stretch>
-        </p:blipFill>
-        <p:spPr>
-          <a:xfrm>
-            <a:off x="8591453" y="1835143"/>
-            <a:ext cx="2950513" cy="2374981"/>
-          </a:xfrm>
-          <a:prstGeom prst="rect">
-            <a:avLst/>
-          </a:prstGeom>
-        </p:spPr>
-      </p:pic>
-      <p:cxnSp>
-        <p:nvCxnSpPr>
-          <p:cNvPr id="13" name="Straight Arrow Connector 12">
-            <a:extLst>
-              <a:ext uri="{FF2B5EF4-FFF2-40B4-BE49-F238E27FC236}">
-                <a16:creationId xmlns:a16="http://schemas.microsoft.com/office/drawing/2014/main" id="{6A9F843B-7428-4EDA-8C47-8FA959374815}"/>
-              </a:ext>
-            </a:extLst>
-          </p:cNvPr>
-          <p:cNvCxnSpPr>
-            <a:cxnSpLocks/>
-          </p:cNvCxnSpPr>
-          <p:nvPr/>
-        </p:nvCxnSpPr>
-        <p:spPr>
-          <a:xfrm flipV="1">
-            <a:off x="8948057" y="4075347"/>
-            <a:ext cx="2090057" cy="552637"/>
-          </a:xfrm>
-          <a:prstGeom prst="straightConnector1">
-            <a:avLst/>
-          </a:prstGeom>
-          <a:ln>
-            <a:solidFill>
-              <a:srgbClr val="FF0000"/>
-            </a:solidFill>
-            <a:tailEnd type="triangle"/>
-          </a:ln>
-        </p:spPr>
-        <p:style>
-          <a:lnRef idx="1">
-            <a:schemeClr val="accent1"/>
-          </a:lnRef>
-          <a:fillRef idx="0">
-            <a:schemeClr val="accent1"/>
-          </a:fillRef>
-          <a:effectRef idx="0">
-            <a:schemeClr val="accent1"/>
-          </a:effectRef>
-          <a:fontRef idx="minor">
-            <a:schemeClr val="tx1"/>
-          </a:fontRef>
-        </p:style>
-      </p:cxnSp>
-      <p:sp>
-        <p:nvSpPr>
-          <p:cNvPr id="16" name="TextBox 15">
-            <a:extLst>
-              <a:ext uri="{FF2B5EF4-FFF2-40B4-BE49-F238E27FC236}">
-                <a16:creationId xmlns:a16="http://schemas.microsoft.com/office/drawing/2014/main" id="{4158EE01-5E2A-4742-9065-C3F9FE659402}"/>
-              </a:ext>
-            </a:extLst>
-          </p:cNvPr>
-          <p:cNvSpPr txBox="1"/>
-          <p:nvPr/>
-        </p:nvSpPr>
-        <p:spPr>
-          <a:xfrm>
-            <a:off x="8658808" y="4721677"/>
-            <a:ext cx="3368351" cy="923330"/>
-          </a:xfrm>
-          <a:prstGeom prst="rect">
-            <a:avLst/>
-          </a:prstGeom>
-          <a:noFill/>
-        </p:spPr>
-        <p:txBody>
-          <a:bodyPr wrap="square" rtlCol="0">
-            <a:spAutoFit/>
-          </a:bodyPr>
-          <a:lstStyle/>
-          <a:p>
-            <a:r>
-              <a:rPr lang="en-GB" dirty="0"/>
-              <a:t>Copy and paste this URL (ending </a:t>
-            </a:r>
-          </a:p>
-          <a:p>
-            <a:r>
-              <a:rPr lang="en-GB" dirty="0"/>
-              <a:t>…/Executions) into the code of the Redirector.</a:t>
-            </a:r>
-          </a:p>
-        </p:txBody>
-      </p:sp>
-      <p:cxnSp>
-        <p:nvCxnSpPr>
-          <p:cNvPr id="18" name="Straight Arrow Connector 17">
-            <a:extLst>
-              <a:ext uri="{FF2B5EF4-FFF2-40B4-BE49-F238E27FC236}">
-                <a16:creationId xmlns:a16="http://schemas.microsoft.com/office/drawing/2014/main" id="{3D02D14E-D55B-4794-BC93-CF6197D4DC51}"/>
-              </a:ext>
-            </a:extLst>
-          </p:cNvPr>
-          <p:cNvCxnSpPr/>
-          <p:nvPr/>
-        </p:nvCxnSpPr>
-        <p:spPr>
-          <a:xfrm>
-            <a:off x="7912359" y="3051110"/>
-            <a:ext cx="1110343" cy="195943"/>
-          </a:xfrm>
-          <a:prstGeom prst="straightConnector1">
-            <a:avLst/>
-          </a:prstGeom>
-          <a:ln>
-            <a:solidFill>
-              <a:srgbClr val="FF0000"/>
-            </a:solidFill>
-            <a:tailEnd type="triangle"/>
-          </a:ln>
-        </p:spPr>
-        <p:style>
-          <a:lnRef idx="1">
-            <a:schemeClr val="accent1"/>
-          </a:lnRef>
-          <a:fillRef idx="0">
-            <a:schemeClr val="accent1"/>
-          </a:fillRef>
-          <a:effectRef idx="0">
-            <a:schemeClr val="accent1"/>
-          </a:effectRef>
-          <a:fontRef idx="minor">
-            <a:schemeClr val="tx1"/>
-          </a:fontRef>
-        </p:style>
-      </p:cxnSp>
-      <p:sp>
-        <p:nvSpPr>
-          <p:cNvPr id="19" name="TextBox 18">
-            <a:extLst>
-              <a:ext uri="{FF2B5EF4-FFF2-40B4-BE49-F238E27FC236}">
-                <a16:creationId xmlns:a16="http://schemas.microsoft.com/office/drawing/2014/main" id="{62EFCBB2-2658-4EDC-AA49-0B61E05F1BD7}"/>
-              </a:ext>
-            </a:extLst>
-          </p:cNvPr>
-          <p:cNvSpPr txBox="1"/>
-          <p:nvPr/>
-        </p:nvSpPr>
-        <p:spPr>
-          <a:xfrm>
-            <a:off x="6540759" y="2696547"/>
-            <a:ext cx="1558212" cy="646331"/>
-          </a:xfrm>
-          <a:prstGeom prst="rect">
-            <a:avLst/>
-          </a:prstGeom>
-          <a:noFill/>
-        </p:spPr>
-        <p:txBody>
-          <a:bodyPr wrap="square" rtlCol="0">
-            <a:spAutoFit/>
-          </a:bodyPr>
-          <a:lstStyle/>
-          <a:p>
-            <a:r>
-              <a:rPr lang="en-GB" dirty="0"/>
-              <a:t>Name your flow</a:t>
+              <a:t>Select your country and click ‘Search’. Add further search parameters if you are looking for a particular number sequence or letter codes (e.g. 1-123-SCADA !)</a:t>
             </a:r>
           </a:p>
         </p:txBody>
@@ -3915,7 +3581,7 @@
     </p:spTree>
     <p:extLst>
       <p:ext uri="{BB962C8B-B14F-4D97-AF65-F5344CB8AC3E}">
-        <p14:creationId xmlns:p14="http://schemas.microsoft.com/office/powerpoint/2010/main" val="3465332058"/>
+        <p14:creationId xmlns:p14="http://schemas.microsoft.com/office/powerpoint/2010/main" val="653034515"/>
       </p:ext>
     </p:extLst>
   </p:cSld>
@@ -3947,7 +3613,7 @@
           <p:cNvPr id="2" name="Title 1">
             <a:extLst>
               <a:ext uri="{FF2B5EF4-FFF2-40B4-BE49-F238E27FC236}">
-                <a16:creationId xmlns:a16="http://schemas.microsoft.com/office/drawing/2014/main" id="{8A29789C-8782-4BDF-BEB8-EBE92DC12985}"/>
+                <a16:creationId xmlns:a16="http://schemas.microsoft.com/office/drawing/2014/main" id="{764BDB98-D4A7-4D6F-B468-8302CC0C3A04}"/>
               </a:ext>
             </a:extLst>
           </p:cNvPr>
@@ -3965,63 +3631,26 @@
           <a:p>
             <a:r>
               <a:rPr lang="en-GB" dirty="0"/>
-              <a:t>Twilio – Add a call</a:t>
-            </a:r>
-          </a:p>
-        </p:txBody>
-      </p:sp>
-      <p:sp>
-        <p:nvSpPr>
-          <p:cNvPr id="3" name="Content Placeholder 2">
-            <a:extLst>
-              <a:ext uri="{FF2B5EF4-FFF2-40B4-BE49-F238E27FC236}">
-                <a16:creationId xmlns:a16="http://schemas.microsoft.com/office/drawing/2014/main" id="{C21D2050-0B85-4ED9-9334-C4A3E1566CC8}"/>
-              </a:ext>
-            </a:extLst>
-          </p:cNvPr>
-          <p:cNvSpPr>
-            <a:spLocks noGrp="1"/>
-          </p:cNvSpPr>
-          <p:nvPr>
-            <p:ph idx="1"/>
-          </p:nvPr>
-        </p:nvSpPr>
-        <p:spPr>
-          <a:xfrm>
-            <a:off x="2211355" y="3806889"/>
-            <a:ext cx="5439748" cy="2685986"/>
-          </a:xfrm>
-        </p:spPr>
-        <p:txBody>
-          <a:bodyPr/>
-          <a:lstStyle/>
-          <a:p>
-            <a:r>
-              <a:rPr lang="en-GB" dirty="0"/>
-              <a:t>Connect up to API call</a:t>
-            </a:r>
-          </a:p>
-          <a:p>
-            <a:r>
-              <a:rPr lang="en-GB" dirty="0"/>
-              <a:t>Set properties</a:t>
+              <a:t>Twilio – Verified Caller IDs</a:t>
             </a:r>
           </a:p>
         </p:txBody>
       </p:sp>
       <p:pic>
         <p:nvPicPr>
-          <p:cNvPr id="4" name="Picture 3">
-            <a:extLst>
-              <a:ext uri="{FF2B5EF4-FFF2-40B4-BE49-F238E27FC236}">
-                <a16:creationId xmlns:a16="http://schemas.microsoft.com/office/drawing/2014/main" id="{9D7DD672-F85D-481A-A966-01E9297A707A}"/>
+          <p:cNvPr id="4" name="Content Placeholder 3">
+            <a:extLst>
+              <a:ext uri="{FF2B5EF4-FFF2-40B4-BE49-F238E27FC236}">
+                <a16:creationId xmlns:a16="http://schemas.microsoft.com/office/drawing/2014/main" id="{E0CC5DA5-72D0-4460-8315-B903153CB523}"/>
               </a:ext>
             </a:extLst>
           </p:cNvPr>
           <p:cNvPicPr>
-            <a:picLocks noChangeAspect="1"/>
+            <a:picLocks noGrp="1" noChangeAspect="1"/>
           </p:cNvPicPr>
-          <p:nvPr/>
+          <p:nvPr>
+            <p:ph idx="1"/>
+          </p:nvPr>
         </p:nvPicPr>
         <p:blipFill>
           <a:blip r:embed="rId2"/>
@@ -4031,8 +3660,8 @@
         </p:blipFill>
         <p:spPr>
           <a:xfrm>
-            <a:off x="688424" y="1545674"/>
-            <a:ext cx="3705225" cy="2143125"/>
+            <a:off x="838200" y="1690688"/>
+            <a:ext cx="2547345" cy="4351338"/>
           </a:xfrm>
           <a:prstGeom prst="rect">
             <a:avLst/>
@@ -4044,7 +3673,7 @@
           <p:cNvPr id="5" name="Picture 4">
             <a:extLst>
               <a:ext uri="{FF2B5EF4-FFF2-40B4-BE49-F238E27FC236}">
-                <a16:creationId xmlns:a16="http://schemas.microsoft.com/office/drawing/2014/main" id="{E5BB4F61-6961-4A61-820B-A7942F61C8DB}"/>
+                <a16:creationId xmlns:a16="http://schemas.microsoft.com/office/drawing/2014/main" id="{5E752AE5-63F0-41E0-81BF-6B994844C6DE}"/>
               </a:ext>
             </a:extLst>
           </p:cNvPr>
@@ -4061,18 +3690,59 @@
         </p:blipFill>
         <p:spPr>
           <a:xfrm>
-            <a:off x="8130268" y="1368199"/>
-            <a:ext cx="2646589" cy="2902934"/>
+            <a:off x="3385545" y="1690688"/>
+            <a:ext cx="7943850" cy="1933575"/>
           </a:xfrm>
           <a:prstGeom prst="rect">
             <a:avLst/>
           </a:prstGeom>
         </p:spPr>
       </p:pic>
+      <p:sp>
+        <p:nvSpPr>
+          <p:cNvPr id="6" name="TextBox 5">
+            <a:extLst>
+              <a:ext uri="{FF2B5EF4-FFF2-40B4-BE49-F238E27FC236}">
+                <a16:creationId xmlns:a16="http://schemas.microsoft.com/office/drawing/2014/main" id="{3511C411-B72A-4103-ACA0-B020B5D47741}"/>
+              </a:ext>
+            </a:extLst>
+          </p:cNvPr>
+          <p:cNvSpPr txBox="1"/>
+          <p:nvPr/>
+        </p:nvSpPr>
+        <p:spPr>
+          <a:xfrm>
+            <a:off x="3480318" y="3741576"/>
+            <a:ext cx="8201609" cy="646331"/>
+          </a:xfrm>
+          <a:prstGeom prst="rect">
+            <a:avLst/>
+          </a:prstGeom>
+          <a:noFill/>
+        </p:spPr>
+        <p:txBody>
+          <a:bodyPr wrap="square" rtlCol="0">
+            <a:spAutoFit/>
+          </a:bodyPr>
+          <a:lstStyle/>
+          <a:p>
+            <a:r>
+              <a:rPr lang="en-GB" dirty="0"/>
+              <a:t>Twilio, in free trial mode, will not let you send to just any number.</a:t>
+            </a:r>
+          </a:p>
+          <a:p>
+            <a:r>
+              <a:rPr lang="en-GB" dirty="0"/>
+              <a:t>You need to add numbers here in order to be able to test this system.</a:t>
+            </a:r>
+          </a:p>
+        </p:txBody>
+      </p:sp>
     </p:spTree>
     <p:extLst>
       <p:ext uri="{BB962C8B-B14F-4D97-AF65-F5344CB8AC3E}">
-        <p14:creationId xmlns:p14="http://schemas.microsoft.com/office/powerpoint/2010/main" val="4142926073"/>
+        <p14:creationId xmlns:p14="http://schemas.microsoft.com/office/powerpoint/2010/main" val="775896754"/>
       </p:ext>
     </p:extLst>
   </p:cSld>
@@ -4104,7 +3774,7 @@
           <p:cNvPr id="2" name="Title 1">
             <a:extLst>
               <a:ext uri="{FF2B5EF4-FFF2-40B4-BE49-F238E27FC236}">
-                <a16:creationId xmlns:a16="http://schemas.microsoft.com/office/drawing/2014/main" id="{55E994A2-4892-4C3C-96F9-78667ACEF513}"/>
+                <a16:creationId xmlns:a16="http://schemas.microsoft.com/office/drawing/2014/main" id="{A2ED69CF-D55A-47F3-AC1E-B1963DA5F58C}"/>
               </a:ext>
             </a:extLst>
           </p:cNvPr>
@@ -4122,72 +3792,26 @@
           <a:p>
             <a:r>
               <a:rPr lang="en-GB" dirty="0"/>
-              <a:t>Twilio – Add ‘Say’</a:t>
-            </a:r>
-          </a:p>
-        </p:txBody>
-      </p:sp>
-      <p:sp>
-        <p:nvSpPr>
-          <p:cNvPr id="3" name="Content Placeholder 2">
-            <a:extLst>
-              <a:ext uri="{FF2B5EF4-FFF2-40B4-BE49-F238E27FC236}">
-                <a16:creationId xmlns:a16="http://schemas.microsoft.com/office/drawing/2014/main" id="{AA9824A0-2436-4E16-BCDB-E72B5B061223}"/>
-              </a:ext>
-            </a:extLst>
-          </p:cNvPr>
-          <p:cNvSpPr>
-            <a:spLocks noGrp="1"/>
-          </p:cNvSpPr>
-          <p:nvPr>
-            <p:ph idx="1"/>
-          </p:nvPr>
-        </p:nvSpPr>
-        <p:spPr>
-          <a:xfrm>
-            <a:off x="838199" y="4217437"/>
-            <a:ext cx="10946363" cy="1959526"/>
-          </a:xfrm>
-        </p:spPr>
-        <p:txBody>
-          <a:bodyPr/>
-          <a:lstStyle/>
-          <a:p>
-            <a:r>
-              <a:rPr lang="en-GB" dirty="0"/>
-              <a:t>Text to say has your choice of introductory text followed by the message parameter:</a:t>
-            </a:r>
-          </a:p>
-          <a:p>
-            <a:pPr lvl="1"/>
-            <a:r>
-              <a:rPr lang="en-GB" dirty="0"/>
-              <a:t>Telemetry alarm. {{</a:t>
-            </a:r>
-            <a:r>
-              <a:rPr lang="en-GB" dirty="0" err="1"/>
-              <a:t>flow.data.mymessage</a:t>
-            </a:r>
-            <a:r>
-              <a:rPr lang="en-GB" dirty="0"/>
-              <a:t>}} .</a:t>
+              <a:t>Twilio – Creating a Flow </a:t>
             </a:r>
           </a:p>
         </p:txBody>
       </p:sp>
       <p:pic>
         <p:nvPicPr>
-          <p:cNvPr id="4" name="Picture 3">
-            <a:extLst>
-              <a:ext uri="{FF2B5EF4-FFF2-40B4-BE49-F238E27FC236}">
-                <a16:creationId xmlns:a16="http://schemas.microsoft.com/office/drawing/2014/main" id="{46DC3841-91D4-44E0-B00B-1BAB4375B806}"/>
+          <p:cNvPr id="4" name="Content Placeholder 3">
+            <a:extLst>
+              <a:ext uri="{FF2B5EF4-FFF2-40B4-BE49-F238E27FC236}">
+                <a16:creationId xmlns:a16="http://schemas.microsoft.com/office/drawing/2014/main" id="{3DA99BEC-B4F7-4EE8-8961-994978E1B8AC}"/>
               </a:ext>
             </a:extLst>
           </p:cNvPr>
           <p:cNvPicPr>
-            <a:picLocks noChangeAspect="1"/>
+            <a:picLocks noGrp="1" noChangeAspect="1"/>
           </p:cNvPicPr>
-          <p:nvPr/>
+          <p:nvPr>
+            <p:ph idx="1"/>
+          </p:nvPr>
         </p:nvPicPr>
         <p:blipFill>
           <a:blip r:embed="rId2"/>
@@ -4197,20 +3821,100 @@
         </p:blipFill>
         <p:spPr>
           <a:xfrm>
-            <a:off x="4111107" y="1690688"/>
-            <a:ext cx="3409950" cy="1885950"/>
+            <a:off x="838200" y="1567560"/>
+            <a:ext cx="4237653" cy="2199698"/>
           </a:xfrm>
           <a:prstGeom prst="rect">
             <a:avLst/>
           </a:prstGeom>
         </p:spPr>
       </p:pic>
+      <p:sp>
+        <p:nvSpPr>
+          <p:cNvPr id="5" name="TextBox 4">
+            <a:extLst>
+              <a:ext uri="{FF2B5EF4-FFF2-40B4-BE49-F238E27FC236}">
+                <a16:creationId xmlns:a16="http://schemas.microsoft.com/office/drawing/2014/main" id="{9D834F81-4885-45AD-A902-1DE590BD91CA}"/>
+              </a:ext>
+            </a:extLst>
+          </p:cNvPr>
+          <p:cNvSpPr txBox="1"/>
+          <p:nvPr/>
+        </p:nvSpPr>
+        <p:spPr>
+          <a:xfrm>
+            <a:off x="5262465" y="1567543"/>
+            <a:ext cx="2836506" cy="369332"/>
+          </a:xfrm>
+          <a:prstGeom prst="rect">
+            <a:avLst/>
+          </a:prstGeom>
+          <a:noFill/>
+        </p:spPr>
+        <p:txBody>
+          <a:bodyPr wrap="square" rtlCol="0">
+            <a:spAutoFit/>
+          </a:bodyPr>
+          <a:lstStyle/>
+          <a:p>
+            <a:r>
+              <a:rPr lang="en-GB" dirty="0"/>
+              <a:t>Click to design a flow</a:t>
+            </a:r>
+          </a:p>
+        </p:txBody>
+      </p:sp>
+      <p:cxnSp>
+        <p:nvCxnSpPr>
+          <p:cNvPr id="6" name="Straight Arrow Connector 5">
+            <a:extLst>
+              <a:ext uri="{FF2B5EF4-FFF2-40B4-BE49-F238E27FC236}">
+                <a16:creationId xmlns:a16="http://schemas.microsoft.com/office/drawing/2014/main" id="{B29E8D30-1E08-4349-8189-B601F47C5A1D}"/>
+              </a:ext>
+            </a:extLst>
+          </p:cNvPr>
+          <p:cNvCxnSpPr>
+            <a:cxnSpLocks/>
+            <a:stCxn id="5" idx="1"/>
+          </p:cNvCxnSpPr>
+          <p:nvPr/>
+        </p:nvCxnSpPr>
+        <p:spPr>
+          <a:xfrm flipH="1">
+            <a:off x="3564295" y="1752209"/>
+            <a:ext cx="1698170" cy="552452"/>
+          </a:xfrm>
+          <a:prstGeom prst="straightConnector1">
+            <a:avLst/>
+          </a:prstGeom>
+          <a:ln>
+            <a:solidFill>
+              <a:srgbClr val="FF0000"/>
+            </a:solidFill>
+            <a:tailEnd type="triangle"/>
+          </a:ln>
+        </p:spPr>
+        <p:style>
+          <a:lnRef idx="1">
+            <a:schemeClr val="accent1"/>
+          </a:lnRef>
+          <a:fillRef idx="0">
+            <a:schemeClr val="accent1"/>
+          </a:fillRef>
+          <a:effectRef idx="0">
+            <a:schemeClr val="accent1"/>
+          </a:effectRef>
+          <a:fontRef idx="minor">
+            <a:schemeClr val="tx1"/>
+          </a:fontRef>
+        </p:style>
+      </p:cxnSp>
       <p:pic>
         <p:nvPicPr>
-          <p:cNvPr id="5" name="Picture 4">
-            <a:extLst>
-              <a:ext uri="{FF2B5EF4-FFF2-40B4-BE49-F238E27FC236}">
-                <a16:creationId xmlns:a16="http://schemas.microsoft.com/office/drawing/2014/main" id="{6B0300B0-B5A5-4A16-AC62-FFE96D4B5050}"/>
+          <p:cNvPr id="9" name="Picture 8">
+            <a:extLst>
+              <a:ext uri="{FF2B5EF4-FFF2-40B4-BE49-F238E27FC236}">
+                <a16:creationId xmlns:a16="http://schemas.microsoft.com/office/drawing/2014/main" id="{D22188D4-F4B5-423F-B194-0014858D01A2}"/>
               </a:ext>
             </a:extLst>
           </p:cNvPr>
@@ -4227,18 +3931,280 @@
         </p:blipFill>
         <p:spPr>
           <a:xfrm>
-            <a:off x="8626858" y="798739"/>
-            <a:ext cx="2526333" cy="3092126"/>
+            <a:off x="2405257" y="4721677"/>
+            <a:ext cx="4458154" cy="1604477"/>
           </a:xfrm>
           <a:prstGeom prst="rect">
             <a:avLst/>
           </a:prstGeom>
         </p:spPr>
       </p:pic>
+      <p:sp>
+        <p:nvSpPr>
+          <p:cNvPr id="10" name="TextBox 9">
+            <a:extLst>
+              <a:ext uri="{FF2B5EF4-FFF2-40B4-BE49-F238E27FC236}">
+                <a16:creationId xmlns:a16="http://schemas.microsoft.com/office/drawing/2014/main" id="{E883C849-E37D-4843-94F9-C83DE737EDBB}"/>
+              </a:ext>
+            </a:extLst>
+          </p:cNvPr>
+          <p:cNvSpPr txBox="1"/>
+          <p:nvPr/>
+        </p:nvSpPr>
+        <p:spPr>
+          <a:xfrm>
+            <a:off x="2371660" y="4075346"/>
+            <a:ext cx="4525347" cy="646331"/>
+          </a:xfrm>
+          <a:prstGeom prst="rect">
+            <a:avLst/>
+          </a:prstGeom>
+          <a:noFill/>
+        </p:spPr>
+        <p:txBody>
+          <a:bodyPr wrap="square" rtlCol="0">
+            <a:spAutoFit/>
+          </a:bodyPr>
+          <a:lstStyle/>
+          <a:p>
+            <a:r>
+              <a:rPr lang="en-GB" dirty="0"/>
+              <a:t>Flows start with a trigger, our trigger is the REST API</a:t>
+            </a:r>
+          </a:p>
+        </p:txBody>
+      </p:sp>
+      <p:sp>
+        <p:nvSpPr>
+          <p:cNvPr id="11" name="TextBox 10">
+            <a:extLst>
+              <a:ext uri="{FF2B5EF4-FFF2-40B4-BE49-F238E27FC236}">
+                <a16:creationId xmlns:a16="http://schemas.microsoft.com/office/drawing/2014/main" id="{9B0D8241-5C30-45EE-B59B-A2182F932DE8}"/>
+              </a:ext>
+            </a:extLst>
+          </p:cNvPr>
+          <p:cNvSpPr txBox="1"/>
+          <p:nvPr/>
+        </p:nvSpPr>
+        <p:spPr>
+          <a:xfrm>
+            <a:off x="8658808" y="1398283"/>
+            <a:ext cx="3368351" cy="369332"/>
+          </a:xfrm>
+          <a:prstGeom prst="rect">
+            <a:avLst/>
+          </a:prstGeom>
+          <a:noFill/>
+        </p:spPr>
+        <p:txBody>
+          <a:bodyPr wrap="square" rtlCol="0">
+            <a:spAutoFit/>
+          </a:bodyPr>
+          <a:lstStyle/>
+          <a:p>
+            <a:r>
+              <a:rPr lang="en-GB" dirty="0"/>
+              <a:t>Trigger properties</a:t>
+            </a:r>
+          </a:p>
+        </p:txBody>
+      </p:sp>
+      <p:pic>
+        <p:nvPicPr>
+          <p:cNvPr id="12" name="Picture 11">
+            <a:extLst>
+              <a:ext uri="{FF2B5EF4-FFF2-40B4-BE49-F238E27FC236}">
+                <a16:creationId xmlns:a16="http://schemas.microsoft.com/office/drawing/2014/main" id="{3D49C5F5-0046-4519-A9AC-F6803EE30C0C}"/>
+              </a:ext>
+            </a:extLst>
+          </p:cNvPr>
+          <p:cNvPicPr>
+            <a:picLocks noChangeAspect="1"/>
+          </p:cNvPicPr>
+          <p:nvPr/>
+        </p:nvPicPr>
+        <p:blipFill>
+          <a:blip r:embed="rId4"/>
+          <a:stretch>
+            <a:fillRect/>
+          </a:stretch>
+        </p:blipFill>
+        <p:spPr>
+          <a:xfrm>
+            <a:off x="8591453" y="1835143"/>
+            <a:ext cx="2950513" cy="2374981"/>
+          </a:xfrm>
+          <a:prstGeom prst="rect">
+            <a:avLst/>
+          </a:prstGeom>
+        </p:spPr>
+      </p:pic>
+      <p:cxnSp>
+        <p:nvCxnSpPr>
+          <p:cNvPr id="13" name="Straight Arrow Connector 12">
+            <a:extLst>
+              <a:ext uri="{FF2B5EF4-FFF2-40B4-BE49-F238E27FC236}">
+                <a16:creationId xmlns:a16="http://schemas.microsoft.com/office/drawing/2014/main" id="{6A9F843B-7428-4EDA-8C47-8FA959374815}"/>
+              </a:ext>
+            </a:extLst>
+          </p:cNvPr>
+          <p:cNvCxnSpPr>
+            <a:cxnSpLocks/>
+          </p:cNvCxnSpPr>
+          <p:nvPr/>
+        </p:nvCxnSpPr>
+        <p:spPr>
+          <a:xfrm flipV="1">
+            <a:off x="8948057" y="4075347"/>
+            <a:ext cx="2090057" cy="552637"/>
+          </a:xfrm>
+          <a:prstGeom prst="straightConnector1">
+            <a:avLst/>
+          </a:prstGeom>
+          <a:ln>
+            <a:solidFill>
+              <a:srgbClr val="FF0000"/>
+            </a:solidFill>
+            <a:tailEnd type="triangle"/>
+          </a:ln>
+        </p:spPr>
+        <p:style>
+          <a:lnRef idx="1">
+            <a:schemeClr val="accent1"/>
+          </a:lnRef>
+          <a:fillRef idx="0">
+            <a:schemeClr val="accent1"/>
+          </a:fillRef>
+          <a:effectRef idx="0">
+            <a:schemeClr val="accent1"/>
+          </a:effectRef>
+          <a:fontRef idx="minor">
+            <a:schemeClr val="tx1"/>
+          </a:fontRef>
+        </p:style>
+      </p:cxnSp>
+      <p:sp>
+        <p:nvSpPr>
+          <p:cNvPr id="16" name="TextBox 15">
+            <a:extLst>
+              <a:ext uri="{FF2B5EF4-FFF2-40B4-BE49-F238E27FC236}">
+                <a16:creationId xmlns:a16="http://schemas.microsoft.com/office/drawing/2014/main" id="{4158EE01-5E2A-4742-9065-C3F9FE659402}"/>
+              </a:ext>
+            </a:extLst>
+          </p:cNvPr>
+          <p:cNvSpPr txBox="1"/>
+          <p:nvPr/>
+        </p:nvSpPr>
+        <p:spPr>
+          <a:xfrm>
+            <a:off x="8658808" y="4721677"/>
+            <a:ext cx="3368351" cy="923330"/>
+          </a:xfrm>
+          <a:prstGeom prst="rect">
+            <a:avLst/>
+          </a:prstGeom>
+          <a:noFill/>
+        </p:spPr>
+        <p:txBody>
+          <a:bodyPr wrap="square" rtlCol="0">
+            <a:spAutoFit/>
+          </a:bodyPr>
+          <a:lstStyle/>
+          <a:p>
+            <a:r>
+              <a:rPr lang="en-GB" dirty="0"/>
+              <a:t>Copy and paste this URL (ending </a:t>
+            </a:r>
+          </a:p>
+          <a:p>
+            <a:r>
+              <a:rPr lang="en-GB" dirty="0"/>
+              <a:t>…/Executions) into the code of the Redirector.</a:t>
+            </a:r>
+          </a:p>
+        </p:txBody>
+      </p:sp>
+      <p:cxnSp>
+        <p:nvCxnSpPr>
+          <p:cNvPr id="18" name="Straight Arrow Connector 17">
+            <a:extLst>
+              <a:ext uri="{FF2B5EF4-FFF2-40B4-BE49-F238E27FC236}">
+                <a16:creationId xmlns:a16="http://schemas.microsoft.com/office/drawing/2014/main" id="{3D02D14E-D55B-4794-BC93-CF6197D4DC51}"/>
+              </a:ext>
+            </a:extLst>
+          </p:cNvPr>
+          <p:cNvCxnSpPr/>
+          <p:nvPr/>
+        </p:nvCxnSpPr>
+        <p:spPr>
+          <a:xfrm>
+            <a:off x="7912359" y="3051110"/>
+            <a:ext cx="1110343" cy="195943"/>
+          </a:xfrm>
+          <a:prstGeom prst="straightConnector1">
+            <a:avLst/>
+          </a:prstGeom>
+          <a:ln>
+            <a:solidFill>
+              <a:srgbClr val="FF0000"/>
+            </a:solidFill>
+            <a:tailEnd type="triangle"/>
+          </a:ln>
+        </p:spPr>
+        <p:style>
+          <a:lnRef idx="1">
+            <a:schemeClr val="accent1"/>
+          </a:lnRef>
+          <a:fillRef idx="0">
+            <a:schemeClr val="accent1"/>
+          </a:fillRef>
+          <a:effectRef idx="0">
+            <a:schemeClr val="accent1"/>
+          </a:effectRef>
+          <a:fontRef idx="minor">
+            <a:schemeClr val="tx1"/>
+          </a:fontRef>
+        </p:style>
+      </p:cxnSp>
+      <p:sp>
+        <p:nvSpPr>
+          <p:cNvPr id="19" name="TextBox 18">
+            <a:extLst>
+              <a:ext uri="{FF2B5EF4-FFF2-40B4-BE49-F238E27FC236}">
+                <a16:creationId xmlns:a16="http://schemas.microsoft.com/office/drawing/2014/main" id="{62EFCBB2-2658-4EDC-AA49-0B61E05F1BD7}"/>
+              </a:ext>
+            </a:extLst>
+          </p:cNvPr>
+          <p:cNvSpPr txBox="1"/>
+          <p:nvPr/>
+        </p:nvSpPr>
+        <p:spPr>
+          <a:xfrm>
+            <a:off x="6540759" y="2696547"/>
+            <a:ext cx="1558212" cy="646331"/>
+          </a:xfrm>
+          <a:prstGeom prst="rect">
+            <a:avLst/>
+          </a:prstGeom>
+          <a:noFill/>
+        </p:spPr>
+        <p:txBody>
+          <a:bodyPr wrap="square" rtlCol="0">
+            <a:spAutoFit/>
+          </a:bodyPr>
+          <a:lstStyle/>
+          <a:p>
+            <a:r>
+              <a:rPr lang="en-GB" dirty="0"/>
+              <a:t>Name your flow</a:t>
+            </a:r>
+          </a:p>
+        </p:txBody>
+      </p:sp>
     </p:spTree>
     <p:extLst>
       <p:ext uri="{BB962C8B-B14F-4D97-AF65-F5344CB8AC3E}">
-        <p14:creationId xmlns:p14="http://schemas.microsoft.com/office/powerpoint/2010/main" val="1458024591"/>
+        <p14:creationId xmlns:p14="http://schemas.microsoft.com/office/powerpoint/2010/main" val="3465332058"/>
       </p:ext>
     </p:extLst>
   </p:cSld>
@@ -4270,7 +4236,7 @@
           <p:cNvPr id="2" name="Title 1">
             <a:extLst>
               <a:ext uri="{FF2B5EF4-FFF2-40B4-BE49-F238E27FC236}">
-                <a16:creationId xmlns:a16="http://schemas.microsoft.com/office/drawing/2014/main" id="{2DBAAE7B-067A-4668-8BF0-6B324ABC9A24}"/>
+                <a16:creationId xmlns:a16="http://schemas.microsoft.com/office/drawing/2014/main" id="{8A29789C-8782-4BDF-BEB8-EBE92DC12985}"/>
               </a:ext>
             </a:extLst>
           </p:cNvPr>
@@ -4288,7 +4254,7 @@
           <a:p>
             <a:r>
               <a:rPr lang="en-GB" dirty="0"/>
-              <a:t>Twilio – reporting back status</a:t>
+              <a:t>Twilio – Add a call</a:t>
             </a:r>
           </a:p>
         </p:txBody>
@@ -4298,7 +4264,7 @@
           <p:cNvPr id="3" name="Content Placeholder 2">
             <a:extLst>
               <a:ext uri="{FF2B5EF4-FFF2-40B4-BE49-F238E27FC236}">
-                <a16:creationId xmlns:a16="http://schemas.microsoft.com/office/drawing/2014/main" id="{B7EEB7D9-0ED2-4C2B-832D-9BA4803F61DF}"/>
+                <a16:creationId xmlns:a16="http://schemas.microsoft.com/office/drawing/2014/main" id="{C21D2050-0B85-4ED9-9334-C4A3E1566CC8}"/>
               </a:ext>
             </a:extLst>
           </p:cNvPr>
@@ -4309,56 +4275,93 @@
             <p:ph idx="1"/>
           </p:nvPr>
         </p:nvSpPr>
-        <p:spPr/>
+        <p:spPr>
+          <a:xfrm>
+            <a:off x="2211355" y="3806889"/>
+            <a:ext cx="5439748" cy="2685986"/>
+          </a:xfrm>
+        </p:spPr>
         <p:txBody>
           <a:bodyPr/>
           <a:lstStyle/>
           <a:p>
             <a:r>
               <a:rPr lang="en-GB" dirty="0"/>
-              <a:t>Add external REST calls back to the Redirector</a:t>
-            </a:r>
-          </a:p>
-          <a:p>
-            <a:r>
-              <a:rPr lang="en-GB" dirty="0"/>
-              <a:t>Use parameters referenced in the function </a:t>
-            </a:r>
-            <a:r>
-              <a:rPr lang="en-GB" dirty="0" err="1"/>
-              <a:t>ProcessResponse</a:t>
-            </a:r>
-            <a:r>
-              <a:rPr lang="en-GB" dirty="0"/>
-              <a:t> in </a:t>
-            </a:r>
-            <a:r>
-              <a:rPr lang="en-GB" dirty="0" err="1"/>
-              <a:t>DriverNotify.cs</a:t>
-            </a:r>
-            <a:endParaRPr lang="en-GB" dirty="0"/>
-          </a:p>
-          <a:p>
-            <a:endParaRPr lang="en-GB" dirty="0"/>
-          </a:p>
-          <a:p>
-            <a:r>
-              <a:rPr lang="en-GB" dirty="0"/>
-              <a:t>E.g. These can cause events such as noting that a call was not answered</a:t>
-            </a:r>
-          </a:p>
-          <a:p>
-            <a:r>
-              <a:rPr lang="en-GB" dirty="0"/>
-              <a:t>Or they can cause an alarm to be acknowledged via a user’s ID and PIN </a:t>
-            </a:r>
-          </a:p>
-        </p:txBody>
-      </p:sp>
+              <a:t>Connect up to API call</a:t>
+            </a:r>
+          </a:p>
+          <a:p>
+            <a:r>
+              <a:rPr lang="en-GB" dirty="0"/>
+              <a:t>Set properties</a:t>
+            </a:r>
+          </a:p>
+        </p:txBody>
+      </p:sp>
+      <p:pic>
+        <p:nvPicPr>
+          <p:cNvPr id="4" name="Picture 3">
+            <a:extLst>
+              <a:ext uri="{FF2B5EF4-FFF2-40B4-BE49-F238E27FC236}">
+                <a16:creationId xmlns:a16="http://schemas.microsoft.com/office/drawing/2014/main" id="{9D7DD672-F85D-481A-A966-01E9297A707A}"/>
+              </a:ext>
+            </a:extLst>
+          </p:cNvPr>
+          <p:cNvPicPr>
+            <a:picLocks noChangeAspect="1"/>
+          </p:cNvPicPr>
+          <p:nvPr/>
+        </p:nvPicPr>
+        <p:blipFill>
+          <a:blip r:embed="rId2"/>
+          <a:stretch>
+            <a:fillRect/>
+          </a:stretch>
+        </p:blipFill>
+        <p:spPr>
+          <a:xfrm>
+            <a:off x="688424" y="1545674"/>
+            <a:ext cx="3705225" cy="2143125"/>
+          </a:xfrm>
+          <a:prstGeom prst="rect">
+            <a:avLst/>
+          </a:prstGeom>
+        </p:spPr>
+      </p:pic>
+      <p:pic>
+        <p:nvPicPr>
+          <p:cNvPr id="5" name="Picture 4">
+            <a:extLst>
+              <a:ext uri="{FF2B5EF4-FFF2-40B4-BE49-F238E27FC236}">
+                <a16:creationId xmlns:a16="http://schemas.microsoft.com/office/drawing/2014/main" id="{E5BB4F61-6961-4A61-820B-A7942F61C8DB}"/>
+              </a:ext>
+            </a:extLst>
+          </p:cNvPr>
+          <p:cNvPicPr>
+            <a:picLocks noChangeAspect="1"/>
+          </p:cNvPicPr>
+          <p:nvPr/>
+        </p:nvPicPr>
+        <p:blipFill>
+          <a:blip r:embed="rId3"/>
+          <a:stretch>
+            <a:fillRect/>
+          </a:stretch>
+        </p:blipFill>
+        <p:spPr>
+          <a:xfrm>
+            <a:off x="8130268" y="1368199"/>
+            <a:ext cx="2646589" cy="2902934"/>
+          </a:xfrm>
+          <a:prstGeom prst="rect">
+            <a:avLst/>
+          </a:prstGeom>
+        </p:spPr>
+      </p:pic>
     </p:spTree>
     <p:extLst>
       <p:ext uri="{BB962C8B-B14F-4D97-AF65-F5344CB8AC3E}">
-        <p14:creationId xmlns:p14="http://schemas.microsoft.com/office/powerpoint/2010/main" val="2951448424"/>
+        <p14:creationId xmlns:p14="http://schemas.microsoft.com/office/powerpoint/2010/main" val="4142926073"/>
       </p:ext>
     </p:extLst>
   </p:cSld>
@@ -4390,7 +4393,7 @@
           <p:cNvPr id="2" name="Title 1">
             <a:extLst>
               <a:ext uri="{FF2B5EF4-FFF2-40B4-BE49-F238E27FC236}">
-                <a16:creationId xmlns:a16="http://schemas.microsoft.com/office/drawing/2014/main" id="{BB175C6A-0251-4C90-9DDE-E28BED03BC4F}"/>
+                <a16:creationId xmlns:a16="http://schemas.microsoft.com/office/drawing/2014/main" id="{55E994A2-4892-4C3C-96F9-78667ACEF513}"/>
               </a:ext>
             </a:extLst>
           </p:cNvPr>
@@ -4408,7 +4411,7 @@
           <a:p>
             <a:r>
               <a:rPr lang="en-GB" dirty="0"/>
-              <a:t>Twilio – Save and Publish</a:t>
+              <a:t>Twilio – Add ‘Say’</a:t>
             </a:r>
           </a:p>
         </p:txBody>
@@ -4418,7 +4421,7 @@
           <p:cNvPr id="3" name="Content Placeholder 2">
             <a:extLst>
               <a:ext uri="{FF2B5EF4-FFF2-40B4-BE49-F238E27FC236}">
-                <a16:creationId xmlns:a16="http://schemas.microsoft.com/office/drawing/2014/main" id="{09FEE35C-0400-4D75-A8CE-57446A54D639}"/>
+                <a16:creationId xmlns:a16="http://schemas.microsoft.com/office/drawing/2014/main" id="{AA9824A0-2436-4E16-BCDB-E72B5B061223}"/>
               </a:ext>
             </a:extLst>
           </p:cNvPr>
@@ -4431,47 +4434,32 @@
         </p:nvSpPr>
         <p:spPr>
           <a:xfrm>
-            <a:off x="838200" y="1825625"/>
-            <a:ext cx="6262396" cy="4351338"/>
-          </a:xfrm>
-        </p:spPr>
-        <p:txBody>
-          <a:bodyPr>
-            <a:normAutofit lnSpcReduction="10000"/>
-          </a:bodyPr>
-          <a:lstStyle/>
-          <a:p>
-            <a:r>
-              <a:rPr lang="en-GB" dirty="0"/>
-              <a:t>Click to save any flows: </a:t>
-            </a:r>
-          </a:p>
-          <a:p>
-            <a:endParaRPr lang="en-GB" dirty="0"/>
-          </a:p>
-          <a:p>
-            <a:r>
-              <a:rPr lang="en-GB" dirty="0"/>
-              <a:t>Click to publish and make ‘live’: </a:t>
-            </a:r>
-          </a:p>
-          <a:p>
-            <a:endParaRPr lang="en-GB" dirty="0"/>
-          </a:p>
-          <a:p>
-            <a:r>
-              <a:rPr lang="en-GB" dirty="0"/>
-              <a:t>On the Studio Dashboard copy the ‘SID’ (a long string) into the Redirector code.</a:t>
-            </a:r>
-          </a:p>
-          <a:p>
-            <a:endParaRPr lang="en-GB" dirty="0"/>
+            <a:off x="838199" y="4217437"/>
+            <a:ext cx="10946363" cy="1959526"/>
+          </a:xfrm>
+        </p:spPr>
+        <p:txBody>
+          <a:bodyPr/>
+          <a:lstStyle/>
+          <a:p>
+            <a:r>
+              <a:rPr lang="en-GB" dirty="0"/>
+              <a:t>Text to say has your choice of introductory text followed by the message parameter:</a:t>
+            </a:r>
           </a:p>
           <a:p>
             <a:pPr lvl="1"/>
             <a:r>
               <a:rPr lang="en-GB" dirty="0"/>
-              <a:t>Also your Account SID and Outgoing number (formatted as E.164, e.g. +1xxxxxxxxxx)</a:t>
+              <a:t>Telemetry alarm. {{</a:t>
+            </a:r>
+            <a:r>
+              <a:rPr lang="en-GB" dirty="0" err="1"/>
+              <a:t>flow.data.mymessage</a:t>
+            </a:r>
+            <a:r>
+              <a:rPr lang="en-GB" dirty="0"/>
+              <a:t>}} .</a:t>
             </a:r>
           </a:p>
         </p:txBody>
@@ -4481,7 +4469,7 @@
           <p:cNvPr id="4" name="Picture 3">
             <a:extLst>
               <a:ext uri="{FF2B5EF4-FFF2-40B4-BE49-F238E27FC236}">
-                <a16:creationId xmlns:a16="http://schemas.microsoft.com/office/drawing/2014/main" id="{7AA0952D-CC79-4C01-BFA0-A105EC5B9F76}"/>
+                <a16:creationId xmlns:a16="http://schemas.microsoft.com/office/drawing/2014/main" id="{46DC3841-91D4-44E0-B00B-1BAB4375B806}"/>
               </a:ext>
             </a:extLst>
           </p:cNvPr>
@@ -4498,8 +4486,8 @@
         </p:blipFill>
         <p:spPr>
           <a:xfrm>
-            <a:off x="4769304" y="1690688"/>
-            <a:ext cx="3829050" cy="904875"/>
+            <a:off x="4111107" y="1690688"/>
+            <a:ext cx="3409950" cy="1885950"/>
           </a:xfrm>
           <a:prstGeom prst="rect">
             <a:avLst/>
@@ -4511,7 +4499,7 @@
           <p:cNvPr id="5" name="Picture 4">
             <a:extLst>
               <a:ext uri="{FF2B5EF4-FFF2-40B4-BE49-F238E27FC236}">
-                <a16:creationId xmlns:a16="http://schemas.microsoft.com/office/drawing/2014/main" id="{7D39B2B7-357E-4805-B41D-80CB5B4A4AB3}"/>
+                <a16:creationId xmlns:a16="http://schemas.microsoft.com/office/drawing/2014/main" id="{6B0300B0-B5A5-4A16-AC62-FFE96D4B5050}"/>
               </a:ext>
             </a:extLst>
           </p:cNvPr>
@@ -4528,38 +4516,8 @@
         </p:blipFill>
         <p:spPr>
           <a:xfrm>
-            <a:off x="5879452" y="2776538"/>
-            <a:ext cx="2019300" cy="704850"/>
-          </a:xfrm>
-          <a:prstGeom prst="rect">
-            <a:avLst/>
-          </a:prstGeom>
-        </p:spPr>
-      </p:pic>
-      <p:pic>
-        <p:nvPicPr>
-          <p:cNvPr id="7" name="Picture 6">
-            <a:extLst>
-              <a:ext uri="{FF2B5EF4-FFF2-40B4-BE49-F238E27FC236}">
-                <a16:creationId xmlns:a16="http://schemas.microsoft.com/office/drawing/2014/main" id="{0C689703-6D1F-4735-9EE9-43D8973C5DF9}"/>
-              </a:ext>
-            </a:extLst>
-          </p:cNvPr>
-          <p:cNvPicPr>
-            <a:picLocks noChangeAspect="1"/>
-          </p:cNvPicPr>
-          <p:nvPr/>
-        </p:nvPicPr>
-        <p:blipFill>
-          <a:blip r:embed="rId4"/>
-          <a:stretch>
-            <a:fillRect/>
-          </a:stretch>
-        </p:blipFill>
-        <p:spPr>
-          <a:xfrm>
-            <a:off x="7898752" y="3301222"/>
-            <a:ext cx="3577415" cy="3438882"/>
+            <a:off x="8626858" y="798739"/>
+            <a:ext cx="2526333" cy="3092126"/>
           </a:xfrm>
           <a:prstGeom prst="rect">
             <a:avLst/>
@@ -4569,7 +4527,7 @@
     </p:spTree>
     <p:extLst>
       <p:ext uri="{BB962C8B-B14F-4D97-AF65-F5344CB8AC3E}">
-        <p14:creationId xmlns:p14="http://schemas.microsoft.com/office/powerpoint/2010/main" val="494754119"/>
+        <p14:creationId xmlns:p14="http://schemas.microsoft.com/office/powerpoint/2010/main" val="1458024591"/>
       </p:ext>
     </p:extLst>
   </p:cSld>
@@ -4601,7 +4559,7 @@
           <p:cNvPr id="2" name="Title 1">
             <a:extLst>
               <a:ext uri="{FF2B5EF4-FFF2-40B4-BE49-F238E27FC236}">
-                <a16:creationId xmlns:a16="http://schemas.microsoft.com/office/drawing/2014/main" id="{4F27146C-801C-4309-8282-A74D4DE7D5C8}"/>
+                <a16:creationId xmlns:a16="http://schemas.microsoft.com/office/drawing/2014/main" id="{2DBAAE7B-067A-4668-8BF0-6B324ABC9A24}"/>
               </a:ext>
             </a:extLst>
           </p:cNvPr>
@@ -4619,7 +4577,7 @@
           <a:p>
             <a:r>
               <a:rPr lang="en-GB" dirty="0"/>
-              <a:t>Making it Work</a:t>
+              <a:t>Twilio – reporting back status</a:t>
             </a:r>
           </a:p>
         </p:txBody>
@@ -4629,7 +4587,7 @@
           <p:cNvPr id="3" name="Content Placeholder 2">
             <a:extLst>
               <a:ext uri="{FF2B5EF4-FFF2-40B4-BE49-F238E27FC236}">
-                <a16:creationId xmlns:a16="http://schemas.microsoft.com/office/drawing/2014/main" id="{6FD9A976-4F2D-47FB-9333-FFAECF26A47A}"/>
+                <a16:creationId xmlns:a16="http://schemas.microsoft.com/office/drawing/2014/main" id="{B7EEB7D9-0ED2-4C2B-832D-9BA4803F61DF}"/>
               </a:ext>
             </a:extLst>
           </p:cNvPr>
@@ -4645,58 +4603,51 @@
           <a:bodyPr/>
           <a:lstStyle/>
           <a:p>
-            <a:pPr marL="514350" indent="-514350">
-              <a:buFont typeface="+mj-lt"/>
-              <a:buAutoNum type="arabicPeriod"/>
-            </a:pPr>
-            <a:r>
-              <a:rPr lang="en-GB" dirty="0"/>
-              <a:t>Build and install the driver – import the registry file from the code sample.</a:t>
-            </a:r>
-          </a:p>
-          <a:p>
-            <a:pPr marL="514350" indent="-514350">
-              <a:buFont typeface="+mj-lt"/>
-              <a:buAutoNum type="arabicPeriod"/>
-            </a:pPr>
-            <a:r>
-              <a:rPr lang="en-GB" dirty="0"/>
-              <a:t>Modify, build and deploy the redirector – set up/change for https, port numbers, firewall restrictions etc.</a:t>
-            </a:r>
-          </a:p>
-          <a:p>
-            <a:pPr marL="514350" indent="-514350">
-              <a:buFont typeface="+mj-lt"/>
-              <a:buAutoNum type="arabicPeriod"/>
-            </a:pPr>
-            <a:r>
-              <a:rPr lang="en-GB" dirty="0"/>
-              <a:t>Arrange for the Twilio account to be set up.</a:t>
-            </a:r>
-          </a:p>
-          <a:p>
-            <a:pPr marL="514350" indent="-514350">
-              <a:buFont typeface="+mj-lt"/>
-              <a:buAutoNum type="arabicPeriod"/>
-            </a:pPr>
-            <a:r>
-              <a:rPr lang="en-GB" dirty="0"/>
-              <a:t>Configure the Geo SCADA Alarm Redirection parameters:</a:t>
-            </a:r>
-          </a:p>
-          <a:p>
-            <a:pPr marL="514350" indent="-514350">
-              <a:buFont typeface="+mj-lt"/>
-              <a:buAutoNum type="arabicPeriod"/>
-            </a:pPr>
+            <a:r>
+              <a:rPr lang="en-GB" dirty="0"/>
+              <a:t>Add external REST calls back to the Redirector</a:t>
+            </a:r>
+          </a:p>
+          <a:p>
+            <a:r>
+              <a:rPr lang="en-GB" dirty="0"/>
+              <a:t>Use parameters referenced in the function </a:t>
+            </a:r>
+            <a:r>
+              <a:rPr lang="en-GB" dirty="0" err="1"/>
+              <a:t>ProcessResponse</a:t>
+            </a:r>
+            <a:r>
+              <a:rPr lang="en-GB" dirty="0"/>
+              <a:t> in </a:t>
+            </a:r>
+            <a:r>
+              <a:rPr lang="en-GB" dirty="0" err="1"/>
+              <a:t>DriverNotify.cs</a:t>
+            </a:r>
             <a:endParaRPr lang="en-GB" dirty="0"/>
+          </a:p>
+          <a:p>
+            <a:endParaRPr lang="en-GB" dirty="0"/>
+          </a:p>
+          <a:p>
+            <a:r>
+              <a:rPr lang="en-GB" dirty="0"/>
+              <a:t>E.g. These can cause events such as noting that a call was not answered</a:t>
+            </a:r>
+          </a:p>
+          <a:p>
+            <a:r>
+              <a:rPr lang="en-GB" dirty="0"/>
+              <a:t>Or they can cause an alarm to be acknowledged via a user’s ID and PIN </a:t>
+            </a:r>
           </a:p>
         </p:txBody>
       </p:sp>
     </p:spTree>
     <p:extLst>
       <p:ext uri="{BB962C8B-B14F-4D97-AF65-F5344CB8AC3E}">
-        <p14:creationId xmlns:p14="http://schemas.microsoft.com/office/powerpoint/2010/main" val="215336332"/>
+        <p14:creationId xmlns:p14="http://schemas.microsoft.com/office/powerpoint/2010/main" val="2951448424"/>
       </p:ext>
     </p:extLst>
   </p:cSld>
@@ -4728,7 +4679,7 @@
           <p:cNvPr id="2" name="Title 1">
             <a:extLst>
               <a:ext uri="{FF2B5EF4-FFF2-40B4-BE49-F238E27FC236}">
-                <a16:creationId xmlns:a16="http://schemas.microsoft.com/office/drawing/2014/main" id="{B74141BC-7020-493F-805E-4EBC16947C2A}"/>
+                <a16:creationId xmlns:a16="http://schemas.microsoft.com/office/drawing/2014/main" id="{5E9EE17B-FE6F-412F-9A85-284630D2F1E7}"/>
               </a:ext>
             </a:extLst>
           </p:cNvPr>
@@ -4746,519 +4697,39 @@
           <a:p>
             <a:r>
               <a:rPr lang="en-GB" dirty="0"/>
-              <a:t>Configure Redirection</a:t>
-            </a:r>
-          </a:p>
-        </p:txBody>
-      </p:sp>
-      <p:sp>
-        <p:nvSpPr>
-          <p:cNvPr id="4" name="Rectangle 3">
-            <a:extLst>
-              <a:ext uri="{FF2B5EF4-FFF2-40B4-BE49-F238E27FC236}">
-                <a16:creationId xmlns:a16="http://schemas.microsoft.com/office/drawing/2014/main" id="{BD487A8F-C325-46AE-9887-69511D1EF8C8}"/>
-              </a:ext>
-            </a:extLst>
-          </p:cNvPr>
-          <p:cNvSpPr/>
-          <p:nvPr/>
-        </p:nvSpPr>
-        <p:spPr>
-          <a:xfrm>
-            <a:off x="857794" y="1242468"/>
-            <a:ext cx="4877966" cy="702372"/>
-          </a:xfrm>
-          <a:prstGeom prst="rect">
-            <a:avLst/>
-          </a:prstGeom>
-        </p:spPr>
-        <p:txBody>
-          <a:bodyPr wrap="square">
-            <a:spAutoFit/>
-          </a:bodyPr>
-          <a:lstStyle/>
-          <a:p>
-            <a:pPr algn="just">
-              <a:lnSpc>
-                <a:spcPct val="115000"/>
-              </a:lnSpc>
-              <a:spcAft>
-                <a:spcPts val="1000"/>
-              </a:spcAft>
-            </a:pPr>
-            <a:r>
-              <a:rPr lang="en-US" dirty="0">
-                <a:latin typeface="Arial" panose="020B0604020202020204" pitchFamily="34" charset="0"/>
-                <a:ea typeface="Calibri" panose="020F0502020204030204" pitchFamily="34" charset="0"/>
-                <a:cs typeface="Times New Roman" panose="02020603050405020304" pitchFamily="18" charset="0"/>
-              </a:rPr>
-              <a:t>The new object is found in the Create New … Alarm Redirection context menu:</a:t>
-            </a:r>
-            <a:endParaRPr lang="en-GB" dirty="0">
-              <a:latin typeface="Arial" panose="020B0604020202020204" pitchFamily="34" charset="0"/>
-              <a:ea typeface="Calibri" panose="020F0502020204030204" pitchFamily="34" charset="0"/>
-              <a:cs typeface="Times New Roman" panose="02020603050405020304" pitchFamily="18" charset="0"/>
-            </a:endParaRPr>
-          </a:p>
-        </p:txBody>
-      </p:sp>
-      <p:pic>
-        <p:nvPicPr>
-          <p:cNvPr id="5" name="Picture 4">
-            <a:extLst>
-              <a:ext uri="{FF2B5EF4-FFF2-40B4-BE49-F238E27FC236}">
-                <a16:creationId xmlns:a16="http://schemas.microsoft.com/office/drawing/2014/main" id="{7C18C04D-1B08-49C9-B13E-9C053C3D148A}"/>
-              </a:ext>
-            </a:extLst>
-          </p:cNvPr>
-          <p:cNvPicPr/>
-          <p:nvPr/>
-        </p:nvPicPr>
-        <p:blipFill>
-          <a:blip r:embed="rId2"/>
-          <a:stretch>
-            <a:fillRect/>
-          </a:stretch>
-        </p:blipFill>
-        <p:spPr>
-          <a:xfrm>
-            <a:off x="844964" y="2065552"/>
-            <a:ext cx="3238500" cy="2099310"/>
-          </a:xfrm>
-          <a:prstGeom prst="rect">
-            <a:avLst/>
-          </a:prstGeom>
-        </p:spPr>
-      </p:pic>
-      <p:sp>
-        <p:nvSpPr>
-          <p:cNvPr id="6" name="Rectangle 5">
-            <a:extLst>
-              <a:ext uri="{FF2B5EF4-FFF2-40B4-BE49-F238E27FC236}">
-                <a16:creationId xmlns:a16="http://schemas.microsoft.com/office/drawing/2014/main" id="{40F042E6-40FC-4C16-B35F-64E9C0F9ECFE}"/>
-              </a:ext>
-            </a:extLst>
-          </p:cNvPr>
-          <p:cNvSpPr/>
-          <p:nvPr/>
-        </p:nvSpPr>
-        <p:spPr>
-          <a:xfrm>
-            <a:off x="857794" y="4399489"/>
-            <a:ext cx="3967753" cy="369332"/>
-          </a:xfrm>
-          <a:prstGeom prst="rect">
-            <a:avLst/>
-          </a:prstGeom>
-        </p:spPr>
-        <p:txBody>
-          <a:bodyPr wrap="none">
-            <a:spAutoFit/>
-          </a:bodyPr>
-          <a:lstStyle/>
-          <a:p>
-            <a:r>
-              <a:rPr lang="en-US" dirty="0">
-                <a:latin typeface="Arial" panose="020B0604020202020204" pitchFamily="34" charset="0"/>
-                <a:ea typeface="Calibri" panose="020F0502020204030204" pitchFamily="34" charset="0"/>
-                <a:cs typeface="Times New Roman" panose="02020603050405020304" pitchFamily="18" charset="0"/>
-              </a:rPr>
-              <a:t>create a user to target the redirection</a:t>
-            </a:r>
-            <a:endParaRPr lang="en-GB" dirty="0"/>
-          </a:p>
-        </p:txBody>
-      </p:sp>
-      <p:pic>
-        <p:nvPicPr>
-          <p:cNvPr id="7" name="Picture 6">
-            <a:extLst>
-              <a:ext uri="{FF2B5EF4-FFF2-40B4-BE49-F238E27FC236}">
-                <a16:creationId xmlns:a16="http://schemas.microsoft.com/office/drawing/2014/main" id="{ADAF0E8B-F115-41D6-89D5-DB312AC0A5A1}"/>
-              </a:ext>
-            </a:extLst>
-          </p:cNvPr>
-          <p:cNvPicPr/>
-          <p:nvPr/>
-        </p:nvPicPr>
-        <p:blipFill>
-          <a:blip r:embed="rId3"/>
-          <a:stretch>
-            <a:fillRect/>
-          </a:stretch>
-        </p:blipFill>
-        <p:spPr>
-          <a:xfrm>
-            <a:off x="948922" y="4768821"/>
-            <a:ext cx="4168140" cy="735330"/>
-          </a:xfrm>
-          <a:prstGeom prst="rect">
-            <a:avLst/>
-          </a:prstGeom>
-        </p:spPr>
-      </p:pic>
-      <p:pic>
-        <p:nvPicPr>
-          <p:cNvPr id="8" name="Picture 7">
-            <a:extLst>
-              <a:ext uri="{FF2B5EF4-FFF2-40B4-BE49-F238E27FC236}">
-                <a16:creationId xmlns:a16="http://schemas.microsoft.com/office/drawing/2014/main" id="{5254454A-A651-49B7-9BAD-7B82A2E6A033}"/>
-              </a:ext>
-            </a:extLst>
-          </p:cNvPr>
-          <p:cNvPicPr/>
-          <p:nvPr/>
-        </p:nvPicPr>
-        <p:blipFill>
-          <a:blip r:embed="rId4"/>
-          <a:stretch>
-            <a:fillRect/>
-          </a:stretch>
-        </p:blipFill>
-        <p:spPr>
-          <a:xfrm>
-            <a:off x="948922" y="5504151"/>
-            <a:ext cx="4191000" cy="1101090"/>
-          </a:xfrm>
-          <a:prstGeom prst="rect">
-            <a:avLst/>
-          </a:prstGeom>
-        </p:spPr>
-      </p:pic>
-      <p:sp>
-        <p:nvSpPr>
-          <p:cNvPr id="9" name="Rectangle 8">
-            <a:extLst>
-              <a:ext uri="{FF2B5EF4-FFF2-40B4-BE49-F238E27FC236}">
-                <a16:creationId xmlns:a16="http://schemas.microsoft.com/office/drawing/2014/main" id="{2C42E8D9-E517-4B9F-8D6D-3627B77FE636}"/>
-              </a:ext>
-            </a:extLst>
-          </p:cNvPr>
-          <p:cNvSpPr/>
-          <p:nvPr/>
-        </p:nvSpPr>
-        <p:spPr>
-          <a:xfrm>
-            <a:off x="6198637" y="105811"/>
-            <a:ext cx="5057859" cy="369332"/>
-          </a:xfrm>
-          <a:prstGeom prst="rect">
-            <a:avLst/>
-          </a:prstGeom>
-        </p:spPr>
-        <p:txBody>
-          <a:bodyPr wrap="none">
-            <a:spAutoFit/>
-          </a:bodyPr>
-          <a:lstStyle/>
-          <a:p>
-            <a:r>
-              <a:rPr lang="en-US" dirty="0">
-                <a:latin typeface="Arial" panose="020B0604020202020204" pitchFamily="34" charset="0"/>
-                <a:ea typeface="Calibri" panose="020F0502020204030204" pitchFamily="34" charset="0"/>
-                <a:cs typeface="Times New Roman" panose="02020603050405020304" pitchFamily="18" charset="0"/>
-              </a:rPr>
-              <a:t>Create one of the new Method Actions for users</a:t>
-            </a:r>
-            <a:endParaRPr lang="en-GB" dirty="0"/>
-          </a:p>
-        </p:txBody>
-      </p:sp>
-      <p:pic>
-        <p:nvPicPr>
-          <p:cNvPr id="10" name="Picture 9">
-            <a:extLst>
-              <a:ext uri="{FF2B5EF4-FFF2-40B4-BE49-F238E27FC236}">
-                <a16:creationId xmlns:a16="http://schemas.microsoft.com/office/drawing/2014/main" id="{2275124B-1F8B-491F-BEF5-DC9FA59F30B0}"/>
-              </a:ext>
-            </a:extLst>
-          </p:cNvPr>
-          <p:cNvPicPr/>
-          <p:nvPr/>
-        </p:nvPicPr>
-        <p:blipFill>
-          <a:blip r:embed="rId5"/>
-          <a:stretch>
-            <a:fillRect/>
-          </a:stretch>
-        </p:blipFill>
-        <p:spPr>
-          <a:xfrm>
-            <a:off x="6198637" y="595623"/>
-            <a:ext cx="3855720" cy="3688715"/>
-          </a:xfrm>
-          <a:prstGeom prst="rect">
-            <a:avLst/>
-          </a:prstGeom>
-        </p:spPr>
-      </p:pic>
-      <p:sp>
-        <p:nvSpPr>
-          <p:cNvPr id="11" name="TextBox 10">
-            <a:extLst>
-              <a:ext uri="{FF2B5EF4-FFF2-40B4-BE49-F238E27FC236}">
-                <a16:creationId xmlns:a16="http://schemas.microsoft.com/office/drawing/2014/main" id="{71028372-54A8-43E7-A323-5C3D015FC4BD}"/>
-              </a:ext>
-            </a:extLst>
-          </p:cNvPr>
-          <p:cNvSpPr txBox="1"/>
-          <p:nvPr/>
-        </p:nvSpPr>
-        <p:spPr>
-          <a:xfrm>
-            <a:off x="10170368" y="3282346"/>
-            <a:ext cx="1866121" cy="943858"/>
-          </a:xfrm>
-          <a:prstGeom prst="rect">
-            <a:avLst/>
-          </a:prstGeom>
-          <a:noFill/>
-        </p:spPr>
-        <p:txBody>
-          <a:bodyPr wrap="square" rtlCol="0">
-            <a:spAutoFit/>
-          </a:bodyPr>
-          <a:lstStyle/>
-          <a:p>
-            <a:r>
-              <a:rPr lang="en-GB" dirty="0"/>
-              <a:t>Add here a link to the Notify Redirector object.</a:t>
-            </a:r>
-          </a:p>
-        </p:txBody>
-      </p:sp>
-      <p:cxnSp>
-        <p:nvCxnSpPr>
-          <p:cNvPr id="13" name="Straight Arrow Connector 12">
-            <a:extLst>
-              <a:ext uri="{FF2B5EF4-FFF2-40B4-BE49-F238E27FC236}">
-                <a16:creationId xmlns:a16="http://schemas.microsoft.com/office/drawing/2014/main" id="{1A3B8C4A-FBE0-4EBE-9A81-263A2D077D20}"/>
-              </a:ext>
-            </a:extLst>
-          </p:cNvPr>
-          <p:cNvCxnSpPr/>
-          <p:nvPr/>
-        </p:nvCxnSpPr>
-        <p:spPr>
-          <a:xfrm flipH="1">
-            <a:off x="9657184" y="3688960"/>
-            <a:ext cx="397173" cy="65315"/>
-          </a:xfrm>
-          <a:prstGeom prst="straightConnector1">
-            <a:avLst/>
-          </a:prstGeom>
-          <a:ln>
-            <a:solidFill>
-              <a:srgbClr val="FF0000"/>
-            </a:solidFill>
-            <a:tailEnd type="triangle"/>
-          </a:ln>
-        </p:spPr>
-        <p:style>
-          <a:lnRef idx="1">
-            <a:schemeClr val="accent1"/>
-          </a:lnRef>
-          <a:fillRef idx="0">
-            <a:schemeClr val="accent1"/>
-          </a:fillRef>
-          <a:effectRef idx="0">
-            <a:schemeClr val="accent1"/>
-          </a:effectRef>
-          <a:fontRef idx="minor">
-            <a:schemeClr val="tx1"/>
-          </a:fontRef>
-        </p:style>
-      </p:cxnSp>
-      <p:cxnSp>
-        <p:nvCxnSpPr>
-          <p:cNvPr id="14" name="Straight Arrow Connector 13">
-            <a:extLst>
-              <a:ext uri="{FF2B5EF4-FFF2-40B4-BE49-F238E27FC236}">
-                <a16:creationId xmlns:a16="http://schemas.microsoft.com/office/drawing/2014/main" id="{D8CC119C-9140-447D-8FA3-14AEE0854875}"/>
-              </a:ext>
-            </a:extLst>
-          </p:cNvPr>
-          <p:cNvCxnSpPr>
-            <a:cxnSpLocks/>
-          </p:cNvCxnSpPr>
-          <p:nvPr/>
-        </p:nvCxnSpPr>
-        <p:spPr>
-          <a:xfrm flipH="1" flipV="1">
-            <a:off x="9585805" y="4192362"/>
-            <a:ext cx="320273" cy="91976"/>
-          </a:xfrm>
-          <a:prstGeom prst="straightConnector1">
-            <a:avLst/>
-          </a:prstGeom>
-          <a:ln>
-            <a:solidFill>
-              <a:srgbClr val="FF0000"/>
-            </a:solidFill>
-            <a:tailEnd type="triangle"/>
-          </a:ln>
-        </p:spPr>
-        <p:style>
-          <a:lnRef idx="1">
-            <a:schemeClr val="accent1"/>
-          </a:lnRef>
-          <a:fillRef idx="0">
-            <a:schemeClr val="accent1"/>
-          </a:fillRef>
-          <a:effectRef idx="0">
-            <a:schemeClr val="accent1"/>
-          </a:effectRef>
-          <a:fontRef idx="minor">
-            <a:schemeClr val="tx1"/>
-          </a:fontRef>
-        </p:style>
-      </p:cxnSp>
-      <p:sp>
-        <p:nvSpPr>
-          <p:cNvPr id="17" name="TextBox 16">
-            <a:extLst>
-              <a:ext uri="{FF2B5EF4-FFF2-40B4-BE49-F238E27FC236}">
-                <a16:creationId xmlns:a16="http://schemas.microsoft.com/office/drawing/2014/main" id="{6DE170DE-8F5C-4884-A93A-FF533B2713E5}"/>
-              </a:ext>
-            </a:extLst>
-          </p:cNvPr>
-          <p:cNvSpPr txBox="1"/>
-          <p:nvPr/>
-        </p:nvSpPr>
-        <p:spPr>
-          <a:xfrm>
-            <a:off x="7441948" y="4300027"/>
-            <a:ext cx="4287714" cy="646331"/>
-          </a:xfrm>
-          <a:prstGeom prst="rect">
-            <a:avLst/>
-          </a:prstGeom>
-          <a:noFill/>
-        </p:spPr>
-        <p:txBody>
-          <a:bodyPr wrap="square" rtlCol="0">
-            <a:spAutoFit/>
-          </a:bodyPr>
-          <a:lstStyle/>
-          <a:p>
-            <a:r>
-              <a:rPr lang="en-GB" dirty="0"/>
-              <a:t>Add method name and parameters here. </a:t>
-            </a:r>
-          </a:p>
-          <a:p>
-            <a:r>
-              <a:rPr lang="en-GB" dirty="0"/>
-              <a:t>(</a:t>
-            </a:r>
-            <a:r>
-              <a:rPr lang="en-GB" u="sng" dirty="0"/>
-              <a:t>See next page</a:t>
-            </a:r>
-            <a:r>
-              <a:rPr lang="en-GB" dirty="0"/>
-              <a:t>) </a:t>
-            </a:r>
-          </a:p>
-        </p:txBody>
-      </p:sp>
-      <p:sp>
-        <p:nvSpPr>
-          <p:cNvPr id="18" name="Rectangle 17">
-            <a:extLst>
-              <a:ext uri="{FF2B5EF4-FFF2-40B4-BE49-F238E27FC236}">
-                <a16:creationId xmlns:a16="http://schemas.microsoft.com/office/drawing/2014/main" id="{F083429B-004E-453D-9A45-0F2CA5A08005}"/>
-              </a:ext>
-            </a:extLst>
-          </p:cNvPr>
-          <p:cNvSpPr/>
-          <p:nvPr/>
-        </p:nvSpPr>
-        <p:spPr>
-          <a:xfrm>
-            <a:off x="6008915" y="4977823"/>
-            <a:ext cx="6096000" cy="646331"/>
-          </a:xfrm>
-          <a:prstGeom prst="rect">
-            <a:avLst/>
-          </a:prstGeom>
-        </p:spPr>
-        <p:txBody>
-          <a:bodyPr>
-            <a:spAutoFit/>
-          </a:bodyPr>
-          <a:lstStyle/>
-          <a:p>
-            <a:r>
-              <a:rPr lang="en-US" dirty="0">
-                <a:latin typeface="Arial" panose="020B0604020202020204" pitchFamily="34" charset="0"/>
-                <a:ea typeface="Calibri" panose="020F0502020204030204" pitchFamily="34" charset="0"/>
-                <a:cs typeface="Times New Roman" panose="02020603050405020304" pitchFamily="18" charset="0"/>
-              </a:rPr>
-              <a:t>Add this new alarm redirection to the group/folder containing alarms to be redirected.</a:t>
-            </a:r>
-            <a:endParaRPr lang="en-GB" dirty="0"/>
-          </a:p>
-        </p:txBody>
-      </p:sp>
-      <p:pic>
-        <p:nvPicPr>
-          <p:cNvPr id="19" name="Picture 18">
-            <a:extLst>
-              <a:ext uri="{FF2B5EF4-FFF2-40B4-BE49-F238E27FC236}">
-                <a16:creationId xmlns:a16="http://schemas.microsoft.com/office/drawing/2014/main" id="{AA9B8DA7-A952-4178-B660-4B8609CF1445}"/>
-              </a:ext>
-            </a:extLst>
-          </p:cNvPr>
-          <p:cNvPicPr/>
-          <p:nvPr/>
-        </p:nvPicPr>
-        <p:blipFill>
-          <a:blip r:embed="rId6"/>
-          <a:stretch>
-            <a:fillRect/>
-          </a:stretch>
-        </p:blipFill>
-        <p:spPr>
-          <a:xfrm>
-            <a:off x="6096000" y="5561301"/>
-            <a:ext cx="5731510" cy="1252855"/>
-          </a:xfrm>
-          <a:prstGeom prst="rect">
-            <a:avLst/>
-          </a:prstGeom>
-        </p:spPr>
-      </p:pic>
-      <p:sp>
-        <p:nvSpPr>
-          <p:cNvPr id="15" name="Rectangle 14">
-            <a:extLst>
-              <a:ext uri="{FF2B5EF4-FFF2-40B4-BE49-F238E27FC236}">
-                <a16:creationId xmlns:a16="http://schemas.microsoft.com/office/drawing/2014/main" id="{A0A5FD13-8A71-484C-9097-C22DB67A07E1}"/>
-              </a:ext>
-            </a:extLst>
-          </p:cNvPr>
-          <p:cNvSpPr/>
-          <p:nvPr/>
-        </p:nvSpPr>
-        <p:spPr>
-          <a:xfrm>
-            <a:off x="2872971" y="5751265"/>
-            <a:ext cx="3078793" cy="923330"/>
-          </a:xfrm>
-          <a:prstGeom prst="rect">
-            <a:avLst/>
-          </a:prstGeom>
-        </p:spPr>
-        <p:txBody>
-          <a:bodyPr wrap="square">
-            <a:spAutoFit/>
-          </a:bodyPr>
-          <a:lstStyle/>
-          <a:p>
-            <a:r>
-              <a:rPr lang="en-GB" dirty="0"/>
-              <a:t>The phone number must be formatted as E.164 (e.g. +1xxxxxxxxxx)</a:t>
+              <a:t>Twilio Full Flow Details</a:t>
+            </a:r>
+          </a:p>
+        </p:txBody>
+      </p:sp>
+      <p:sp>
+        <p:nvSpPr>
+          <p:cNvPr id="3" name="Content Placeholder 2">
+            <a:extLst>
+              <a:ext uri="{FF2B5EF4-FFF2-40B4-BE49-F238E27FC236}">
+                <a16:creationId xmlns:a16="http://schemas.microsoft.com/office/drawing/2014/main" id="{155C57EC-E8E4-4E85-9107-1A95F59D91B0}"/>
+              </a:ext>
+            </a:extLst>
+          </p:cNvPr>
+          <p:cNvSpPr>
+            <a:spLocks noGrp="1"/>
+          </p:cNvSpPr>
+          <p:nvPr>
+            <p:ph idx="1"/>
+          </p:nvPr>
+        </p:nvSpPr>
+        <p:spPr/>
+        <p:txBody>
+          <a:bodyPr/>
+          <a:lstStyle/>
+          <a:p>
+            <a:r>
+              <a:rPr lang="en-GB" dirty="0"/>
+              <a:t>Not yet in </a:t>
+            </a:r>
+            <a:r>
+              <a:rPr lang="en-GB"/>
+              <a:t>this presentation</a:t>
             </a:r>
           </a:p>
         </p:txBody>
@@ -5266,7 +4737,7 @@
     </p:spTree>
     <p:extLst>
       <p:ext uri="{BB962C8B-B14F-4D97-AF65-F5344CB8AC3E}">
-        <p14:creationId xmlns:p14="http://schemas.microsoft.com/office/powerpoint/2010/main" val="832947857"/>
+        <p14:creationId xmlns:p14="http://schemas.microsoft.com/office/powerpoint/2010/main" val="2430098632"/>
       </p:ext>
     </p:extLst>
   </p:cSld>
@@ -5298,7 +4769,7 @@
           <p:cNvPr id="2" name="Title 1">
             <a:extLst>
               <a:ext uri="{FF2B5EF4-FFF2-40B4-BE49-F238E27FC236}">
-                <a16:creationId xmlns:a16="http://schemas.microsoft.com/office/drawing/2014/main" id="{803B6C7B-92C7-42CE-B6F2-B2C8D0F7D6B9}"/>
+                <a16:creationId xmlns:a16="http://schemas.microsoft.com/office/drawing/2014/main" id="{BB175C6A-0251-4C90-9DDE-E28BED03BC4F}"/>
               </a:ext>
             </a:extLst>
           </p:cNvPr>
@@ -5316,7 +4787,7 @@
           <a:p>
             <a:r>
               <a:rPr lang="en-GB" dirty="0"/>
-              <a:t>Sample alarm text</a:t>
+              <a:t>Twilio – Save and Publish</a:t>
             </a:r>
           </a:p>
         </p:txBody>
@@ -5326,7 +4797,7 @@
           <p:cNvPr id="3" name="Content Placeholder 2">
             <a:extLst>
               <a:ext uri="{FF2B5EF4-FFF2-40B4-BE49-F238E27FC236}">
-                <a16:creationId xmlns:a16="http://schemas.microsoft.com/office/drawing/2014/main" id="{96610AB8-F04C-4CD1-9D6E-EF35B6AB1CF7}"/>
+                <a16:creationId xmlns:a16="http://schemas.microsoft.com/office/drawing/2014/main" id="{09FEE35C-0400-4D75-A8CE-57446A54D639}"/>
               </a:ext>
             </a:extLst>
           </p:cNvPr>
@@ -5337,184 +4808,147 @@
             <p:ph idx="1"/>
           </p:nvPr>
         </p:nvSpPr>
-        <p:spPr/>
+        <p:spPr>
+          <a:xfrm>
+            <a:off x="838200" y="1825625"/>
+            <a:ext cx="6262396" cy="4351338"/>
+          </a:xfrm>
+        </p:spPr>
         <p:txBody>
           <a:bodyPr>
-            <a:normAutofit/>
+            <a:normAutofit lnSpcReduction="10000"/>
           </a:bodyPr>
           <a:lstStyle/>
           <a:p>
             <a:r>
               <a:rPr lang="en-GB" dirty="0"/>
-              <a:t>This contains many possible fields. You may wish to omit many of them.</a:t>
-            </a:r>
-          </a:p>
-          <a:p>
-            <a:r>
-              <a:rPr lang="en-GB" dirty="0"/>
-              <a:t>For </a:t>
-            </a:r>
-            <a:r>
-              <a:rPr lang="en-GB" dirty="0" err="1"/>
-              <a:t>NotifyMessageVoice</a:t>
-            </a:r>
-            <a:r>
-              <a:rPr lang="en-GB" dirty="0"/>
-              <a:t>, omit the last ‘cookie’ parameter.</a:t>
+              <a:t>Click to save any flows: </a:t>
             </a:r>
           </a:p>
           <a:p>
             <a:endParaRPr lang="en-GB" dirty="0"/>
           </a:p>
           <a:p>
-            <a:pPr marL="0" indent="0">
-              <a:buNone/>
-            </a:pPr>
-            <a:r>
-              <a:rPr lang="en-GB" sz="2000" dirty="0" err="1">
-                <a:latin typeface="Arial monospaced for SAP" panose="020B0609020202030204" pitchFamily="49" charset="0"/>
-              </a:rPr>
-              <a:t>NotifyAlarmVoice</a:t>
-            </a:r>
-            <a:r>
-              <a:rPr lang="en-GB" sz="2000" dirty="0">
-                <a:latin typeface="Arial monospaced for SAP" panose="020B0609020202030204" pitchFamily="49" charset="0"/>
-              </a:rPr>
-              <a:t>( 'Severity %</a:t>
-            </a:r>
-            <a:r>
-              <a:rPr lang="en-GB" sz="2000" dirty="0" err="1">
-                <a:latin typeface="Arial monospaced for SAP" panose="020B0609020202030204" pitchFamily="49" charset="0"/>
-              </a:rPr>
-              <a:t>ASeverity</a:t>
-            </a:r>
-            <a:r>
-              <a:rPr lang="en-GB" sz="2000" dirty="0">
-                <a:latin typeface="Arial monospaced for SAP" panose="020B0609020202030204" pitchFamily="49" charset="0"/>
-              </a:rPr>
-              <a:t>%. Source %</a:t>
-            </a:r>
-            <a:r>
-              <a:rPr lang="en-GB" sz="2000" dirty="0" err="1">
-                <a:latin typeface="Arial monospaced for SAP" panose="020B0609020202030204" pitchFamily="49" charset="0"/>
-              </a:rPr>
-              <a:t>ASource</a:t>
-            </a:r>
-            <a:r>
-              <a:rPr lang="en-GB" sz="2000" dirty="0">
-                <a:latin typeface="Arial monospaced for SAP" panose="020B0609020202030204" pitchFamily="49" charset="0"/>
-              </a:rPr>
-              <a:t>%. Message %</a:t>
-            </a:r>
-            <a:r>
-              <a:rPr lang="en-GB" sz="2000" dirty="0" err="1">
-                <a:latin typeface="Arial monospaced for SAP" panose="020B0609020202030204" pitchFamily="49" charset="0"/>
-              </a:rPr>
-              <a:t>AMessage</a:t>
-            </a:r>
-            <a:r>
-              <a:rPr lang="en-GB" sz="2000" dirty="0">
-                <a:latin typeface="Arial monospaced for SAP" panose="020B0609020202030204" pitchFamily="49" charset="0"/>
-              </a:rPr>
-              <a:t>%. Category %</a:t>
-            </a:r>
-            <a:r>
-              <a:rPr lang="en-GB" sz="2000" dirty="0" err="1">
-                <a:latin typeface="Arial monospaced for SAP" panose="020B0609020202030204" pitchFamily="49" charset="0"/>
-              </a:rPr>
-              <a:t>ACategory</a:t>
-            </a:r>
-            <a:r>
-              <a:rPr lang="en-GB" sz="2000" dirty="0">
-                <a:latin typeface="Arial monospaced for SAP" panose="020B0609020202030204" pitchFamily="49" charset="0"/>
-              </a:rPr>
-              <a:t>%. Condition %</a:t>
-            </a:r>
-            <a:r>
-              <a:rPr lang="en-GB" sz="2000" dirty="0" err="1">
-                <a:latin typeface="Arial monospaced for SAP" panose="020B0609020202030204" pitchFamily="49" charset="0"/>
-              </a:rPr>
-              <a:t>ACondName</a:t>
-            </a:r>
-            <a:r>
-              <a:rPr lang="en-GB" sz="2000" dirty="0">
-                <a:latin typeface="Arial monospaced for SAP" panose="020B0609020202030204" pitchFamily="49" charset="0"/>
-              </a:rPr>
-              <a:t>%. Sub-condition %</a:t>
-            </a:r>
-            <a:r>
-              <a:rPr lang="en-GB" sz="2000" dirty="0" err="1">
-                <a:latin typeface="Arial monospaced for SAP" panose="020B0609020202030204" pitchFamily="49" charset="0"/>
-              </a:rPr>
-              <a:t>ASubCondName</a:t>
-            </a:r>
-            <a:r>
-              <a:rPr lang="en-GB" sz="2000" dirty="0">
-                <a:latin typeface="Arial monospaced for SAP" panose="020B0609020202030204" pitchFamily="49" charset="0"/>
-              </a:rPr>
-              <a:t>%. Active time %</a:t>
-            </a:r>
-            <a:r>
-              <a:rPr lang="en-GB" sz="2000" dirty="0" err="1">
-                <a:latin typeface="Arial monospaced for SAP" panose="020B0609020202030204" pitchFamily="49" charset="0"/>
-              </a:rPr>
-              <a:t>ASubCondActiveDateTime</a:t>
-            </a:r>
-            <a:r>
-              <a:rPr lang="en-GB" sz="2000" dirty="0">
-                <a:latin typeface="Arial monospaced for SAP" panose="020B0609020202030204" pitchFamily="49" charset="0"/>
-              </a:rPr>
-              <a:t>%. From server %N To user %</a:t>
-            </a:r>
-            <a:r>
-              <a:rPr lang="en-GB" sz="2000" dirty="0" err="1">
-                <a:latin typeface="Arial monospaced for SAP" panose="020B0609020202030204" pitchFamily="49" charset="0"/>
-              </a:rPr>
-              <a:t>rUserId.Name</a:t>
-            </a:r>
-            <a:r>
-              <a:rPr lang="en-GB" sz="2000" dirty="0">
-                <a:latin typeface="Arial monospaced for SAP" panose="020B0609020202030204" pitchFamily="49" charset="0"/>
-              </a:rPr>
-              <a:t>%.', '%</a:t>
-            </a:r>
-            <a:r>
-              <a:rPr lang="en-GB" sz="2000" dirty="0" err="1">
-                <a:latin typeface="Arial monospaced for SAP" panose="020B0609020202030204" pitchFamily="49" charset="0"/>
-              </a:rPr>
-              <a:t>rUserId.ContactConfig.VoicemailNumber</a:t>
-            </a:r>
-            <a:r>
-              <a:rPr lang="en-GB" sz="2000" dirty="0">
-                <a:latin typeface="Arial monospaced for SAP" panose="020B0609020202030204" pitchFamily="49" charset="0"/>
-              </a:rPr>
-              <a:t>%', 'VOICE', '</a:t>
-            </a:r>
-            <a:r>
-              <a:rPr lang="en-GB" sz="2000" dirty="0"/>
-              <a:t>%</a:t>
-            </a:r>
-            <a:r>
-              <a:rPr lang="en-GB" sz="2000" dirty="0" err="1"/>
-              <a:t>ACookie</a:t>
-            </a:r>
-            <a:r>
-              <a:rPr lang="en-GB" sz="2000" dirty="0"/>
-              <a:t>%</a:t>
-            </a:r>
-            <a:r>
-              <a:rPr lang="en-GB" sz="2000" dirty="0">
-                <a:latin typeface="Arial monospaced for SAP" panose="020B0609020202030204" pitchFamily="49" charset="0"/>
-              </a:rPr>
-              <a:t>' )</a:t>
-            </a:r>
-          </a:p>
-        </p:txBody>
-      </p:sp>
+            <a:r>
+              <a:rPr lang="en-GB" dirty="0"/>
+              <a:t>Click to publish and make ‘live’: </a:t>
+            </a:r>
+          </a:p>
+          <a:p>
+            <a:endParaRPr lang="en-GB" dirty="0"/>
+          </a:p>
+          <a:p>
+            <a:r>
+              <a:rPr lang="en-GB" dirty="0"/>
+              <a:t>On the Studio Dashboard copy the ‘SID’ (a long string) into the Redirector code.</a:t>
+            </a:r>
+          </a:p>
+          <a:p>
+            <a:endParaRPr lang="en-GB" dirty="0"/>
+          </a:p>
+          <a:p>
+            <a:pPr lvl="1"/>
+            <a:r>
+              <a:rPr lang="en-GB" dirty="0"/>
+              <a:t>Also your Account SID and Outgoing number (formatted as E.164, e.g. +1xxxxxxxxxx)</a:t>
+            </a:r>
+          </a:p>
+        </p:txBody>
+      </p:sp>
+      <p:pic>
+        <p:nvPicPr>
+          <p:cNvPr id="4" name="Picture 3">
+            <a:extLst>
+              <a:ext uri="{FF2B5EF4-FFF2-40B4-BE49-F238E27FC236}">
+                <a16:creationId xmlns:a16="http://schemas.microsoft.com/office/drawing/2014/main" id="{7AA0952D-CC79-4C01-BFA0-A105EC5B9F76}"/>
+              </a:ext>
+            </a:extLst>
+          </p:cNvPr>
+          <p:cNvPicPr>
+            <a:picLocks noChangeAspect="1"/>
+          </p:cNvPicPr>
+          <p:nvPr/>
+        </p:nvPicPr>
+        <p:blipFill>
+          <a:blip r:embed="rId2"/>
+          <a:stretch>
+            <a:fillRect/>
+          </a:stretch>
+        </p:blipFill>
+        <p:spPr>
+          <a:xfrm>
+            <a:off x="4769304" y="1690688"/>
+            <a:ext cx="3829050" cy="904875"/>
+          </a:xfrm>
+          <a:prstGeom prst="rect">
+            <a:avLst/>
+          </a:prstGeom>
+        </p:spPr>
+      </p:pic>
+      <p:pic>
+        <p:nvPicPr>
+          <p:cNvPr id="5" name="Picture 4">
+            <a:extLst>
+              <a:ext uri="{FF2B5EF4-FFF2-40B4-BE49-F238E27FC236}">
+                <a16:creationId xmlns:a16="http://schemas.microsoft.com/office/drawing/2014/main" id="{7D39B2B7-357E-4805-B41D-80CB5B4A4AB3}"/>
+              </a:ext>
+            </a:extLst>
+          </p:cNvPr>
+          <p:cNvPicPr>
+            <a:picLocks noChangeAspect="1"/>
+          </p:cNvPicPr>
+          <p:nvPr/>
+        </p:nvPicPr>
+        <p:blipFill>
+          <a:blip r:embed="rId3"/>
+          <a:stretch>
+            <a:fillRect/>
+          </a:stretch>
+        </p:blipFill>
+        <p:spPr>
+          <a:xfrm>
+            <a:off x="5879452" y="2776538"/>
+            <a:ext cx="2019300" cy="704850"/>
+          </a:xfrm>
+          <a:prstGeom prst="rect">
+            <a:avLst/>
+          </a:prstGeom>
+        </p:spPr>
+      </p:pic>
+      <p:pic>
+        <p:nvPicPr>
+          <p:cNvPr id="7" name="Picture 6">
+            <a:extLst>
+              <a:ext uri="{FF2B5EF4-FFF2-40B4-BE49-F238E27FC236}">
+                <a16:creationId xmlns:a16="http://schemas.microsoft.com/office/drawing/2014/main" id="{0C689703-6D1F-4735-9EE9-43D8973C5DF9}"/>
+              </a:ext>
+            </a:extLst>
+          </p:cNvPr>
+          <p:cNvPicPr>
+            <a:picLocks noChangeAspect="1"/>
+          </p:cNvPicPr>
+          <p:nvPr/>
+        </p:nvPicPr>
+        <p:blipFill>
+          <a:blip r:embed="rId4"/>
+          <a:stretch>
+            <a:fillRect/>
+          </a:stretch>
+        </p:blipFill>
+        <p:spPr>
+          <a:xfrm>
+            <a:off x="7898752" y="3301222"/>
+            <a:ext cx="3577415" cy="3438882"/>
+          </a:xfrm>
+          <a:prstGeom prst="rect">
+            <a:avLst/>
+          </a:prstGeom>
+        </p:spPr>
+      </p:pic>
     </p:spTree>
     <p:extLst>
       <p:ext uri="{BB962C8B-B14F-4D97-AF65-F5344CB8AC3E}">
-        <p14:creationId xmlns:p14="http://schemas.microsoft.com/office/powerpoint/2010/main" val="2635787459"/>
+        <p14:creationId xmlns:p14="http://schemas.microsoft.com/office/powerpoint/2010/main" val="494754119"/>
       </p:ext>
     </p:extLst>
   </p:cSld>
@@ -5546,7 +4980,7 @@
           <p:cNvPr id="2" name="Title 1">
             <a:extLst>
               <a:ext uri="{FF2B5EF4-FFF2-40B4-BE49-F238E27FC236}">
-                <a16:creationId xmlns:a16="http://schemas.microsoft.com/office/drawing/2014/main" id="{C088831A-DDB7-4E7C-BE45-CDADD28FBF56}"/>
+                <a16:creationId xmlns:a16="http://schemas.microsoft.com/office/drawing/2014/main" id="{4F27146C-801C-4309-8282-A74D4DE7D5C8}"/>
               </a:ext>
             </a:extLst>
           </p:cNvPr>
@@ -5564,7 +4998,7 @@
           <a:p>
             <a:r>
               <a:rPr lang="en-GB" dirty="0"/>
-              <a:t>Thank-you</a:t>
+              <a:t>Making it Work</a:t>
             </a:r>
           </a:p>
         </p:txBody>
@@ -5574,7 +5008,7 @@
           <p:cNvPr id="3" name="Content Placeholder 2">
             <a:extLst>
               <a:ext uri="{FF2B5EF4-FFF2-40B4-BE49-F238E27FC236}">
-                <a16:creationId xmlns:a16="http://schemas.microsoft.com/office/drawing/2014/main" id="{B4979852-F5B5-4032-BBDD-73FABC498E0D}"/>
+                <a16:creationId xmlns:a16="http://schemas.microsoft.com/office/drawing/2014/main" id="{6FD9A976-4F2D-47FB-9333-FFAECF26A47A}"/>
               </a:ext>
             </a:extLst>
           </p:cNvPr>
@@ -5590,17 +5024,628 @@
           <a:bodyPr/>
           <a:lstStyle/>
           <a:p>
-            <a:r>
-              <a:rPr lang="en-GB" dirty="0"/>
-              <a:t>Please go to the Telemetry Forum to discuss this example.</a:t>
-            </a:r>
+            <a:pPr marL="514350" indent="-514350">
+              <a:buFont typeface="+mj-lt"/>
+              <a:buAutoNum type="arabicPeriod"/>
+            </a:pPr>
+            <a:r>
+              <a:rPr lang="en-GB" dirty="0"/>
+              <a:t>Build and install the driver – import the registry file from the code sample.</a:t>
+            </a:r>
+          </a:p>
+          <a:p>
+            <a:pPr marL="514350" indent="-514350">
+              <a:buFont typeface="+mj-lt"/>
+              <a:buAutoNum type="arabicPeriod"/>
+            </a:pPr>
+            <a:r>
+              <a:rPr lang="en-GB" dirty="0"/>
+              <a:t>Modify, build and deploy the redirector – set up/change for https, port numbers, firewall restrictions etc.</a:t>
+            </a:r>
+          </a:p>
+          <a:p>
+            <a:pPr marL="514350" indent="-514350">
+              <a:buFont typeface="+mj-lt"/>
+              <a:buAutoNum type="arabicPeriod"/>
+            </a:pPr>
+            <a:r>
+              <a:rPr lang="en-GB" dirty="0"/>
+              <a:t>Arrange for the Twilio account to be set up.</a:t>
+            </a:r>
+          </a:p>
+          <a:p>
+            <a:pPr marL="514350" indent="-514350">
+              <a:buFont typeface="+mj-lt"/>
+              <a:buAutoNum type="arabicPeriod"/>
+            </a:pPr>
+            <a:r>
+              <a:rPr lang="en-GB" dirty="0"/>
+              <a:t>Configure the Geo SCADA Alarm Redirection parameters:</a:t>
+            </a:r>
+          </a:p>
+          <a:p>
+            <a:pPr marL="514350" indent="-514350">
+              <a:buFont typeface="+mj-lt"/>
+              <a:buAutoNum type="arabicPeriod"/>
+            </a:pPr>
+            <a:endParaRPr lang="en-GB" dirty="0"/>
           </a:p>
         </p:txBody>
       </p:sp>
     </p:spTree>
     <p:extLst>
       <p:ext uri="{BB962C8B-B14F-4D97-AF65-F5344CB8AC3E}">
-        <p14:creationId xmlns:p14="http://schemas.microsoft.com/office/powerpoint/2010/main" val="1283978724"/>
+        <p14:creationId xmlns:p14="http://schemas.microsoft.com/office/powerpoint/2010/main" val="215336332"/>
+      </p:ext>
+    </p:extLst>
+  </p:cSld>
+  <p:clrMapOvr>
+    <a:masterClrMapping/>
+  </p:clrMapOvr>
+</p:sld>
+</file>
+
+<file path=ppt/slides/slide19.xml><?xml version="1.0" encoding="utf-8"?>
+<p:sld xmlns:a="http://schemas.openxmlformats.org/drawingml/2006/main" xmlns:r="http://schemas.openxmlformats.org/officeDocument/2006/relationships" xmlns:p="http://schemas.openxmlformats.org/presentationml/2006/main">
+  <p:cSld>
+    <p:spTree>
+      <p:nvGrpSpPr>
+        <p:cNvPr id="1" name=""/>
+        <p:cNvGrpSpPr/>
+        <p:nvPr/>
+      </p:nvGrpSpPr>
+      <p:grpSpPr>
+        <a:xfrm>
+          <a:off x="0" y="0"/>
+          <a:ext cx="0" cy="0"/>
+          <a:chOff x="0" y="0"/>
+          <a:chExt cx="0" cy="0"/>
+        </a:xfrm>
+      </p:grpSpPr>
+      <p:sp>
+        <p:nvSpPr>
+          <p:cNvPr id="2" name="Title 1">
+            <a:extLst>
+              <a:ext uri="{FF2B5EF4-FFF2-40B4-BE49-F238E27FC236}">
+                <a16:creationId xmlns:a16="http://schemas.microsoft.com/office/drawing/2014/main" id="{B74141BC-7020-493F-805E-4EBC16947C2A}"/>
+              </a:ext>
+            </a:extLst>
+          </p:cNvPr>
+          <p:cNvSpPr>
+            <a:spLocks noGrp="1"/>
+          </p:cNvSpPr>
+          <p:nvPr>
+            <p:ph type="title"/>
+          </p:nvPr>
+        </p:nvSpPr>
+        <p:spPr/>
+        <p:txBody>
+          <a:bodyPr/>
+          <a:lstStyle/>
+          <a:p>
+            <a:r>
+              <a:rPr lang="en-GB" dirty="0"/>
+              <a:t>Configure Redirection</a:t>
+            </a:r>
+          </a:p>
+        </p:txBody>
+      </p:sp>
+      <p:sp>
+        <p:nvSpPr>
+          <p:cNvPr id="4" name="Rectangle 3">
+            <a:extLst>
+              <a:ext uri="{FF2B5EF4-FFF2-40B4-BE49-F238E27FC236}">
+                <a16:creationId xmlns:a16="http://schemas.microsoft.com/office/drawing/2014/main" id="{BD487A8F-C325-46AE-9887-69511D1EF8C8}"/>
+              </a:ext>
+            </a:extLst>
+          </p:cNvPr>
+          <p:cNvSpPr/>
+          <p:nvPr/>
+        </p:nvSpPr>
+        <p:spPr>
+          <a:xfrm>
+            <a:off x="857794" y="1242468"/>
+            <a:ext cx="4877966" cy="702372"/>
+          </a:xfrm>
+          <a:prstGeom prst="rect">
+            <a:avLst/>
+          </a:prstGeom>
+        </p:spPr>
+        <p:txBody>
+          <a:bodyPr wrap="square">
+            <a:spAutoFit/>
+          </a:bodyPr>
+          <a:lstStyle/>
+          <a:p>
+            <a:pPr algn="just">
+              <a:lnSpc>
+                <a:spcPct val="115000"/>
+              </a:lnSpc>
+              <a:spcAft>
+                <a:spcPts val="1000"/>
+              </a:spcAft>
+            </a:pPr>
+            <a:r>
+              <a:rPr lang="en-US" dirty="0">
+                <a:latin typeface="Arial" panose="020B0604020202020204" pitchFamily="34" charset="0"/>
+                <a:ea typeface="Calibri" panose="020F0502020204030204" pitchFamily="34" charset="0"/>
+                <a:cs typeface="Times New Roman" panose="02020603050405020304" pitchFamily="18" charset="0"/>
+              </a:rPr>
+              <a:t>The new object is found in the Create New … Alarm Redirection context menu:</a:t>
+            </a:r>
+            <a:endParaRPr lang="en-GB" dirty="0">
+              <a:latin typeface="Arial" panose="020B0604020202020204" pitchFamily="34" charset="0"/>
+              <a:ea typeface="Calibri" panose="020F0502020204030204" pitchFamily="34" charset="0"/>
+              <a:cs typeface="Times New Roman" panose="02020603050405020304" pitchFamily="18" charset="0"/>
+            </a:endParaRPr>
+          </a:p>
+        </p:txBody>
+      </p:sp>
+      <p:pic>
+        <p:nvPicPr>
+          <p:cNvPr id="5" name="Picture 4">
+            <a:extLst>
+              <a:ext uri="{FF2B5EF4-FFF2-40B4-BE49-F238E27FC236}">
+                <a16:creationId xmlns:a16="http://schemas.microsoft.com/office/drawing/2014/main" id="{7C18C04D-1B08-49C9-B13E-9C053C3D148A}"/>
+              </a:ext>
+            </a:extLst>
+          </p:cNvPr>
+          <p:cNvPicPr/>
+          <p:nvPr/>
+        </p:nvPicPr>
+        <p:blipFill>
+          <a:blip r:embed="rId2"/>
+          <a:stretch>
+            <a:fillRect/>
+          </a:stretch>
+        </p:blipFill>
+        <p:spPr>
+          <a:xfrm>
+            <a:off x="844964" y="2065552"/>
+            <a:ext cx="3238500" cy="2099310"/>
+          </a:xfrm>
+          <a:prstGeom prst="rect">
+            <a:avLst/>
+          </a:prstGeom>
+        </p:spPr>
+      </p:pic>
+      <p:sp>
+        <p:nvSpPr>
+          <p:cNvPr id="6" name="Rectangle 5">
+            <a:extLst>
+              <a:ext uri="{FF2B5EF4-FFF2-40B4-BE49-F238E27FC236}">
+                <a16:creationId xmlns:a16="http://schemas.microsoft.com/office/drawing/2014/main" id="{40F042E6-40FC-4C16-B35F-64E9C0F9ECFE}"/>
+              </a:ext>
+            </a:extLst>
+          </p:cNvPr>
+          <p:cNvSpPr/>
+          <p:nvPr/>
+        </p:nvSpPr>
+        <p:spPr>
+          <a:xfrm>
+            <a:off x="857794" y="4399489"/>
+            <a:ext cx="3967753" cy="369332"/>
+          </a:xfrm>
+          <a:prstGeom prst="rect">
+            <a:avLst/>
+          </a:prstGeom>
+        </p:spPr>
+        <p:txBody>
+          <a:bodyPr wrap="none">
+            <a:spAutoFit/>
+          </a:bodyPr>
+          <a:lstStyle/>
+          <a:p>
+            <a:r>
+              <a:rPr lang="en-US" dirty="0">
+                <a:latin typeface="Arial" panose="020B0604020202020204" pitchFamily="34" charset="0"/>
+                <a:ea typeface="Calibri" panose="020F0502020204030204" pitchFamily="34" charset="0"/>
+                <a:cs typeface="Times New Roman" panose="02020603050405020304" pitchFamily="18" charset="0"/>
+              </a:rPr>
+              <a:t>create a user to target the redirection</a:t>
+            </a:r>
+            <a:endParaRPr lang="en-GB" dirty="0"/>
+          </a:p>
+        </p:txBody>
+      </p:sp>
+      <p:pic>
+        <p:nvPicPr>
+          <p:cNvPr id="7" name="Picture 6">
+            <a:extLst>
+              <a:ext uri="{FF2B5EF4-FFF2-40B4-BE49-F238E27FC236}">
+                <a16:creationId xmlns:a16="http://schemas.microsoft.com/office/drawing/2014/main" id="{ADAF0E8B-F115-41D6-89D5-DB312AC0A5A1}"/>
+              </a:ext>
+            </a:extLst>
+          </p:cNvPr>
+          <p:cNvPicPr/>
+          <p:nvPr/>
+        </p:nvPicPr>
+        <p:blipFill>
+          <a:blip r:embed="rId3"/>
+          <a:stretch>
+            <a:fillRect/>
+          </a:stretch>
+        </p:blipFill>
+        <p:spPr>
+          <a:xfrm>
+            <a:off x="948922" y="4768821"/>
+            <a:ext cx="4168140" cy="735330"/>
+          </a:xfrm>
+          <a:prstGeom prst="rect">
+            <a:avLst/>
+          </a:prstGeom>
+        </p:spPr>
+      </p:pic>
+      <p:pic>
+        <p:nvPicPr>
+          <p:cNvPr id="8" name="Picture 7">
+            <a:extLst>
+              <a:ext uri="{FF2B5EF4-FFF2-40B4-BE49-F238E27FC236}">
+                <a16:creationId xmlns:a16="http://schemas.microsoft.com/office/drawing/2014/main" id="{5254454A-A651-49B7-9BAD-7B82A2E6A033}"/>
+              </a:ext>
+            </a:extLst>
+          </p:cNvPr>
+          <p:cNvPicPr/>
+          <p:nvPr/>
+        </p:nvPicPr>
+        <p:blipFill>
+          <a:blip r:embed="rId4"/>
+          <a:stretch>
+            <a:fillRect/>
+          </a:stretch>
+        </p:blipFill>
+        <p:spPr>
+          <a:xfrm>
+            <a:off x="948922" y="5504151"/>
+            <a:ext cx="4191000" cy="1101090"/>
+          </a:xfrm>
+          <a:prstGeom prst="rect">
+            <a:avLst/>
+          </a:prstGeom>
+        </p:spPr>
+      </p:pic>
+      <p:sp>
+        <p:nvSpPr>
+          <p:cNvPr id="9" name="Rectangle 8">
+            <a:extLst>
+              <a:ext uri="{FF2B5EF4-FFF2-40B4-BE49-F238E27FC236}">
+                <a16:creationId xmlns:a16="http://schemas.microsoft.com/office/drawing/2014/main" id="{2C42E8D9-E517-4B9F-8D6D-3627B77FE636}"/>
+              </a:ext>
+            </a:extLst>
+          </p:cNvPr>
+          <p:cNvSpPr/>
+          <p:nvPr/>
+        </p:nvSpPr>
+        <p:spPr>
+          <a:xfrm>
+            <a:off x="6198637" y="105811"/>
+            <a:ext cx="5057859" cy="369332"/>
+          </a:xfrm>
+          <a:prstGeom prst="rect">
+            <a:avLst/>
+          </a:prstGeom>
+        </p:spPr>
+        <p:txBody>
+          <a:bodyPr wrap="none">
+            <a:spAutoFit/>
+          </a:bodyPr>
+          <a:lstStyle/>
+          <a:p>
+            <a:r>
+              <a:rPr lang="en-US" dirty="0">
+                <a:latin typeface="Arial" panose="020B0604020202020204" pitchFamily="34" charset="0"/>
+                <a:ea typeface="Calibri" panose="020F0502020204030204" pitchFamily="34" charset="0"/>
+                <a:cs typeface="Times New Roman" panose="02020603050405020304" pitchFamily="18" charset="0"/>
+              </a:rPr>
+              <a:t>Create one of the new Method Actions for users</a:t>
+            </a:r>
+            <a:endParaRPr lang="en-GB" dirty="0"/>
+          </a:p>
+        </p:txBody>
+      </p:sp>
+      <p:pic>
+        <p:nvPicPr>
+          <p:cNvPr id="10" name="Picture 9">
+            <a:extLst>
+              <a:ext uri="{FF2B5EF4-FFF2-40B4-BE49-F238E27FC236}">
+                <a16:creationId xmlns:a16="http://schemas.microsoft.com/office/drawing/2014/main" id="{2275124B-1F8B-491F-BEF5-DC9FA59F30B0}"/>
+              </a:ext>
+            </a:extLst>
+          </p:cNvPr>
+          <p:cNvPicPr/>
+          <p:nvPr/>
+        </p:nvPicPr>
+        <p:blipFill>
+          <a:blip r:embed="rId5"/>
+          <a:stretch>
+            <a:fillRect/>
+          </a:stretch>
+        </p:blipFill>
+        <p:spPr>
+          <a:xfrm>
+            <a:off x="6198637" y="595623"/>
+            <a:ext cx="3855720" cy="3688715"/>
+          </a:xfrm>
+          <a:prstGeom prst="rect">
+            <a:avLst/>
+          </a:prstGeom>
+        </p:spPr>
+      </p:pic>
+      <p:sp>
+        <p:nvSpPr>
+          <p:cNvPr id="11" name="TextBox 10">
+            <a:extLst>
+              <a:ext uri="{FF2B5EF4-FFF2-40B4-BE49-F238E27FC236}">
+                <a16:creationId xmlns:a16="http://schemas.microsoft.com/office/drawing/2014/main" id="{71028372-54A8-43E7-A323-5C3D015FC4BD}"/>
+              </a:ext>
+            </a:extLst>
+          </p:cNvPr>
+          <p:cNvSpPr txBox="1"/>
+          <p:nvPr/>
+        </p:nvSpPr>
+        <p:spPr>
+          <a:xfrm>
+            <a:off x="10170368" y="3282346"/>
+            <a:ext cx="1866121" cy="943858"/>
+          </a:xfrm>
+          <a:prstGeom prst="rect">
+            <a:avLst/>
+          </a:prstGeom>
+          <a:noFill/>
+        </p:spPr>
+        <p:txBody>
+          <a:bodyPr wrap="square" rtlCol="0">
+            <a:spAutoFit/>
+          </a:bodyPr>
+          <a:lstStyle/>
+          <a:p>
+            <a:r>
+              <a:rPr lang="en-GB" dirty="0"/>
+              <a:t>Add here a link to the Notify Redirector object.</a:t>
+            </a:r>
+          </a:p>
+        </p:txBody>
+      </p:sp>
+      <p:cxnSp>
+        <p:nvCxnSpPr>
+          <p:cNvPr id="13" name="Straight Arrow Connector 12">
+            <a:extLst>
+              <a:ext uri="{FF2B5EF4-FFF2-40B4-BE49-F238E27FC236}">
+                <a16:creationId xmlns:a16="http://schemas.microsoft.com/office/drawing/2014/main" id="{1A3B8C4A-FBE0-4EBE-9A81-263A2D077D20}"/>
+              </a:ext>
+            </a:extLst>
+          </p:cNvPr>
+          <p:cNvCxnSpPr/>
+          <p:nvPr/>
+        </p:nvCxnSpPr>
+        <p:spPr>
+          <a:xfrm flipH="1">
+            <a:off x="9657184" y="3688960"/>
+            <a:ext cx="397173" cy="65315"/>
+          </a:xfrm>
+          <a:prstGeom prst="straightConnector1">
+            <a:avLst/>
+          </a:prstGeom>
+          <a:ln>
+            <a:solidFill>
+              <a:srgbClr val="FF0000"/>
+            </a:solidFill>
+            <a:tailEnd type="triangle"/>
+          </a:ln>
+        </p:spPr>
+        <p:style>
+          <a:lnRef idx="1">
+            <a:schemeClr val="accent1"/>
+          </a:lnRef>
+          <a:fillRef idx="0">
+            <a:schemeClr val="accent1"/>
+          </a:fillRef>
+          <a:effectRef idx="0">
+            <a:schemeClr val="accent1"/>
+          </a:effectRef>
+          <a:fontRef idx="minor">
+            <a:schemeClr val="tx1"/>
+          </a:fontRef>
+        </p:style>
+      </p:cxnSp>
+      <p:cxnSp>
+        <p:nvCxnSpPr>
+          <p:cNvPr id="14" name="Straight Arrow Connector 13">
+            <a:extLst>
+              <a:ext uri="{FF2B5EF4-FFF2-40B4-BE49-F238E27FC236}">
+                <a16:creationId xmlns:a16="http://schemas.microsoft.com/office/drawing/2014/main" id="{D8CC119C-9140-447D-8FA3-14AEE0854875}"/>
+              </a:ext>
+            </a:extLst>
+          </p:cNvPr>
+          <p:cNvCxnSpPr>
+            <a:cxnSpLocks/>
+          </p:cNvCxnSpPr>
+          <p:nvPr/>
+        </p:nvCxnSpPr>
+        <p:spPr>
+          <a:xfrm flipH="1" flipV="1">
+            <a:off x="9585805" y="4192362"/>
+            <a:ext cx="320273" cy="91976"/>
+          </a:xfrm>
+          <a:prstGeom prst="straightConnector1">
+            <a:avLst/>
+          </a:prstGeom>
+          <a:ln>
+            <a:solidFill>
+              <a:srgbClr val="FF0000"/>
+            </a:solidFill>
+            <a:tailEnd type="triangle"/>
+          </a:ln>
+        </p:spPr>
+        <p:style>
+          <a:lnRef idx="1">
+            <a:schemeClr val="accent1"/>
+          </a:lnRef>
+          <a:fillRef idx="0">
+            <a:schemeClr val="accent1"/>
+          </a:fillRef>
+          <a:effectRef idx="0">
+            <a:schemeClr val="accent1"/>
+          </a:effectRef>
+          <a:fontRef idx="minor">
+            <a:schemeClr val="tx1"/>
+          </a:fontRef>
+        </p:style>
+      </p:cxnSp>
+      <p:sp>
+        <p:nvSpPr>
+          <p:cNvPr id="17" name="TextBox 16">
+            <a:extLst>
+              <a:ext uri="{FF2B5EF4-FFF2-40B4-BE49-F238E27FC236}">
+                <a16:creationId xmlns:a16="http://schemas.microsoft.com/office/drawing/2014/main" id="{6DE170DE-8F5C-4884-A93A-FF533B2713E5}"/>
+              </a:ext>
+            </a:extLst>
+          </p:cNvPr>
+          <p:cNvSpPr txBox="1"/>
+          <p:nvPr/>
+        </p:nvSpPr>
+        <p:spPr>
+          <a:xfrm>
+            <a:off x="7441948" y="4300027"/>
+            <a:ext cx="4287714" cy="646331"/>
+          </a:xfrm>
+          <a:prstGeom prst="rect">
+            <a:avLst/>
+          </a:prstGeom>
+          <a:noFill/>
+        </p:spPr>
+        <p:txBody>
+          <a:bodyPr wrap="square" rtlCol="0">
+            <a:spAutoFit/>
+          </a:bodyPr>
+          <a:lstStyle/>
+          <a:p>
+            <a:r>
+              <a:rPr lang="en-GB" dirty="0"/>
+              <a:t>Add method name and parameters here. </a:t>
+            </a:r>
+          </a:p>
+          <a:p>
+            <a:r>
+              <a:rPr lang="en-GB" dirty="0"/>
+              <a:t>(</a:t>
+            </a:r>
+            <a:r>
+              <a:rPr lang="en-GB" u="sng" dirty="0"/>
+              <a:t>See next page</a:t>
+            </a:r>
+            <a:r>
+              <a:rPr lang="en-GB" dirty="0"/>
+              <a:t>) </a:t>
+            </a:r>
+          </a:p>
+        </p:txBody>
+      </p:sp>
+      <p:sp>
+        <p:nvSpPr>
+          <p:cNvPr id="18" name="Rectangle 17">
+            <a:extLst>
+              <a:ext uri="{FF2B5EF4-FFF2-40B4-BE49-F238E27FC236}">
+                <a16:creationId xmlns:a16="http://schemas.microsoft.com/office/drawing/2014/main" id="{F083429B-004E-453D-9A45-0F2CA5A08005}"/>
+              </a:ext>
+            </a:extLst>
+          </p:cNvPr>
+          <p:cNvSpPr/>
+          <p:nvPr/>
+        </p:nvSpPr>
+        <p:spPr>
+          <a:xfrm>
+            <a:off x="6008915" y="4977823"/>
+            <a:ext cx="6096000" cy="646331"/>
+          </a:xfrm>
+          <a:prstGeom prst="rect">
+            <a:avLst/>
+          </a:prstGeom>
+        </p:spPr>
+        <p:txBody>
+          <a:bodyPr>
+            <a:spAutoFit/>
+          </a:bodyPr>
+          <a:lstStyle/>
+          <a:p>
+            <a:r>
+              <a:rPr lang="en-US" dirty="0">
+                <a:latin typeface="Arial" panose="020B0604020202020204" pitchFamily="34" charset="0"/>
+                <a:ea typeface="Calibri" panose="020F0502020204030204" pitchFamily="34" charset="0"/>
+                <a:cs typeface="Times New Roman" panose="02020603050405020304" pitchFamily="18" charset="0"/>
+              </a:rPr>
+              <a:t>Add this new alarm redirection to the group/folder containing alarms to be redirected.</a:t>
+            </a:r>
+            <a:endParaRPr lang="en-GB" dirty="0"/>
+          </a:p>
+        </p:txBody>
+      </p:sp>
+      <p:pic>
+        <p:nvPicPr>
+          <p:cNvPr id="19" name="Picture 18">
+            <a:extLst>
+              <a:ext uri="{FF2B5EF4-FFF2-40B4-BE49-F238E27FC236}">
+                <a16:creationId xmlns:a16="http://schemas.microsoft.com/office/drawing/2014/main" id="{AA9B8DA7-A952-4178-B660-4B8609CF1445}"/>
+              </a:ext>
+            </a:extLst>
+          </p:cNvPr>
+          <p:cNvPicPr/>
+          <p:nvPr/>
+        </p:nvPicPr>
+        <p:blipFill>
+          <a:blip r:embed="rId6"/>
+          <a:stretch>
+            <a:fillRect/>
+          </a:stretch>
+        </p:blipFill>
+        <p:spPr>
+          <a:xfrm>
+            <a:off x="6096000" y="5561301"/>
+            <a:ext cx="5731510" cy="1252855"/>
+          </a:xfrm>
+          <a:prstGeom prst="rect">
+            <a:avLst/>
+          </a:prstGeom>
+        </p:spPr>
+      </p:pic>
+      <p:sp>
+        <p:nvSpPr>
+          <p:cNvPr id="15" name="Rectangle 14">
+            <a:extLst>
+              <a:ext uri="{FF2B5EF4-FFF2-40B4-BE49-F238E27FC236}">
+                <a16:creationId xmlns:a16="http://schemas.microsoft.com/office/drawing/2014/main" id="{A0A5FD13-8A71-484C-9097-C22DB67A07E1}"/>
+              </a:ext>
+            </a:extLst>
+          </p:cNvPr>
+          <p:cNvSpPr/>
+          <p:nvPr/>
+        </p:nvSpPr>
+        <p:spPr>
+          <a:xfrm>
+            <a:off x="2872971" y="5751265"/>
+            <a:ext cx="3078793" cy="923330"/>
+          </a:xfrm>
+          <a:prstGeom prst="rect">
+            <a:avLst/>
+          </a:prstGeom>
+        </p:spPr>
+        <p:txBody>
+          <a:bodyPr wrap="square">
+            <a:spAutoFit/>
+          </a:bodyPr>
+          <a:lstStyle/>
+          <a:p>
+            <a:r>
+              <a:rPr lang="en-GB" dirty="0"/>
+              <a:t>The phone number must be formatted as E.164 (e.g. +1xxxxxxxxxx)</a:t>
+            </a:r>
+          </a:p>
+        </p:txBody>
+      </p:sp>
+    </p:spTree>
+    <p:extLst>
+      <p:ext uri="{BB962C8B-B14F-4D97-AF65-F5344CB8AC3E}">
+        <p14:creationId xmlns:p14="http://schemas.microsoft.com/office/powerpoint/2010/main" val="832947857"/>
       </p:ext>
     </p:extLst>
   </p:cSld>
@@ -5739,6 +5784,340 @@
     <p:extLst>
       <p:ext uri="{BB962C8B-B14F-4D97-AF65-F5344CB8AC3E}">
         <p14:creationId xmlns:p14="http://schemas.microsoft.com/office/powerpoint/2010/main" val="3112823000"/>
+      </p:ext>
+    </p:extLst>
+  </p:cSld>
+  <p:clrMapOvr>
+    <a:masterClrMapping/>
+  </p:clrMapOvr>
+</p:sld>
+</file>
+
+<file path=ppt/slides/slide20.xml><?xml version="1.0" encoding="utf-8"?>
+<p:sld xmlns:a="http://schemas.openxmlformats.org/drawingml/2006/main" xmlns:r="http://schemas.openxmlformats.org/officeDocument/2006/relationships" xmlns:p="http://schemas.openxmlformats.org/presentationml/2006/main">
+  <p:cSld>
+    <p:spTree>
+      <p:nvGrpSpPr>
+        <p:cNvPr id="1" name=""/>
+        <p:cNvGrpSpPr/>
+        <p:nvPr/>
+      </p:nvGrpSpPr>
+      <p:grpSpPr>
+        <a:xfrm>
+          <a:off x="0" y="0"/>
+          <a:ext cx="0" cy="0"/>
+          <a:chOff x="0" y="0"/>
+          <a:chExt cx="0" cy="0"/>
+        </a:xfrm>
+      </p:grpSpPr>
+      <p:sp>
+        <p:nvSpPr>
+          <p:cNvPr id="2" name="Title 1">
+            <a:extLst>
+              <a:ext uri="{FF2B5EF4-FFF2-40B4-BE49-F238E27FC236}">
+                <a16:creationId xmlns:a16="http://schemas.microsoft.com/office/drawing/2014/main" id="{803B6C7B-92C7-42CE-B6F2-B2C8D0F7D6B9}"/>
+              </a:ext>
+            </a:extLst>
+          </p:cNvPr>
+          <p:cNvSpPr>
+            <a:spLocks noGrp="1"/>
+          </p:cNvSpPr>
+          <p:nvPr>
+            <p:ph type="title"/>
+          </p:nvPr>
+        </p:nvSpPr>
+        <p:spPr/>
+        <p:txBody>
+          <a:bodyPr/>
+          <a:lstStyle/>
+          <a:p>
+            <a:r>
+              <a:rPr lang="en-GB" dirty="0"/>
+              <a:t>Sample alarm text</a:t>
+            </a:r>
+          </a:p>
+        </p:txBody>
+      </p:sp>
+      <p:sp>
+        <p:nvSpPr>
+          <p:cNvPr id="3" name="Content Placeholder 2">
+            <a:extLst>
+              <a:ext uri="{FF2B5EF4-FFF2-40B4-BE49-F238E27FC236}">
+                <a16:creationId xmlns:a16="http://schemas.microsoft.com/office/drawing/2014/main" id="{96610AB8-F04C-4CD1-9D6E-EF35B6AB1CF7}"/>
+              </a:ext>
+            </a:extLst>
+          </p:cNvPr>
+          <p:cNvSpPr>
+            <a:spLocks noGrp="1"/>
+          </p:cNvSpPr>
+          <p:nvPr>
+            <p:ph idx="1"/>
+          </p:nvPr>
+        </p:nvSpPr>
+        <p:spPr/>
+        <p:txBody>
+          <a:bodyPr>
+            <a:normAutofit/>
+          </a:bodyPr>
+          <a:lstStyle/>
+          <a:p>
+            <a:r>
+              <a:rPr lang="en-GB" dirty="0"/>
+              <a:t>This contains many possible fields. You may wish to omit many of them.</a:t>
+            </a:r>
+          </a:p>
+          <a:p>
+            <a:r>
+              <a:rPr lang="en-GB" dirty="0"/>
+              <a:t>For </a:t>
+            </a:r>
+            <a:r>
+              <a:rPr lang="en-GB" dirty="0" err="1"/>
+              <a:t>NotifyMessageVoice</a:t>
+            </a:r>
+            <a:r>
+              <a:rPr lang="en-GB" dirty="0"/>
+              <a:t>, omit the last ‘cookie’ parameter.</a:t>
+            </a:r>
+          </a:p>
+          <a:p>
+            <a:endParaRPr lang="en-GB" dirty="0"/>
+          </a:p>
+          <a:p>
+            <a:pPr marL="0" indent="0">
+              <a:buNone/>
+            </a:pPr>
+            <a:r>
+              <a:rPr lang="en-GB" sz="2000" dirty="0" err="1">
+                <a:latin typeface="Arial monospaced for SAP" panose="020B0609020202030204" pitchFamily="49" charset="0"/>
+              </a:rPr>
+              <a:t>NotifyAlarmVoice</a:t>
+            </a:r>
+            <a:r>
+              <a:rPr lang="en-GB" sz="2000" dirty="0">
+                <a:latin typeface="Arial monospaced for SAP" panose="020B0609020202030204" pitchFamily="49" charset="0"/>
+              </a:rPr>
+              <a:t>( 'Severity %</a:t>
+            </a:r>
+            <a:r>
+              <a:rPr lang="en-GB" sz="2000" dirty="0" err="1">
+                <a:latin typeface="Arial monospaced for SAP" panose="020B0609020202030204" pitchFamily="49" charset="0"/>
+              </a:rPr>
+              <a:t>ASeverity</a:t>
+            </a:r>
+            <a:r>
+              <a:rPr lang="en-GB" sz="2000" dirty="0">
+                <a:latin typeface="Arial monospaced for SAP" panose="020B0609020202030204" pitchFamily="49" charset="0"/>
+              </a:rPr>
+              <a:t>%. Source %</a:t>
+            </a:r>
+            <a:r>
+              <a:rPr lang="en-GB" sz="2000" dirty="0" err="1">
+                <a:latin typeface="Arial monospaced for SAP" panose="020B0609020202030204" pitchFamily="49" charset="0"/>
+              </a:rPr>
+              <a:t>ASource</a:t>
+            </a:r>
+            <a:r>
+              <a:rPr lang="en-GB" sz="2000" dirty="0">
+                <a:latin typeface="Arial monospaced for SAP" panose="020B0609020202030204" pitchFamily="49" charset="0"/>
+              </a:rPr>
+              <a:t>%. Message %</a:t>
+            </a:r>
+            <a:r>
+              <a:rPr lang="en-GB" sz="2000" dirty="0" err="1">
+                <a:latin typeface="Arial monospaced for SAP" panose="020B0609020202030204" pitchFamily="49" charset="0"/>
+              </a:rPr>
+              <a:t>AMessage</a:t>
+            </a:r>
+            <a:r>
+              <a:rPr lang="en-GB" sz="2000" dirty="0">
+                <a:latin typeface="Arial monospaced for SAP" panose="020B0609020202030204" pitchFamily="49" charset="0"/>
+              </a:rPr>
+              <a:t>%. Category %</a:t>
+            </a:r>
+            <a:r>
+              <a:rPr lang="en-GB" sz="2000" dirty="0" err="1">
+                <a:latin typeface="Arial monospaced for SAP" panose="020B0609020202030204" pitchFamily="49" charset="0"/>
+              </a:rPr>
+              <a:t>ACategory</a:t>
+            </a:r>
+            <a:r>
+              <a:rPr lang="en-GB" sz="2000" dirty="0">
+                <a:latin typeface="Arial monospaced for SAP" panose="020B0609020202030204" pitchFamily="49" charset="0"/>
+              </a:rPr>
+              <a:t>%. Condition %</a:t>
+            </a:r>
+            <a:r>
+              <a:rPr lang="en-GB" sz="2000" dirty="0" err="1">
+                <a:latin typeface="Arial monospaced for SAP" panose="020B0609020202030204" pitchFamily="49" charset="0"/>
+              </a:rPr>
+              <a:t>ACondName</a:t>
+            </a:r>
+            <a:r>
+              <a:rPr lang="en-GB" sz="2000" dirty="0">
+                <a:latin typeface="Arial monospaced for SAP" panose="020B0609020202030204" pitchFamily="49" charset="0"/>
+              </a:rPr>
+              <a:t>%. Sub-condition %</a:t>
+            </a:r>
+            <a:r>
+              <a:rPr lang="en-GB" sz="2000" dirty="0" err="1">
+                <a:latin typeface="Arial monospaced for SAP" panose="020B0609020202030204" pitchFamily="49" charset="0"/>
+              </a:rPr>
+              <a:t>ASubCondName</a:t>
+            </a:r>
+            <a:r>
+              <a:rPr lang="en-GB" sz="2000" dirty="0">
+                <a:latin typeface="Arial monospaced for SAP" panose="020B0609020202030204" pitchFamily="49" charset="0"/>
+              </a:rPr>
+              <a:t>%. Active time %</a:t>
+            </a:r>
+            <a:r>
+              <a:rPr lang="en-GB" sz="2000" dirty="0" err="1">
+                <a:latin typeface="Arial monospaced for SAP" panose="020B0609020202030204" pitchFamily="49" charset="0"/>
+              </a:rPr>
+              <a:t>ASubCondActiveDateTime</a:t>
+            </a:r>
+            <a:r>
+              <a:rPr lang="en-GB" sz="2000" dirty="0">
+                <a:latin typeface="Arial monospaced for SAP" panose="020B0609020202030204" pitchFamily="49" charset="0"/>
+              </a:rPr>
+              <a:t>%. From server %N To user %</a:t>
+            </a:r>
+            <a:r>
+              <a:rPr lang="en-GB" sz="2000" dirty="0" err="1">
+                <a:latin typeface="Arial monospaced for SAP" panose="020B0609020202030204" pitchFamily="49" charset="0"/>
+              </a:rPr>
+              <a:t>rUserId.Name</a:t>
+            </a:r>
+            <a:r>
+              <a:rPr lang="en-GB" sz="2000" dirty="0">
+                <a:latin typeface="Arial monospaced for SAP" panose="020B0609020202030204" pitchFamily="49" charset="0"/>
+              </a:rPr>
+              <a:t>%.', '%</a:t>
+            </a:r>
+            <a:r>
+              <a:rPr lang="en-GB" sz="2000" dirty="0" err="1">
+                <a:latin typeface="Arial monospaced for SAP" panose="020B0609020202030204" pitchFamily="49" charset="0"/>
+              </a:rPr>
+              <a:t>rUserId.ContactConfig.VoicemailNumber</a:t>
+            </a:r>
+            <a:r>
+              <a:rPr lang="en-GB" sz="2000" dirty="0">
+                <a:latin typeface="Arial monospaced for SAP" panose="020B0609020202030204" pitchFamily="49" charset="0"/>
+              </a:rPr>
+              <a:t>%', 'VOICE', '</a:t>
+            </a:r>
+            <a:r>
+              <a:rPr lang="en-GB" sz="2000" dirty="0"/>
+              <a:t>%</a:t>
+            </a:r>
+            <a:r>
+              <a:rPr lang="en-GB" sz="2000" dirty="0" err="1"/>
+              <a:t>ACookie</a:t>
+            </a:r>
+            <a:r>
+              <a:rPr lang="en-GB" sz="2000" dirty="0"/>
+              <a:t>%</a:t>
+            </a:r>
+            <a:r>
+              <a:rPr lang="en-GB" sz="2000" dirty="0">
+                <a:latin typeface="Arial monospaced for SAP" panose="020B0609020202030204" pitchFamily="49" charset="0"/>
+              </a:rPr>
+              <a:t>' )</a:t>
+            </a:r>
+          </a:p>
+        </p:txBody>
+      </p:sp>
+    </p:spTree>
+    <p:extLst>
+      <p:ext uri="{BB962C8B-B14F-4D97-AF65-F5344CB8AC3E}">
+        <p14:creationId xmlns:p14="http://schemas.microsoft.com/office/powerpoint/2010/main" val="2635787459"/>
+      </p:ext>
+    </p:extLst>
+  </p:cSld>
+  <p:clrMapOvr>
+    <a:masterClrMapping/>
+  </p:clrMapOvr>
+</p:sld>
+</file>
+
+<file path=ppt/slides/slide21.xml><?xml version="1.0" encoding="utf-8"?>
+<p:sld xmlns:a="http://schemas.openxmlformats.org/drawingml/2006/main" xmlns:r="http://schemas.openxmlformats.org/officeDocument/2006/relationships" xmlns:p="http://schemas.openxmlformats.org/presentationml/2006/main">
+  <p:cSld>
+    <p:spTree>
+      <p:nvGrpSpPr>
+        <p:cNvPr id="1" name=""/>
+        <p:cNvGrpSpPr/>
+        <p:nvPr/>
+      </p:nvGrpSpPr>
+      <p:grpSpPr>
+        <a:xfrm>
+          <a:off x="0" y="0"/>
+          <a:ext cx="0" cy="0"/>
+          <a:chOff x="0" y="0"/>
+          <a:chExt cx="0" cy="0"/>
+        </a:xfrm>
+      </p:grpSpPr>
+      <p:sp>
+        <p:nvSpPr>
+          <p:cNvPr id="2" name="Title 1">
+            <a:extLst>
+              <a:ext uri="{FF2B5EF4-FFF2-40B4-BE49-F238E27FC236}">
+                <a16:creationId xmlns:a16="http://schemas.microsoft.com/office/drawing/2014/main" id="{C088831A-DDB7-4E7C-BE45-CDADD28FBF56}"/>
+              </a:ext>
+            </a:extLst>
+          </p:cNvPr>
+          <p:cNvSpPr>
+            <a:spLocks noGrp="1"/>
+          </p:cNvSpPr>
+          <p:nvPr>
+            <p:ph type="title"/>
+          </p:nvPr>
+        </p:nvSpPr>
+        <p:spPr/>
+        <p:txBody>
+          <a:bodyPr/>
+          <a:lstStyle/>
+          <a:p>
+            <a:r>
+              <a:rPr lang="en-GB" dirty="0"/>
+              <a:t>Thank-you</a:t>
+            </a:r>
+          </a:p>
+        </p:txBody>
+      </p:sp>
+      <p:sp>
+        <p:nvSpPr>
+          <p:cNvPr id="3" name="Content Placeholder 2">
+            <a:extLst>
+              <a:ext uri="{FF2B5EF4-FFF2-40B4-BE49-F238E27FC236}">
+                <a16:creationId xmlns:a16="http://schemas.microsoft.com/office/drawing/2014/main" id="{B4979852-F5B5-4032-BBDD-73FABC498E0D}"/>
+              </a:ext>
+            </a:extLst>
+          </p:cNvPr>
+          <p:cNvSpPr>
+            <a:spLocks noGrp="1"/>
+          </p:cNvSpPr>
+          <p:nvPr>
+            <p:ph idx="1"/>
+          </p:nvPr>
+        </p:nvSpPr>
+        <p:spPr/>
+        <p:txBody>
+          <a:bodyPr/>
+          <a:lstStyle/>
+          <a:p>
+            <a:r>
+              <a:rPr lang="en-GB" dirty="0"/>
+              <a:t>Please go to the Telemetry Forum to discuss this example.</a:t>
+            </a:r>
+          </a:p>
+        </p:txBody>
+      </p:sp>
+    </p:spTree>
+    <p:extLst>
+      <p:ext uri="{BB962C8B-B14F-4D97-AF65-F5344CB8AC3E}">
+        <p14:creationId xmlns:p14="http://schemas.microsoft.com/office/powerpoint/2010/main" val="1283978724"/>
       </p:ext>
     </p:extLst>
   </p:cSld>
@@ -7002,7 +7381,7 @@
           <p:cNvPr id="2" name="Title 1">
             <a:extLst>
               <a:ext uri="{FF2B5EF4-FFF2-40B4-BE49-F238E27FC236}">
-                <a16:creationId xmlns:a16="http://schemas.microsoft.com/office/drawing/2014/main" id="{856123CF-A895-4784-AEB6-05A324F7FD70}"/>
+                <a16:creationId xmlns:a16="http://schemas.microsoft.com/office/drawing/2014/main" id="{D055B4D0-EF3E-4FD1-B3EB-98D6B3181891}"/>
               </a:ext>
             </a:extLst>
           </p:cNvPr>
@@ -7020,7 +7399,7 @@
           <a:p>
             <a:r>
               <a:rPr lang="en-GB" dirty="0"/>
-              <a:t>Setting up Twilio</a:t>
+              <a:t>Driver to Redirector</a:t>
             </a:r>
           </a:p>
         </p:txBody>
@@ -7030,7 +7409,7 @@
           <p:cNvPr id="3" name="Content Placeholder 2">
             <a:extLst>
               <a:ext uri="{FF2B5EF4-FFF2-40B4-BE49-F238E27FC236}">
-                <a16:creationId xmlns:a16="http://schemas.microsoft.com/office/drawing/2014/main" id="{42D1A0DC-02F3-4EBD-85CB-8CE8C78EC345}"/>
+                <a16:creationId xmlns:a16="http://schemas.microsoft.com/office/drawing/2014/main" id="{A0C32356-B01E-42A4-AE54-17E092063F95}"/>
               </a:ext>
             </a:extLst>
           </p:cNvPr>
@@ -7048,33 +7427,264 @@
           <a:p>
             <a:r>
               <a:rPr lang="en-GB" dirty="0"/>
-              <a:t>Twilio is a simple web-based subscription service</a:t>
+              <a:t>Web service hosted on /</a:t>
+            </a:r>
+            <a:r>
+              <a:rPr lang="en-GB" dirty="0" err="1"/>
+              <a:t>NotifyRequest</a:t>
+            </a:r>
+            <a:r>
+              <a:rPr lang="en-GB" dirty="0"/>
+              <a:t>/</a:t>
             </a:r>
           </a:p>
           <a:p>
             <a:pPr lvl="1"/>
             <a:r>
               <a:rPr lang="en-GB" dirty="0"/>
-              <a:t>Messages are costed individually or in packages, making it economic for alarm redirection</a:t>
-            </a:r>
-          </a:p>
-          <a:p>
-            <a:r>
-              <a:rPr lang="en-GB" dirty="0"/>
-              <a:t>You will need to lease a phone number which Twilio uses to send out messages, you can select this on Twilio based on a suitable location</a:t>
-            </a:r>
-          </a:p>
-          <a:p>
-            <a:r>
-              <a:rPr lang="en-GB" dirty="0"/>
-              <a:t>Our demonstration uses the Twilio ‘Flow’ facility which makes it easy to design step-by-step processes for call interaction</a:t>
+              <a:t>Data sent in query string parameters</a:t>
             </a:r>
           </a:p>
           <a:p>
             <a:pPr lvl="1"/>
             <a:r>
               <a:rPr lang="en-GB" dirty="0"/>
-              <a:t>We show you how to create a flow with the parameters needed</a:t>
+              <a:t>If type is ‘SMS’ or ‘VOICE’ this is a request to make a call or message</a:t>
+            </a:r>
+          </a:p>
+          <a:p>
+            <a:pPr lvl="2"/>
+            <a:r>
+              <a:rPr lang="en-GB" dirty="0"/>
+              <a:t>key is the Twilio service key, phone message and cookie are used to make the call</a:t>
+            </a:r>
+          </a:p>
+          <a:p>
+            <a:pPr lvl="1"/>
+            <a:r>
+              <a:rPr lang="en-GB" dirty="0"/>
+              <a:t>If type is ‘STATUS’ this is used to request feedback from Twilio, such as call failure – the responses are buffered (see next page) and fed back as lines in the response body</a:t>
+            </a:r>
+          </a:p>
+          <a:p>
+            <a:pPr lvl="1"/>
+            <a:r>
+              <a:rPr lang="en-GB" dirty="0"/>
+              <a:t>If type is ‘STATUS’ and alarm acknowledgements are set up in Twilio, and the #define feature ‘FEATURE_ALARM_ACK’ is enabled then the request message sends alarm acknowledgement status messages to the Redirector</a:t>
+            </a:r>
+          </a:p>
+          <a:p>
+            <a:endParaRPr lang="en-GB" dirty="0"/>
+          </a:p>
+        </p:txBody>
+      </p:sp>
+      <p:sp>
+        <p:nvSpPr>
+          <p:cNvPr id="4" name="Rectangle 3">
+            <a:extLst>
+              <a:ext uri="{FF2B5EF4-FFF2-40B4-BE49-F238E27FC236}">
+                <a16:creationId xmlns:a16="http://schemas.microsoft.com/office/drawing/2014/main" id="{0EC49DDA-87CF-4731-8FAC-927492E0FAA7}"/>
+              </a:ext>
+            </a:extLst>
+          </p:cNvPr>
+          <p:cNvSpPr/>
+          <p:nvPr/>
+        </p:nvSpPr>
+        <p:spPr>
+          <a:xfrm>
+            <a:off x="7491486" y="561848"/>
+            <a:ext cx="1250301" cy="1455576"/>
+          </a:xfrm>
+          <a:prstGeom prst="rect">
+            <a:avLst/>
+          </a:prstGeom>
+        </p:spPr>
+        <p:style>
+          <a:lnRef idx="2">
+            <a:schemeClr val="accent1">
+              <a:shade val="50000"/>
+            </a:schemeClr>
+          </a:lnRef>
+          <a:fillRef idx="1">
+            <a:schemeClr val="accent1"/>
+          </a:fillRef>
+          <a:effectRef idx="0">
+            <a:schemeClr val="accent1"/>
+          </a:effectRef>
+          <a:fontRef idx="minor">
+            <a:schemeClr val="lt1"/>
+          </a:fontRef>
+        </p:style>
+        <p:txBody>
+          <a:bodyPr rtlCol="0" anchor="ctr"/>
+          <a:lstStyle/>
+          <a:p>
+            <a:pPr algn="ctr"/>
+            <a:r>
+              <a:rPr lang="en-GB" dirty="0"/>
+              <a:t>“Notify” driver</a:t>
+            </a:r>
+          </a:p>
+        </p:txBody>
+      </p:sp>
+      <p:sp>
+        <p:nvSpPr>
+          <p:cNvPr id="5" name="Rectangle 4">
+            <a:extLst>
+              <a:ext uri="{FF2B5EF4-FFF2-40B4-BE49-F238E27FC236}">
+                <a16:creationId xmlns:a16="http://schemas.microsoft.com/office/drawing/2014/main" id="{0CC14131-CFD4-414A-88DB-12CCD88741DF}"/>
+              </a:ext>
+            </a:extLst>
+          </p:cNvPr>
+          <p:cNvSpPr/>
+          <p:nvPr/>
+        </p:nvSpPr>
+        <p:spPr>
+          <a:xfrm>
+            <a:off x="10253347" y="561848"/>
+            <a:ext cx="1707502" cy="1455575"/>
+          </a:xfrm>
+          <a:prstGeom prst="rect">
+            <a:avLst/>
+          </a:prstGeom>
+        </p:spPr>
+        <p:style>
+          <a:lnRef idx="2">
+            <a:schemeClr val="accent1">
+              <a:shade val="50000"/>
+            </a:schemeClr>
+          </a:lnRef>
+          <a:fillRef idx="1">
+            <a:schemeClr val="accent1"/>
+          </a:fillRef>
+          <a:effectRef idx="0">
+            <a:schemeClr val="accent1"/>
+          </a:effectRef>
+          <a:fontRef idx="minor">
+            <a:schemeClr val="lt1"/>
+          </a:fontRef>
+        </p:style>
+        <p:txBody>
+          <a:bodyPr rtlCol="0" anchor="ctr"/>
+          <a:lstStyle/>
+          <a:p>
+            <a:pPr algn="ctr"/>
+            <a:r>
+              <a:rPr lang="en-GB" dirty="0"/>
+              <a:t>“Redirector” web server/client</a:t>
+            </a:r>
+          </a:p>
+        </p:txBody>
+      </p:sp>
+      <p:cxnSp>
+        <p:nvCxnSpPr>
+          <p:cNvPr id="6" name="Straight Arrow Connector 5">
+            <a:extLst>
+              <a:ext uri="{FF2B5EF4-FFF2-40B4-BE49-F238E27FC236}">
+                <a16:creationId xmlns:a16="http://schemas.microsoft.com/office/drawing/2014/main" id="{B992EB3A-101D-45DA-BC8C-E18F4FF3EE57}"/>
+              </a:ext>
+            </a:extLst>
+          </p:cNvPr>
+          <p:cNvCxnSpPr>
+            <a:cxnSpLocks/>
+            <a:stCxn id="4" idx="3"/>
+            <a:endCxn id="5" idx="1"/>
+          </p:cNvCxnSpPr>
+          <p:nvPr/>
+        </p:nvCxnSpPr>
+        <p:spPr>
+          <a:xfrm>
+            <a:off x="8741787" y="1289636"/>
+            <a:ext cx="1511560" cy="0"/>
+          </a:xfrm>
+          <a:prstGeom prst="straightConnector1">
+            <a:avLst/>
+          </a:prstGeom>
+          <a:ln>
+            <a:tailEnd type="triangle"/>
+          </a:ln>
+        </p:spPr>
+        <p:style>
+          <a:lnRef idx="1">
+            <a:schemeClr val="accent1"/>
+          </a:lnRef>
+          <a:fillRef idx="0">
+            <a:schemeClr val="accent1"/>
+          </a:fillRef>
+          <a:effectRef idx="0">
+            <a:schemeClr val="accent1"/>
+          </a:effectRef>
+          <a:fontRef idx="minor">
+            <a:schemeClr val="tx1"/>
+          </a:fontRef>
+        </p:style>
+      </p:cxnSp>
+      <p:sp>
+        <p:nvSpPr>
+          <p:cNvPr id="7" name="TextBox 6">
+            <a:extLst>
+              <a:ext uri="{FF2B5EF4-FFF2-40B4-BE49-F238E27FC236}">
+                <a16:creationId xmlns:a16="http://schemas.microsoft.com/office/drawing/2014/main" id="{306FFC4F-9649-49CB-8504-E42F160E9791}"/>
+              </a:ext>
+            </a:extLst>
+          </p:cNvPr>
+          <p:cNvSpPr txBox="1"/>
+          <p:nvPr/>
+        </p:nvSpPr>
+        <p:spPr>
+          <a:xfrm>
+            <a:off x="7491486" y="145085"/>
+            <a:ext cx="1355566" cy="369332"/>
+          </a:xfrm>
+          <a:prstGeom prst="rect">
+            <a:avLst/>
+          </a:prstGeom>
+          <a:noFill/>
+        </p:spPr>
+        <p:txBody>
+          <a:bodyPr wrap="square" rtlCol="0">
+            <a:spAutoFit/>
+          </a:bodyPr>
+          <a:lstStyle/>
+          <a:p>
+            <a:r>
+              <a:rPr lang="en-GB" dirty="0"/>
+              <a:t>Web client</a:t>
+            </a:r>
+          </a:p>
+        </p:txBody>
+      </p:sp>
+      <p:sp>
+        <p:nvSpPr>
+          <p:cNvPr id="8" name="TextBox 7">
+            <a:extLst>
+              <a:ext uri="{FF2B5EF4-FFF2-40B4-BE49-F238E27FC236}">
+                <a16:creationId xmlns:a16="http://schemas.microsoft.com/office/drawing/2014/main" id="{8C07664E-CC09-4620-8B4F-FAEE5BF23EC0}"/>
+              </a:ext>
+            </a:extLst>
+          </p:cNvPr>
+          <p:cNvSpPr txBox="1"/>
+          <p:nvPr/>
+        </p:nvSpPr>
+        <p:spPr>
+          <a:xfrm>
+            <a:off x="10174022" y="147496"/>
+            <a:ext cx="1355566" cy="369332"/>
+          </a:xfrm>
+          <a:prstGeom prst="rect">
+            <a:avLst/>
+          </a:prstGeom>
+          <a:noFill/>
+        </p:spPr>
+        <p:txBody>
+          <a:bodyPr wrap="square" rtlCol="0">
+            <a:spAutoFit/>
+          </a:bodyPr>
+          <a:lstStyle/>
+          <a:p>
+            <a:r>
+              <a:rPr lang="en-GB" dirty="0"/>
+              <a:t>Web server</a:t>
             </a:r>
           </a:p>
         </p:txBody>
@@ -7082,7 +7692,7 @@
     </p:spTree>
     <p:extLst>
       <p:ext uri="{BB962C8B-B14F-4D97-AF65-F5344CB8AC3E}">
-        <p14:creationId xmlns:p14="http://schemas.microsoft.com/office/powerpoint/2010/main" val="1576273288"/>
+        <p14:creationId xmlns:p14="http://schemas.microsoft.com/office/powerpoint/2010/main" val="1505921047"/>
       </p:ext>
     </p:extLst>
   </p:cSld>
@@ -7114,7 +7724,7 @@
           <p:cNvPr id="2" name="Title 1">
             <a:extLst>
               <a:ext uri="{FF2B5EF4-FFF2-40B4-BE49-F238E27FC236}">
-                <a16:creationId xmlns:a16="http://schemas.microsoft.com/office/drawing/2014/main" id="{33DF76A8-4566-4577-AE66-D77E643C7202}"/>
+                <a16:creationId xmlns:a16="http://schemas.microsoft.com/office/drawing/2014/main" id="{D055B4D0-EF3E-4FD1-B3EB-98D6B3181891}"/>
               </a:ext>
             </a:extLst>
           </p:cNvPr>
@@ -7132,109 +7742,85 @@
           <a:p>
             <a:r>
               <a:rPr lang="en-GB" dirty="0"/>
-              <a:t>Twilio – Set up an account</a:t>
-            </a:r>
-          </a:p>
-        </p:txBody>
-      </p:sp>
-      <p:pic>
-        <p:nvPicPr>
-          <p:cNvPr id="4" name="Content Placeholder 3">
-            <a:extLst>
-              <a:ext uri="{FF2B5EF4-FFF2-40B4-BE49-F238E27FC236}">
-                <a16:creationId xmlns:a16="http://schemas.microsoft.com/office/drawing/2014/main" id="{30D8DB6A-7FB6-4583-B64A-59875D410D10}"/>
-              </a:ext>
-            </a:extLst>
-          </p:cNvPr>
-          <p:cNvPicPr>
-            <a:picLocks noGrp="1" noChangeAspect="1"/>
-          </p:cNvPicPr>
+              <a:t>Redirector to Twilio</a:t>
+            </a:r>
+          </a:p>
+        </p:txBody>
+      </p:sp>
+      <p:sp>
+        <p:nvSpPr>
+          <p:cNvPr id="3" name="Content Placeholder 2">
+            <a:extLst>
+              <a:ext uri="{FF2B5EF4-FFF2-40B4-BE49-F238E27FC236}">
+                <a16:creationId xmlns:a16="http://schemas.microsoft.com/office/drawing/2014/main" id="{A0C32356-B01E-42A4-AE54-17E092063F95}"/>
+              </a:ext>
+            </a:extLst>
+          </p:cNvPr>
+          <p:cNvSpPr>
+            <a:spLocks noGrp="1"/>
+          </p:cNvSpPr>
           <p:nvPr>
             <p:ph idx="1"/>
           </p:nvPr>
-        </p:nvPicPr>
-        <p:blipFill>
-          <a:blip r:embed="rId2"/>
-          <a:stretch>
-            <a:fillRect/>
-          </a:stretch>
-        </p:blipFill>
-        <p:spPr>
-          <a:xfrm>
-            <a:off x="950653" y="1470462"/>
-            <a:ext cx="2695575" cy="2505075"/>
-          </a:xfrm>
-          <a:prstGeom prst="rect">
-            <a:avLst/>
-          </a:prstGeom>
-        </p:spPr>
-      </p:pic>
-      <p:pic>
-        <p:nvPicPr>
-          <p:cNvPr id="5" name="Picture 4">
-            <a:extLst>
-              <a:ext uri="{FF2B5EF4-FFF2-40B4-BE49-F238E27FC236}">
-                <a16:creationId xmlns:a16="http://schemas.microsoft.com/office/drawing/2014/main" id="{3A043680-2E90-462F-A3ED-548D23962FDF}"/>
-              </a:ext>
-            </a:extLst>
-          </p:cNvPr>
-          <p:cNvPicPr>
-            <a:picLocks noChangeAspect="1"/>
-          </p:cNvPicPr>
-          <p:nvPr/>
-        </p:nvPicPr>
-        <p:blipFill>
-          <a:blip r:embed="rId3"/>
-          <a:stretch>
-            <a:fillRect/>
-          </a:stretch>
-        </p:blipFill>
-        <p:spPr>
-          <a:xfrm>
-            <a:off x="3961817" y="1339833"/>
-            <a:ext cx="1581150" cy="2990850"/>
-          </a:xfrm>
-          <a:prstGeom prst="rect">
-            <a:avLst/>
-          </a:prstGeom>
-        </p:spPr>
-      </p:pic>
-      <p:pic>
-        <p:nvPicPr>
-          <p:cNvPr id="6" name="Picture 5">
-            <a:extLst>
-              <a:ext uri="{FF2B5EF4-FFF2-40B4-BE49-F238E27FC236}">
-                <a16:creationId xmlns:a16="http://schemas.microsoft.com/office/drawing/2014/main" id="{5C78DE12-9949-4323-89D2-2E82F424C99A}"/>
-              </a:ext>
-            </a:extLst>
-          </p:cNvPr>
-          <p:cNvPicPr>
-            <a:picLocks noChangeAspect="1"/>
-          </p:cNvPicPr>
-          <p:nvPr/>
-        </p:nvPicPr>
-        <p:blipFill>
-          <a:blip r:embed="rId4"/>
-          <a:stretch>
-            <a:fillRect/>
-          </a:stretch>
-        </p:blipFill>
-        <p:spPr>
-          <a:xfrm>
-            <a:off x="5724525" y="2592370"/>
-            <a:ext cx="3343275" cy="876300"/>
-          </a:xfrm>
-          <a:prstGeom prst="rect">
-            <a:avLst/>
-          </a:prstGeom>
-        </p:spPr>
-      </p:pic>
+        </p:nvSpPr>
+        <p:spPr/>
+        <p:txBody>
+          <a:bodyPr>
+            <a:normAutofit/>
+          </a:bodyPr>
+          <a:lstStyle/>
+          <a:p>
+            <a:r>
+              <a:rPr lang="en-GB" dirty="0"/>
+              <a:t>Web client uses API key and parameters to request calls/SMS as a flow</a:t>
+            </a:r>
+          </a:p>
+          <a:p>
+            <a:r>
+              <a:rPr lang="en-GB" dirty="0"/>
+              <a:t>Web service hosted on /</a:t>
+            </a:r>
+            <a:r>
+              <a:rPr lang="en-GB" dirty="0" err="1"/>
+              <a:t>TwilioRequest</a:t>
+            </a:r>
+            <a:r>
+              <a:rPr lang="en-GB" dirty="0"/>
+              <a:t>/</a:t>
+            </a:r>
+          </a:p>
+          <a:p>
+            <a:pPr lvl="1"/>
+            <a:r>
+              <a:rPr lang="en-GB" dirty="0"/>
+              <a:t>Data sent in query string parameters</a:t>
+            </a:r>
+          </a:p>
+          <a:p>
+            <a:pPr lvl="1"/>
+            <a:r>
+              <a:rPr lang="en-GB" dirty="0"/>
+              <a:t>The Redirector receives and adds these parameters to a list, for forwarding back in responses to the Driver</a:t>
+            </a:r>
+          </a:p>
+          <a:p>
+            <a:pPr lvl="1"/>
+            <a:r>
+              <a:rPr lang="en-GB" dirty="0"/>
+              <a:t>If type is ‘ACKCHECK’ and alarm acknowledgements are set up in Twilio, and the #define feature ‘FEATURE_ALARM_ACK’ is enabled then the request message sends alarm acknowledgement status messages to the Twilio Flow</a:t>
+            </a:r>
+          </a:p>
+          <a:p>
+            <a:endParaRPr lang="en-GB" dirty="0"/>
+          </a:p>
+        </p:txBody>
+      </p:sp>
       <p:sp>
         <p:nvSpPr>
           <p:cNvPr id="7" name="TextBox 6">
             <a:extLst>
               <a:ext uri="{FF2B5EF4-FFF2-40B4-BE49-F238E27FC236}">
-                <a16:creationId xmlns:a16="http://schemas.microsoft.com/office/drawing/2014/main" id="{AE86A964-52FC-490C-9935-FA42FED56138}"/>
+                <a16:creationId xmlns:a16="http://schemas.microsoft.com/office/drawing/2014/main" id="{306FFC4F-9649-49CB-8504-E42F160E9791}"/>
               </a:ext>
             </a:extLst>
           </p:cNvPr>
@@ -7243,8 +7829,8 @@
         </p:nvSpPr>
         <p:spPr>
           <a:xfrm>
-            <a:off x="5756988" y="1619165"/>
-            <a:ext cx="2771192" cy="369332"/>
+            <a:off x="5846716" y="-26858"/>
+            <a:ext cx="2190052" cy="369332"/>
           </a:xfrm>
           <a:prstGeom prst="rect">
             <a:avLst/>
@@ -7259,7 +7845,7 @@
           <a:p>
             <a:r>
               <a:rPr lang="en-GB" dirty="0"/>
-              <a:t>&lt;Your email address&gt;</a:t>
+              <a:t>Web client &amp; Server</a:t>
             </a:r>
           </a:p>
         </p:txBody>
@@ -7269,7 +7855,7 @@
           <p:cNvPr id="8" name="TextBox 7">
             <a:extLst>
               <a:ext uri="{FF2B5EF4-FFF2-40B4-BE49-F238E27FC236}">
-                <a16:creationId xmlns:a16="http://schemas.microsoft.com/office/drawing/2014/main" id="{3B78902D-F8D0-4394-9D0C-4D24B9192F44}"/>
+                <a16:creationId xmlns:a16="http://schemas.microsoft.com/office/drawing/2014/main" id="{8C07664E-CC09-4620-8B4F-FAEE5BF23EC0}"/>
               </a:ext>
             </a:extLst>
           </p:cNvPr>
@@ -7278,8 +7864,8 @@
         </p:nvSpPr>
         <p:spPr>
           <a:xfrm>
-            <a:off x="5756988" y="2047603"/>
-            <a:ext cx="2771192" cy="369332"/>
+            <a:off x="9871785" y="-49509"/>
+            <a:ext cx="2244016" cy="369332"/>
           </a:xfrm>
           <a:prstGeom prst="rect">
             <a:avLst/>
@@ -7294,81 +7880,191 @@
           <a:p>
             <a:r>
               <a:rPr lang="en-GB" dirty="0"/>
-              <a:t>&lt;Account ID&gt;</a:t>
-            </a:r>
-          </a:p>
-        </p:txBody>
-      </p:sp>
-      <p:sp>
-        <p:nvSpPr>
-          <p:cNvPr id="9" name="TextBox 8">
-            <a:extLst>
-              <a:ext uri="{FF2B5EF4-FFF2-40B4-BE49-F238E27FC236}">
-                <a16:creationId xmlns:a16="http://schemas.microsoft.com/office/drawing/2014/main" id="{A568D371-F64A-46A7-A452-E64DFEDEE53E}"/>
-              </a:ext>
-            </a:extLst>
-          </p:cNvPr>
-          <p:cNvSpPr txBox="1"/>
+              <a:t>Web server &amp; Client</a:t>
+            </a:r>
+          </a:p>
+        </p:txBody>
+      </p:sp>
+      <p:sp>
+        <p:nvSpPr>
+          <p:cNvPr id="9" name="Rectangle 8">
+            <a:extLst>
+              <a:ext uri="{FF2B5EF4-FFF2-40B4-BE49-F238E27FC236}">
+                <a16:creationId xmlns:a16="http://schemas.microsoft.com/office/drawing/2014/main" id="{F179DD1C-9132-4D7D-B333-2534A28D5C13}"/>
+              </a:ext>
+            </a:extLst>
+          </p:cNvPr>
+          <p:cNvSpPr/>
           <p:nvPr/>
         </p:nvSpPr>
         <p:spPr>
           <a:xfrm>
-            <a:off x="4248150" y="3610947"/>
-            <a:ext cx="5073132" cy="1477328"/>
+            <a:off x="5956041" y="279447"/>
+            <a:ext cx="1707502" cy="1455575"/>
           </a:xfrm>
           <a:prstGeom prst="rect">
             <a:avLst/>
           </a:prstGeom>
-          <a:noFill/>
-        </p:spPr>
-        <p:txBody>
-          <a:bodyPr wrap="square" rtlCol="0">
-            <a:spAutoFit/>
-          </a:bodyPr>
-          <a:lstStyle/>
-          <a:p>
-            <a:r>
-              <a:rPr lang="en-GB" dirty="0"/>
-              <a:t>Your Account ID needs to be compiled into the Redirector code.</a:t>
-            </a:r>
-          </a:p>
-          <a:p>
-            <a:endParaRPr lang="en-GB" dirty="0"/>
-          </a:p>
-          <a:p>
-            <a:r>
-              <a:rPr lang="en-GB" dirty="0"/>
-              <a:t>The Auth token here needs to be entered onto the Geo SCADA ‘Notify Redirector’ object properties.</a:t>
+        </p:spPr>
+        <p:style>
+          <a:lnRef idx="2">
+            <a:schemeClr val="accent1">
+              <a:shade val="50000"/>
+            </a:schemeClr>
+          </a:lnRef>
+          <a:fillRef idx="1">
+            <a:schemeClr val="accent1"/>
+          </a:fillRef>
+          <a:effectRef idx="0">
+            <a:schemeClr val="accent1"/>
+          </a:effectRef>
+          <a:fontRef idx="minor">
+            <a:schemeClr val="lt1"/>
+          </a:fontRef>
+        </p:style>
+        <p:txBody>
+          <a:bodyPr rtlCol="0" anchor="ctr"/>
+          <a:lstStyle/>
+          <a:p>
+            <a:pPr algn="ctr"/>
+            <a:r>
+              <a:rPr lang="en-GB" dirty="0"/>
+              <a:t>“Redirector” web server/client</a:t>
+            </a:r>
+          </a:p>
+        </p:txBody>
+      </p:sp>
+      <p:sp>
+        <p:nvSpPr>
+          <p:cNvPr id="10" name="Rectangle 9">
+            <a:extLst>
+              <a:ext uri="{FF2B5EF4-FFF2-40B4-BE49-F238E27FC236}">
+                <a16:creationId xmlns:a16="http://schemas.microsoft.com/office/drawing/2014/main" id="{09E3A0B9-052C-4B0F-95FC-B5CCE0DC7664}"/>
+              </a:ext>
+            </a:extLst>
+          </p:cNvPr>
+          <p:cNvSpPr/>
+          <p:nvPr/>
+        </p:nvSpPr>
+        <p:spPr>
+          <a:xfrm>
+            <a:off x="9790923" y="279446"/>
+            <a:ext cx="2324878" cy="1455575"/>
+          </a:xfrm>
+          <a:prstGeom prst="rect">
+            <a:avLst/>
+          </a:prstGeom>
+          <a:solidFill>
+            <a:srgbClr val="FF0000"/>
+          </a:solidFill>
+          <a:ln>
+            <a:solidFill>
+              <a:srgbClr val="FFC000"/>
+            </a:solidFill>
+          </a:ln>
+        </p:spPr>
+        <p:style>
+          <a:lnRef idx="2">
+            <a:schemeClr val="accent1">
+              <a:shade val="50000"/>
+            </a:schemeClr>
+          </a:lnRef>
+          <a:fillRef idx="1">
+            <a:schemeClr val="accent1"/>
+          </a:fillRef>
+          <a:effectRef idx="0">
+            <a:schemeClr val="accent1"/>
+          </a:effectRef>
+          <a:fontRef idx="minor">
+            <a:schemeClr val="lt1"/>
+          </a:fontRef>
+        </p:style>
+        <p:txBody>
+          <a:bodyPr rtlCol="0" anchor="ctr"/>
+          <a:lstStyle/>
+          <a:p>
+            <a:pPr algn="r"/>
+            <a:r>
+              <a:rPr lang="en-GB" dirty="0"/>
+              <a:t>Twilio</a:t>
+            </a:r>
+          </a:p>
+        </p:txBody>
+      </p:sp>
+      <p:sp>
+        <p:nvSpPr>
+          <p:cNvPr id="11" name="Rectangle 10">
+            <a:extLst>
+              <a:ext uri="{FF2B5EF4-FFF2-40B4-BE49-F238E27FC236}">
+                <a16:creationId xmlns:a16="http://schemas.microsoft.com/office/drawing/2014/main" id="{CDC8734A-FA57-4426-BBC8-C6A1027C73A4}"/>
+              </a:ext>
+            </a:extLst>
+          </p:cNvPr>
+          <p:cNvSpPr/>
+          <p:nvPr/>
+        </p:nvSpPr>
+        <p:spPr>
+          <a:xfrm>
+            <a:off x="10014857" y="471462"/>
+            <a:ext cx="1166326" cy="1071542"/>
+          </a:xfrm>
+          <a:prstGeom prst="rect">
+            <a:avLst/>
+          </a:prstGeom>
+        </p:spPr>
+        <p:style>
+          <a:lnRef idx="2">
+            <a:schemeClr val="accent1">
+              <a:shade val="50000"/>
+            </a:schemeClr>
+          </a:lnRef>
+          <a:fillRef idx="1">
+            <a:schemeClr val="accent1"/>
+          </a:fillRef>
+          <a:effectRef idx="0">
+            <a:schemeClr val="accent1"/>
+          </a:effectRef>
+          <a:fontRef idx="minor">
+            <a:schemeClr val="lt1"/>
+          </a:fontRef>
+        </p:style>
+        <p:txBody>
+          <a:bodyPr rtlCol="0" anchor="ctr"/>
+          <a:lstStyle/>
+          <a:p>
+            <a:pPr algn="ctr"/>
+            <a:r>
+              <a:rPr lang="en-GB" dirty="0"/>
+              <a:t>Alarm Flow</a:t>
             </a:r>
           </a:p>
         </p:txBody>
       </p:sp>
       <p:cxnSp>
         <p:nvCxnSpPr>
-          <p:cNvPr id="11" name="Straight Arrow Connector 10">
-            <a:extLst>
-              <a:ext uri="{FF2B5EF4-FFF2-40B4-BE49-F238E27FC236}">
-                <a16:creationId xmlns:a16="http://schemas.microsoft.com/office/drawing/2014/main" id="{DFB1CCD1-32B3-4558-868F-67811D778D37}"/>
+          <p:cNvPr id="12" name="Straight Arrow Connector 11">
+            <a:extLst>
+              <a:ext uri="{FF2B5EF4-FFF2-40B4-BE49-F238E27FC236}">
+                <a16:creationId xmlns:a16="http://schemas.microsoft.com/office/drawing/2014/main" id="{9A0311CA-0E33-4AD7-BC45-3055C489F3D6}"/>
               </a:ext>
             </a:extLst>
           </p:cNvPr>
           <p:cNvCxnSpPr>
-            <a:endCxn id="8" idx="1"/>
+            <a:cxnSpLocks/>
+            <a:stCxn id="9" idx="3"/>
+            <a:endCxn id="10" idx="1"/>
           </p:cNvCxnSpPr>
           <p:nvPr/>
         </p:nvCxnSpPr>
         <p:spPr>
           <a:xfrm flipV="1">
-            <a:off x="4413380" y="2232269"/>
-            <a:ext cx="1343608" cy="1378678"/>
+            <a:off x="7663543" y="1007234"/>
+            <a:ext cx="2127380" cy="1"/>
           </a:xfrm>
           <a:prstGeom prst="straightConnector1">
             <a:avLst/>
           </a:prstGeom>
           <a:ln>
-            <a:solidFill>
-              <a:srgbClr val="FF0000"/>
-            </a:solidFill>
             <a:tailEnd type="triangle"/>
           </a:ln>
         </p:spPr>
@@ -7387,30 +8083,64 @@
           </a:fontRef>
         </p:style>
       </p:cxnSp>
+      <p:sp>
+        <p:nvSpPr>
+          <p:cNvPr id="13" name="TextBox 12">
+            <a:extLst>
+              <a:ext uri="{FF2B5EF4-FFF2-40B4-BE49-F238E27FC236}">
+                <a16:creationId xmlns:a16="http://schemas.microsoft.com/office/drawing/2014/main" id="{2BCCD117-CED1-4308-8D69-970C7D3F4EF5}"/>
+              </a:ext>
+            </a:extLst>
+          </p:cNvPr>
+          <p:cNvSpPr txBox="1"/>
+          <p:nvPr/>
+        </p:nvSpPr>
+        <p:spPr>
+          <a:xfrm>
+            <a:off x="7973167" y="334846"/>
+            <a:ext cx="1380930" cy="646331"/>
+          </a:xfrm>
+          <a:prstGeom prst="rect">
+            <a:avLst/>
+          </a:prstGeom>
+          <a:noFill/>
+        </p:spPr>
+        <p:txBody>
+          <a:bodyPr wrap="square" rtlCol="0">
+            <a:spAutoFit/>
+          </a:bodyPr>
+          <a:lstStyle/>
+          <a:p>
+            <a:r>
+              <a:rPr lang="en-GB" dirty="0"/>
+              <a:t>Requests to start flow</a:t>
+            </a:r>
+          </a:p>
+        </p:txBody>
+      </p:sp>
       <p:cxnSp>
         <p:nvCxnSpPr>
-          <p:cNvPr id="13" name="Straight Arrow Connector 12">
-            <a:extLst>
-              <a:ext uri="{FF2B5EF4-FFF2-40B4-BE49-F238E27FC236}">
-                <a16:creationId xmlns:a16="http://schemas.microsoft.com/office/drawing/2014/main" id="{91F99A43-553A-4D9A-9CFC-0B751D6A16CD}"/>
-              </a:ext>
-            </a:extLst>
-          </p:cNvPr>
-          <p:cNvCxnSpPr/>
+          <p:cNvPr id="14" name="Straight Arrow Connector 13">
+            <a:extLst>
+              <a:ext uri="{FF2B5EF4-FFF2-40B4-BE49-F238E27FC236}">
+                <a16:creationId xmlns:a16="http://schemas.microsoft.com/office/drawing/2014/main" id="{CDA3C34F-FAAB-4F2E-BD10-772A2FDE6B08}"/>
+              </a:ext>
+            </a:extLst>
+          </p:cNvPr>
+          <p:cNvCxnSpPr>
+            <a:cxnSpLocks/>
+          </p:cNvCxnSpPr>
           <p:nvPr/>
         </p:nvCxnSpPr>
         <p:spPr>
-          <a:xfrm flipV="1">
-            <a:off x="4404049" y="2808514"/>
-            <a:ext cx="1352939" cy="1688841"/>
+          <a:xfrm flipH="1">
+            <a:off x="7663544" y="1371127"/>
+            <a:ext cx="2127378" cy="0"/>
           </a:xfrm>
           <a:prstGeom prst="straightConnector1">
             <a:avLst/>
           </a:prstGeom>
           <a:ln>
-            <a:solidFill>
-              <a:srgbClr val="FF0000"/>
-            </a:solidFill>
             <a:tailEnd type="triangle"/>
           </a:ln>
         </p:spPr>
@@ -7429,10 +8159,45 @@
           </a:fontRef>
         </p:style>
       </p:cxnSp>
+      <p:sp>
+        <p:nvSpPr>
+          <p:cNvPr id="15" name="TextBox 14">
+            <a:extLst>
+              <a:ext uri="{FF2B5EF4-FFF2-40B4-BE49-F238E27FC236}">
+                <a16:creationId xmlns:a16="http://schemas.microsoft.com/office/drawing/2014/main" id="{16DEB24D-1C69-4986-BCC5-33E12C2F12B7}"/>
+              </a:ext>
+            </a:extLst>
+          </p:cNvPr>
+          <p:cNvSpPr txBox="1"/>
+          <p:nvPr/>
+        </p:nvSpPr>
+        <p:spPr>
+          <a:xfrm>
+            <a:off x="7973167" y="1366658"/>
+            <a:ext cx="1909665" cy="369332"/>
+          </a:xfrm>
+          <a:prstGeom prst="rect">
+            <a:avLst/>
+          </a:prstGeom>
+          <a:noFill/>
+        </p:spPr>
+        <p:txBody>
+          <a:bodyPr wrap="square" rtlCol="0">
+            <a:spAutoFit/>
+          </a:bodyPr>
+          <a:lstStyle/>
+          <a:p>
+            <a:r>
+              <a:rPr lang="en-GB" dirty="0"/>
+              <a:t>Status updates</a:t>
+            </a:r>
+          </a:p>
+        </p:txBody>
+      </p:sp>
     </p:spTree>
     <p:extLst>
       <p:ext uri="{BB962C8B-B14F-4D97-AF65-F5344CB8AC3E}">
-        <p14:creationId xmlns:p14="http://schemas.microsoft.com/office/powerpoint/2010/main" val="3364444612"/>
+        <p14:creationId xmlns:p14="http://schemas.microsoft.com/office/powerpoint/2010/main" val="2344377338"/>
       </p:ext>
     </p:extLst>
   </p:cSld>
@@ -7464,7 +8229,7 @@
           <p:cNvPr id="2" name="Title 1">
             <a:extLst>
               <a:ext uri="{FF2B5EF4-FFF2-40B4-BE49-F238E27FC236}">
-                <a16:creationId xmlns:a16="http://schemas.microsoft.com/office/drawing/2014/main" id="{6112DBD7-8FA0-4CD5-AE7C-7555794C5262}"/>
+                <a16:creationId xmlns:a16="http://schemas.microsoft.com/office/drawing/2014/main" id="{856123CF-A895-4784-AEB6-05A324F7FD70}"/>
               </a:ext>
             </a:extLst>
           </p:cNvPr>
@@ -7482,74 +8247,61 @@
           <a:p>
             <a:r>
               <a:rPr lang="en-GB" dirty="0"/>
-              <a:t>Twilio – Buy a Number</a:t>
-            </a:r>
-          </a:p>
-        </p:txBody>
-      </p:sp>
-      <p:pic>
-        <p:nvPicPr>
-          <p:cNvPr id="4" name="Content Placeholder 3">
-            <a:extLst>
-              <a:ext uri="{FF2B5EF4-FFF2-40B4-BE49-F238E27FC236}">
-                <a16:creationId xmlns:a16="http://schemas.microsoft.com/office/drawing/2014/main" id="{6B608159-39B4-4E7E-8113-85001679BF79}"/>
-              </a:ext>
-            </a:extLst>
-          </p:cNvPr>
-          <p:cNvPicPr>
-            <a:picLocks noGrp="1" noChangeAspect="1"/>
-          </p:cNvPicPr>
+              <a:t>Setting up Twilio</a:t>
+            </a:r>
+          </a:p>
+        </p:txBody>
+      </p:sp>
+      <p:sp>
+        <p:nvSpPr>
+          <p:cNvPr id="3" name="Content Placeholder 2">
+            <a:extLst>
+              <a:ext uri="{FF2B5EF4-FFF2-40B4-BE49-F238E27FC236}">
+                <a16:creationId xmlns:a16="http://schemas.microsoft.com/office/drawing/2014/main" id="{42D1A0DC-02F3-4EBD-85CB-8CE8C78EC345}"/>
+              </a:ext>
+            </a:extLst>
+          </p:cNvPr>
+          <p:cNvSpPr>
+            <a:spLocks noGrp="1"/>
+          </p:cNvSpPr>
           <p:nvPr>
             <p:ph idx="1"/>
           </p:nvPr>
-        </p:nvPicPr>
-        <p:blipFill>
-          <a:blip r:embed="rId2"/>
-          <a:stretch>
-            <a:fillRect/>
-          </a:stretch>
-        </p:blipFill>
-        <p:spPr>
-          <a:xfrm>
-            <a:off x="838200" y="2097202"/>
-            <a:ext cx="10515600" cy="3808183"/>
-          </a:xfrm>
-          <a:prstGeom prst="rect">
-            <a:avLst/>
-          </a:prstGeom>
-        </p:spPr>
-      </p:pic>
-      <p:sp>
-        <p:nvSpPr>
-          <p:cNvPr id="3" name="TextBox 2">
-            <a:extLst>
-              <a:ext uri="{FF2B5EF4-FFF2-40B4-BE49-F238E27FC236}">
-                <a16:creationId xmlns:a16="http://schemas.microsoft.com/office/drawing/2014/main" id="{605E0E11-4438-4ADF-8F81-9ACC8BDB626C}"/>
-              </a:ext>
-            </a:extLst>
-          </p:cNvPr>
-          <p:cNvSpPr txBox="1"/>
-          <p:nvPr/>
-        </p:nvSpPr>
-        <p:spPr>
-          <a:xfrm>
-            <a:off x="1035698" y="1455576"/>
-            <a:ext cx="10515600" cy="646331"/>
-          </a:xfrm>
-          <a:prstGeom prst="rect">
-            <a:avLst/>
-          </a:prstGeom>
-          <a:noFill/>
-        </p:spPr>
-        <p:txBody>
-          <a:bodyPr wrap="square" rtlCol="0">
-            <a:spAutoFit/>
-          </a:bodyPr>
-          <a:lstStyle/>
-          <a:p>
-            <a:r>
-              <a:rPr lang="en-GB" dirty="0"/>
-              <a:t>Select your country and click ‘Search’. Add further search parameters if you are looking for a particular number sequence or letter codes (e.g. 1-123-SCADA !)</a:t>
+        </p:nvSpPr>
+        <p:spPr/>
+        <p:txBody>
+          <a:bodyPr/>
+          <a:lstStyle/>
+          <a:p>
+            <a:r>
+              <a:rPr lang="en-GB" dirty="0"/>
+              <a:t>Twilio is a simple web-based subscription service</a:t>
+            </a:r>
+          </a:p>
+          <a:p>
+            <a:pPr lvl="1"/>
+            <a:r>
+              <a:rPr lang="en-GB" dirty="0"/>
+              <a:t>Messages are costed individually or in packages, making it economic for alarm redirection</a:t>
+            </a:r>
+          </a:p>
+          <a:p>
+            <a:r>
+              <a:rPr lang="en-GB" dirty="0"/>
+              <a:t>You will need to lease a phone number which Twilio uses to send out messages, you can select this on Twilio based on a suitable location</a:t>
+            </a:r>
+          </a:p>
+          <a:p>
+            <a:r>
+              <a:rPr lang="en-GB" dirty="0"/>
+              <a:t>Our demonstration uses the Twilio ‘Flow’ facility which makes it easy to design step-by-step processes for call interaction</a:t>
+            </a:r>
+          </a:p>
+          <a:p>
+            <a:pPr lvl="1"/>
+            <a:r>
+              <a:rPr lang="en-GB" dirty="0"/>
+              <a:t>We show you how to create a flow with the parameters needed</a:t>
             </a:r>
           </a:p>
         </p:txBody>
@@ -7557,7 +8309,7 @@
     </p:spTree>
     <p:extLst>
       <p:ext uri="{BB962C8B-B14F-4D97-AF65-F5344CB8AC3E}">
-        <p14:creationId xmlns:p14="http://schemas.microsoft.com/office/powerpoint/2010/main" val="653034515"/>
+        <p14:creationId xmlns:p14="http://schemas.microsoft.com/office/powerpoint/2010/main" val="1576273288"/>
       </p:ext>
     </p:extLst>
   </p:cSld>
@@ -7589,7 +8341,7 @@
           <p:cNvPr id="2" name="Title 1">
             <a:extLst>
               <a:ext uri="{FF2B5EF4-FFF2-40B4-BE49-F238E27FC236}">
-                <a16:creationId xmlns:a16="http://schemas.microsoft.com/office/drawing/2014/main" id="{764BDB98-D4A7-4D6F-B468-8302CC0C3A04}"/>
+                <a16:creationId xmlns:a16="http://schemas.microsoft.com/office/drawing/2014/main" id="{33DF76A8-4566-4577-AE66-D77E643C7202}"/>
               </a:ext>
             </a:extLst>
           </p:cNvPr>
@@ -7607,7 +8359,7 @@
           <a:p>
             <a:r>
               <a:rPr lang="en-GB" dirty="0"/>
-              <a:t>Twilio – Verified Caller IDs</a:t>
+              <a:t>Twilio – Set up an account</a:t>
             </a:r>
           </a:p>
         </p:txBody>
@@ -7617,7 +8369,7 @@
           <p:cNvPr id="4" name="Content Placeholder 3">
             <a:extLst>
               <a:ext uri="{FF2B5EF4-FFF2-40B4-BE49-F238E27FC236}">
-                <a16:creationId xmlns:a16="http://schemas.microsoft.com/office/drawing/2014/main" id="{E0CC5DA5-72D0-4460-8315-B903153CB523}"/>
+                <a16:creationId xmlns:a16="http://schemas.microsoft.com/office/drawing/2014/main" id="{30D8DB6A-7FB6-4583-B64A-59875D410D10}"/>
               </a:ext>
             </a:extLst>
           </p:cNvPr>
@@ -7636,8 +8388,8 @@
         </p:blipFill>
         <p:spPr>
           <a:xfrm>
-            <a:off x="838200" y="1690688"/>
-            <a:ext cx="2547345" cy="4351338"/>
+            <a:off x="950653" y="1470462"/>
+            <a:ext cx="2695575" cy="2505075"/>
           </a:xfrm>
           <a:prstGeom prst="rect">
             <a:avLst/>
@@ -7649,7 +8401,7 @@
           <p:cNvPr id="5" name="Picture 4">
             <a:extLst>
               <a:ext uri="{FF2B5EF4-FFF2-40B4-BE49-F238E27FC236}">
-                <a16:creationId xmlns:a16="http://schemas.microsoft.com/office/drawing/2014/main" id="{5E752AE5-63F0-41E0-81BF-6B994844C6DE}"/>
+                <a16:creationId xmlns:a16="http://schemas.microsoft.com/office/drawing/2014/main" id="{3A043680-2E90-462F-A3ED-548D23962FDF}"/>
               </a:ext>
             </a:extLst>
           </p:cNvPr>
@@ -7666,20 +8418,50 @@
         </p:blipFill>
         <p:spPr>
           <a:xfrm>
-            <a:off x="3385545" y="1690688"/>
-            <a:ext cx="7943850" cy="1933575"/>
+            <a:off x="3961817" y="1339833"/>
+            <a:ext cx="1581150" cy="2990850"/>
           </a:xfrm>
           <a:prstGeom prst="rect">
             <a:avLst/>
           </a:prstGeom>
         </p:spPr>
       </p:pic>
-      <p:sp>
-        <p:nvSpPr>
-          <p:cNvPr id="6" name="TextBox 5">
-            <a:extLst>
-              <a:ext uri="{FF2B5EF4-FFF2-40B4-BE49-F238E27FC236}">
-                <a16:creationId xmlns:a16="http://schemas.microsoft.com/office/drawing/2014/main" id="{3511C411-B72A-4103-ACA0-B020B5D47741}"/>
+      <p:pic>
+        <p:nvPicPr>
+          <p:cNvPr id="6" name="Picture 5">
+            <a:extLst>
+              <a:ext uri="{FF2B5EF4-FFF2-40B4-BE49-F238E27FC236}">
+                <a16:creationId xmlns:a16="http://schemas.microsoft.com/office/drawing/2014/main" id="{5C78DE12-9949-4323-89D2-2E82F424C99A}"/>
+              </a:ext>
+            </a:extLst>
+          </p:cNvPr>
+          <p:cNvPicPr>
+            <a:picLocks noChangeAspect="1"/>
+          </p:cNvPicPr>
+          <p:nvPr/>
+        </p:nvPicPr>
+        <p:blipFill>
+          <a:blip r:embed="rId4"/>
+          <a:stretch>
+            <a:fillRect/>
+          </a:stretch>
+        </p:blipFill>
+        <p:spPr>
+          <a:xfrm>
+            <a:off x="5724525" y="2592370"/>
+            <a:ext cx="3343275" cy="876300"/>
+          </a:xfrm>
+          <a:prstGeom prst="rect">
+            <a:avLst/>
+          </a:prstGeom>
+        </p:spPr>
+      </p:pic>
+      <p:sp>
+        <p:nvSpPr>
+          <p:cNvPr id="7" name="TextBox 6">
+            <a:extLst>
+              <a:ext uri="{FF2B5EF4-FFF2-40B4-BE49-F238E27FC236}">
+                <a16:creationId xmlns:a16="http://schemas.microsoft.com/office/drawing/2014/main" id="{AE86A964-52FC-490C-9935-FA42FED56138}"/>
               </a:ext>
             </a:extLst>
           </p:cNvPr>
@@ -7688,8 +8470,8 @@
         </p:nvSpPr>
         <p:spPr>
           <a:xfrm>
-            <a:off x="3480318" y="3741576"/>
-            <a:ext cx="8201609" cy="646331"/>
+            <a:off x="5756988" y="1619165"/>
+            <a:ext cx="2771192" cy="369332"/>
           </a:xfrm>
           <a:prstGeom prst="rect">
             <a:avLst/>
@@ -7704,21 +8486,180 @@
           <a:p>
             <a:r>
               <a:rPr lang="en-GB" dirty="0"/>
-              <a:t>Twilio, in free trial mode, will not let you send to just any number.</a:t>
-            </a:r>
-          </a:p>
-          <a:p>
-            <a:r>
-              <a:rPr lang="en-GB" dirty="0"/>
-              <a:t>You need to add numbers here in order to be able to test this system.</a:t>
-            </a:r>
-          </a:p>
-        </p:txBody>
-      </p:sp>
+              <a:t>&lt;Your email address&gt;</a:t>
+            </a:r>
+          </a:p>
+        </p:txBody>
+      </p:sp>
+      <p:sp>
+        <p:nvSpPr>
+          <p:cNvPr id="8" name="TextBox 7">
+            <a:extLst>
+              <a:ext uri="{FF2B5EF4-FFF2-40B4-BE49-F238E27FC236}">
+                <a16:creationId xmlns:a16="http://schemas.microsoft.com/office/drawing/2014/main" id="{3B78902D-F8D0-4394-9D0C-4D24B9192F44}"/>
+              </a:ext>
+            </a:extLst>
+          </p:cNvPr>
+          <p:cNvSpPr txBox="1"/>
+          <p:nvPr/>
+        </p:nvSpPr>
+        <p:spPr>
+          <a:xfrm>
+            <a:off x="5756988" y="2047603"/>
+            <a:ext cx="2771192" cy="369332"/>
+          </a:xfrm>
+          <a:prstGeom prst="rect">
+            <a:avLst/>
+          </a:prstGeom>
+          <a:noFill/>
+        </p:spPr>
+        <p:txBody>
+          <a:bodyPr wrap="square" rtlCol="0">
+            <a:spAutoFit/>
+          </a:bodyPr>
+          <a:lstStyle/>
+          <a:p>
+            <a:r>
+              <a:rPr lang="en-GB" dirty="0"/>
+              <a:t>&lt;Account ID&gt;</a:t>
+            </a:r>
+          </a:p>
+        </p:txBody>
+      </p:sp>
+      <p:sp>
+        <p:nvSpPr>
+          <p:cNvPr id="9" name="TextBox 8">
+            <a:extLst>
+              <a:ext uri="{FF2B5EF4-FFF2-40B4-BE49-F238E27FC236}">
+                <a16:creationId xmlns:a16="http://schemas.microsoft.com/office/drawing/2014/main" id="{A568D371-F64A-46A7-A452-E64DFEDEE53E}"/>
+              </a:ext>
+            </a:extLst>
+          </p:cNvPr>
+          <p:cNvSpPr txBox="1"/>
+          <p:nvPr/>
+        </p:nvSpPr>
+        <p:spPr>
+          <a:xfrm>
+            <a:off x="4248150" y="3610947"/>
+            <a:ext cx="5073132" cy="1477328"/>
+          </a:xfrm>
+          <a:prstGeom prst="rect">
+            <a:avLst/>
+          </a:prstGeom>
+          <a:noFill/>
+        </p:spPr>
+        <p:txBody>
+          <a:bodyPr wrap="square" rtlCol="0">
+            <a:spAutoFit/>
+          </a:bodyPr>
+          <a:lstStyle/>
+          <a:p>
+            <a:r>
+              <a:rPr lang="en-GB" dirty="0"/>
+              <a:t>Your Account ID needs to be compiled into the Redirector code.</a:t>
+            </a:r>
+          </a:p>
+          <a:p>
+            <a:endParaRPr lang="en-GB" dirty="0"/>
+          </a:p>
+          <a:p>
+            <a:r>
+              <a:rPr lang="en-GB" dirty="0"/>
+              <a:t>The Auth token here needs to be entered onto the Geo SCADA ‘Notify Redirector’ object properties.</a:t>
+            </a:r>
+          </a:p>
+        </p:txBody>
+      </p:sp>
+      <p:cxnSp>
+        <p:nvCxnSpPr>
+          <p:cNvPr id="11" name="Straight Arrow Connector 10">
+            <a:extLst>
+              <a:ext uri="{FF2B5EF4-FFF2-40B4-BE49-F238E27FC236}">
+                <a16:creationId xmlns:a16="http://schemas.microsoft.com/office/drawing/2014/main" id="{DFB1CCD1-32B3-4558-868F-67811D778D37}"/>
+              </a:ext>
+            </a:extLst>
+          </p:cNvPr>
+          <p:cNvCxnSpPr>
+            <a:endCxn id="8" idx="1"/>
+          </p:cNvCxnSpPr>
+          <p:nvPr/>
+        </p:nvCxnSpPr>
+        <p:spPr>
+          <a:xfrm flipV="1">
+            <a:off x="4413380" y="2232269"/>
+            <a:ext cx="1343608" cy="1378678"/>
+          </a:xfrm>
+          <a:prstGeom prst="straightConnector1">
+            <a:avLst/>
+          </a:prstGeom>
+          <a:ln>
+            <a:solidFill>
+              <a:srgbClr val="FF0000"/>
+            </a:solidFill>
+            <a:tailEnd type="triangle"/>
+          </a:ln>
+        </p:spPr>
+        <p:style>
+          <a:lnRef idx="1">
+            <a:schemeClr val="accent1"/>
+          </a:lnRef>
+          <a:fillRef idx="0">
+            <a:schemeClr val="accent1"/>
+          </a:fillRef>
+          <a:effectRef idx="0">
+            <a:schemeClr val="accent1"/>
+          </a:effectRef>
+          <a:fontRef idx="minor">
+            <a:schemeClr val="tx1"/>
+          </a:fontRef>
+        </p:style>
+      </p:cxnSp>
+      <p:cxnSp>
+        <p:nvCxnSpPr>
+          <p:cNvPr id="13" name="Straight Arrow Connector 12">
+            <a:extLst>
+              <a:ext uri="{FF2B5EF4-FFF2-40B4-BE49-F238E27FC236}">
+                <a16:creationId xmlns:a16="http://schemas.microsoft.com/office/drawing/2014/main" id="{91F99A43-553A-4D9A-9CFC-0B751D6A16CD}"/>
+              </a:ext>
+            </a:extLst>
+          </p:cNvPr>
+          <p:cNvCxnSpPr/>
+          <p:nvPr/>
+        </p:nvCxnSpPr>
+        <p:spPr>
+          <a:xfrm flipV="1">
+            <a:off x="4404049" y="2808514"/>
+            <a:ext cx="1352939" cy="1688841"/>
+          </a:xfrm>
+          <a:prstGeom prst="straightConnector1">
+            <a:avLst/>
+          </a:prstGeom>
+          <a:ln>
+            <a:solidFill>
+              <a:srgbClr val="FF0000"/>
+            </a:solidFill>
+            <a:tailEnd type="triangle"/>
+          </a:ln>
+        </p:spPr>
+        <p:style>
+          <a:lnRef idx="1">
+            <a:schemeClr val="accent1"/>
+          </a:lnRef>
+          <a:fillRef idx="0">
+            <a:schemeClr val="accent1"/>
+          </a:fillRef>
+          <a:effectRef idx="0">
+            <a:schemeClr val="accent1"/>
+          </a:effectRef>
+          <a:fontRef idx="minor">
+            <a:schemeClr val="tx1"/>
+          </a:fontRef>
+        </p:style>
+      </p:cxnSp>
     </p:spTree>
     <p:extLst>
       <p:ext uri="{BB962C8B-B14F-4D97-AF65-F5344CB8AC3E}">
-        <p14:creationId xmlns:p14="http://schemas.microsoft.com/office/powerpoint/2010/main" val="775896754"/>
+        <p14:creationId xmlns:p14="http://schemas.microsoft.com/office/powerpoint/2010/main" val="3364444612"/>
       </p:ext>
     </p:extLst>
   </p:cSld>

</xml_diff>

<commit_message>
Add Twilio flow advice
Add Twilio flow advice in powerpoint and JSON file for import
</commit_message>
<xml_diff>
--- a/NotifyDemo Description.pptx
+++ b/NotifyDemo Description.pptx
@@ -281,7 +281,7 @@
           <a:p>
             <a:fld id="{79084D12-9971-4D85-90B6-EA2E8E4DAC18}" type="datetimeFigureOut">
               <a:rPr lang="en-GB" smtClean="0"/>
-              <a:t>11/09/2019</a:t>
+              <a:t>30/01/2020</a:t>
             </a:fld>
             <a:endParaRPr lang="en-GB"/>
           </a:p>
@@ -481,7 +481,7 @@
           <a:p>
             <a:fld id="{79084D12-9971-4D85-90B6-EA2E8E4DAC18}" type="datetimeFigureOut">
               <a:rPr lang="en-GB" smtClean="0"/>
-              <a:t>11/09/2019</a:t>
+              <a:t>30/01/2020</a:t>
             </a:fld>
             <a:endParaRPr lang="en-GB"/>
           </a:p>
@@ -691,7 +691,7 @@
           <a:p>
             <a:fld id="{79084D12-9971-4D85-90B6-EA2E8E4DAC18}" type="datetimeFigureOut">
               <a:rPr lang="en-GB" smtClean="0"/>
-              <a:t>11/09/2019</a:t>
+              <a:t>30/01/2020</a:t>
             </a:fld>
             <a:endParaRPr lang="en-GB"/>
           </a:p>
@@ -891,7 +891,7 @@
           <a:p>
             <a:fld id="{79084D12-9971-4D85-90B6-EA2E8E4DAC18}" type="datetimeFigureOut">
               <a:rPr lang="en-GB" smtClean="0"/>
-              <a:t>11/09/2019</a:t>
+              <a:t>30/01/2020</a:t>
             </a:fld>
             <a:endParaRPr lang="en-GB"/>
           </a:p>
@@ -1167,7 +1167,7 @@
           <a:p>
             <a:fld id="{79084D12-9971-4D85-90B6-EA2E8E4DAC18}" type="datetimeFigureOut">
               <a:rPr lang="en-GB" smtClean="0"/>
-              <a:t>11/09/2019</a:t>
+              <a:t>30/01/2020</a:t>
             </a:fld>
             <a:endParaRPr lang="en-GB"/>
           </a:p>
@@ -1435,7 +1435,7 @@
           <a:p>
             <a:fld id="{79084D12-9971-4D85-90B6-EA2E8E4DAC18}" type="datetimeFigureOut">
               <a:rPr lang="en-GB" smtClean="0"/>
-              <a:t>11/09/2019</a:t>
+              <a:t>30/01/2020</a:t>
             </a:fld>
             <a:endParaRPr lang="en-GB"/>
           </a:p>
@@ -1850,7 +1850,7 @@
           <a:p>
             <a:fld id="{79084D12-9971-4D85-90B6-EA2E8E4DAC18}" type="datetimeFigureOut">
               <a:rPr lang="en-GB" smtClean="0"/>
-              <a:t>11/09/2019</a:t>
+              <a:t>30/01/2020</a:t>
             </a:fld>
             <a:endParaRPr lang="en-GB"/>
           </a:p>
@@ -1992,7 +1992,7 @@
           <a:p>
             <a:fld id="{79084D12-9971-4D85-90B6-EA2E8E4DAC18}" type="datetimeFigureOut">
               <a:rPr lang="en-GB" smtClean="0"/>
-              <a:t>11/09/2019</a:t>
+              <a:t>30/01/2020</a:t>
             </a:fld>
             <a:endParaRPr lang="en-GB"/>
           </a:p>
@@ -2105,7 +2105,7 @@
           <a:p>
             <a:fld id="{79084D12-9971-4D85-90B6-EA2E8E4DAC18}" type="datetimeFigureOut">
               <a:rPr lang="en-GB" smtClean="0"/>
-              <a:t>11/09/2019</a:t>
+              <a:t>30/01/2020</a:t>
             </a:fld>
             <a:endParaRPr lang="en-GB"/>
           </a:p>
@@ -2418,7 +2418,7 @@
           <a:p>
             <a:fld id="{79084D12-9971-4D85-90B6-EA2E8E4DAC18}" type="datetimeFigureOut">
               <a:rPr lang="en-GB" smtClean="0"/>
-              <a:t>11/09/2019</a:t>
+              <a:t>30/01/2020</a:t>
             </a:fld>
             <a:endParaRPr lang="en-GB"/>
           </a:p>
@@ -2707,7 +2707,7 @@
           <a:p>
             <a:fld id="{79084D12-9971-4D85-90B6-EA2E8E4DAC18}" type="datetimeFigureOut">
               <a:rPr lang="en-GB" smtClean="0"/>
-              <a:t>11/09/2019</a:t>
+              <a:t>30/01/2020</a:t>
             </a:fld>
             <a:endParaRPr lang="en-GB"/>
           </a:p>
@@ -2950,7 +2950,7 @@
           <a:p>
             <a:fld id="{79084D12-9971-4D85-90B6-EA2E8E4DAC18}" type="datetimeFigureOut">
               <a:rPr lang="en-GB" smtClean="0"/>
-              <a:t>11/09/2019</a:t>
+              <a:t>30/01/2020</a:t>
             </a:fld>
             <a:endParaRPr lang="en-GB"/>
           </a:p>
@@ -3421,7 +3421,7 @@
         <p:spPr/>
         <p:txBody>
           <a:bodyPr>
-            <a:normAutofit fontScale="77500" lnSpcReduction="20000"/>
+            <a:normAutofit lnSpcReduction="10000"/>
           </a:bodyPr>
           <a:lstStyle/>
           <a:p>
@@ -3431,12 +3431,6 @@
             </a:r>
           </a:p>
           <a:p>
-            <a:r>
-              <a:rPr lang="en-GB" dirty="0"/>
-              <a:t>October 2019</a:t>
-            </a:r>
-          </a:p>
-          <a:p>
             <a:endParaRPr lang="en-GB" dirty="0"/>
           </a:p>
           <a:p>
@@ -3447,8 +3441,8 @@
           </a:p>
           <a:p>
             <a:r>
-              <a:rPr lang="en-GB" dirty="0"/>
-              <a:t>Not supported, please see Geo SCADA Support Forum to discuss</a:t>
+              <a:rPr lang="en-GB" sz="1600" dirty="0"/>
+              <a:t>Notify and Redirector source sample code not supported, please see Geo SCADA Support Forum to discuss</a:t>
             </a:r>
           </a:p>
         </p:txBody>
@@ -3506,7 +3500,7 @@
           <a:p>
             <a:r>
               <a:rPr lang="en-GB" dirty="0"/>
-              <a:t>Twilio – Buy a Number</a:t>
+              <a:t>Twilio – Buy a Number – for the outgoing calls</a:t>
             </a:r>
           </a:p>
         </p:txBody>
@@ -3739,6 +3733,50 @@
           </a:p>
         </p:txBody>
       </p:sp>
+      <p:cxnSp>
+        <p:nvCxnSpPr>
+          <p:cNvPr id="7" name="Straight Arrow Connector 6">
+            <a:extLst>
+              <a:ext uri="{FF2B5EF4-FFF2-40B4-BE49-F238E27FC236}">
+                <a16:creationId xmlns:a16="http://schemas.microsoft.com/office/drawing/2014/main" id="{96A6EA43-3FD5-4A51-B5A1-A716DAC9EE7E}"/>
+              </a:ext>
+            </a:extLst>
+          </p:cNvPr>
+          <p:cNvCxnSpPr>
+            <a:cxnSpLocks/>
+          </p:cNvCxnSpPr>
+          <p:nvPr/>
+        </p:nvCxnSpPr>
+        <p:spPr>
+          <a:xfrm flipH="1" flipV="1">
+            <a:off x="3852775" y="2897157"/>
+            <a:ext cx="361006" cy="844419"/>
+          </a:xfrm>
+          <a:prstGeom prst="straightConnector1">
+            <a:avLst/>
+          </a:prstGeom>
+          <a:ln>
+            <a:solidFill>
+              <a:srgbClr val="FF0000"/>
+            </a:solidFill>
+            <a:tailEnd type="triangle"/>
+          </a:ln>
+        </p:spPr>
+        <p:style>
+          <a:lnRef idx="1">
+            <a:schemeClr val="accent1"/>
+          </a:lnRef>
+          <a:fillRef idx="0">
+            <a:schemeClr val="accent1"/>
+          </a:fillRef>
+          <a:effectRef idx="0">
+            <a:schemeClr val="accent1"/>
+          </a:effectRef>
+          <a:fontRef idx="minor">
+            <a:schemeClr val="tx1"/>
+          </a:fontRef>
+        </p:style>
+      </p:cxnSp>
     </p:spTree>
     <p:extLst>
       <p:ext uri="{BB962C8B-B14F-4D97-AF65-F5344CB8AC3E}">
@@ -4725,12 +4763,29 @@
           <a:p>
             <a:r>
               <a:rPr lang="en-GB" dirty="0"/>
-              <a:t>Not yet in </a:t>
-            </a:r>
-            <a:r>
-              <a:rPr lang="en-GB"/>
-              <a:t>this presentation</a:t>
-            </a:r>
+              <a:t>See the JSON representation of the flow within the repo – file ‘DemoTwilioFlowV1.json’</a:t>
+            </a:r>
+          </a:p>
+          <a:p>
+            <a:r>
+              <a:rPr lang="en-GB" dirty="0"/>
+              <a:t>You can use this to work out what widgets and flow configuration are needed, or import directly</a:t>
+            </a:r>
+          </a:p>
+          <a:p>
+            <a:r>
+              <a:rPr lang="en-GB" dirty="0"/>
+              <a:t>To import, create a new flow, add a name then scroll to the end of the list to see ‘Import JSON’</a:t>
+            </a:r>
+          </a:p>
+          <a:p>
+            <a:r>
+              <a:rPr lang="en-GB" dirty="0"/>
+              <a:t>Flow has been edited, and items within &lt;&lt; &gt;&gt; need to be adjusted for your environment, e.g. your web service endpoint URL</a:t>
+            </a:r>
+          </a:p>
+          <a:p>
+            <a:endParaRPr lang="en-GB" dirty="0"/>
           </a:p>
         </p:txBody>
       </p:sp>
@@ -5030,7 +5085,7 @@
             </a:pPr>
             <a:r>
               <a:rPr lang="en-GB" dirty="0"/>
-              <a:t>Build and install the driver – import the registry file from the code sample.</a:t>
+              <a:t>Build and install the driver – import the registry file from the code sample to make Geo SCADA run the driver.</a:t>
             </a:r>
           </a:p>
           <a:p>
@@ -5719,7 +5774,7 @@
         <p:spPr/>
         <p:txBody>
           <a:bodyPr>
-            <a:normAutofit fontScale="85000" lnSpcReduction="10000"/>
+            <a:normAutofit fontScale="85000" lnSpcReduction="20000"/>
           </a:bodyPr>
           <a:lstStyle/>
           <a:p>
@@ -5773,6 +5828,13 @@
             <a:r>
               <a:rPr lang="en-GB" dirty="0"/>
               <a:t>You also need to deploy the Driver and Redirector securely, making any code changes you need for your application’s security and reliability.</a:t>
+            </a:r>
+          </a:p>
+          <a:p>
+            <a:pPr lvl="1"/>
+            <a:r>
+              <a:rPr lang="en-GB" dirty="0"/>
+              <a:t>You can customise the application for your language and choice of services.</a:t>
             </a:r>
           </a:p>
           <a:p>
@@ -6109,8 +6171,17 @@
           <a:p>
             <a:r>
               <a:rPr lang="en-GB" dirty="0"/>
-              <a:t>Please go to the Telemetry Forum to discuss this example.</a:t>
-            </a:r>
+              <a:t>Please go to the Telemetry Forum to discuss this example</a:t>
+            </a:r>
+          </a:p>
+          <a:p>
+            <a:r>
+              <a:rPr lang="en-GB" dirty="0">
+                <a:hlinkClick r:id="rId2"/>
+              </a:rPr>
+              <a:t>https://community.exchange.se.com/t5/Geo-SCADA-Expert-Forum/bd-p/ecostruxure-geo-scada-expert-forum</a:t>
+            </a:r>
+            <a:endParaRPr lang="en-GB" dirty="0"/>
           </a:p>
         </p:txBody>
       </p:sp>
@@ -8628,7 +8699,7 @@
         </p:nvCxnSpPr>
         <p:spPr>
           <a:xfrm flipV="1">
-            <a:off x="4404049" y="2808514"/>
+            <a:off x="4404049" y="2827368"/>
             <a:ext cx="1352939" cy="1688841"/>
           </a:xfrm>
           <a:prstGeom prst="straightConnector1">

</xml_diff>